<commit_message>
add numpy iterating to data science
</commit_message>
<xml_diff>
--- a/2 Data Science.pptx
+++ b/2 Data Science.pptx
@@ -5,10 +5,10 @@
     <p:sldMasterId id="2147483658" r:id="rId1"/>
   </p:sldMasterIdLst>
   <p:notesMasterIdLst>
-    <p:notesMasterId r:id="rId14"/>
+    <p:notesMasterId r:id="rId15"/>
   </p:notesMasterIdLst>
   <p:handoutMasterIdLst>
-    <p:handoutMasterId r:id="rId15"/>
+    <p:handoutMasterId r:id="rId16"/>
   </p:handoutMasterIdLst>
   <p:sldIdLst>
     <p:sldId id="256" r:id="rId2"/>
@@ -19,39 +19,40 @@
     <p:sldId id="338" r:id="rId7"/>
     <p:sldId id="339" r:id="rId8"/>
     <p:sldId id="342" r:id="rId9"/>
-    <p:sldId id="334" r:id="rId10"/>
-    <p:sldId id="335" r:id="rId11"/>
-    <p:sldId id="340" r:id="rId12"/>
-    <p:sldId id="280" r:id="rId13"/>
+    <p:sldId id="343" r:id="rId10"/>
+    <p:sldId id="334" r:id="rId11"/>
+    <p:sldId id="335" r:id="rId12"/>
+    <p:sldId id="340" r:id="rId13"/>
+    <p:sldId id="280" r:id="rId14"/>
   </p:sldIdLst>
   <p:sldSz cx="9144000" cy="5143500" type="screen16x9"/>
   <p:notesSz cx="6858000" cy="9144000"/>
   <p:embeddedFontLst>
     <p:embeddedFont>
       <p:font typeface="Consolas" panose="020B0609020204030204" pitchFamily="49" charset="0"/>
-      <p:regular r:id="rId16"/>
-      <p:bold r:id="rId17"/>
-      <p:italic r:id="rId18"/>
-      <p:boldItalic r:id="rId19"/>
+      <p:regular r:id="rId17"/>
+      <p:bold r:id="rId18"/>
+      <p:italic r:id="rId19"/>
+      <p:boldItalic r:id="rId20"/>
     </p:embeddedFont>
     <p:embeddedFont>
       <p:font typeface="Roboto Slab" panose="020B0604020202020204" charset="0"/>
-      <p:regular r:id="rId20"/>
-      <p:bold r:id="rId21"/>
+      <p:regular r:id="rId21"/>
+      <p:bold r:id="rId22"/>
     </p:embeddedFont>
     <p:embeddedFont>
       <p:font typeface="Source Sans Pro" panose="020B0503030403020204" pitchFamily="34" charset="0"/>
-      <p:regular r:id="rId22"/>
-      <p:bold r:id="rId23"/>
-      <p:italic r:id="rId24"/>
-      <p:boldItalic r:id="rId25"/>
+      <p:regular r:id="rId23"/>
+      <p:bold r:id="rId24"/>
+      <p:italic r:id="rId25"/>
+      <p:boldItalic r:id="rId26"/>
     </p:embeddedFont>
     <p:embeddedFont>
       <p:font typeface="Trebuchet MS" panose="020B0603020202020204" pitchFamily="34" charset="0"/>
-      <p:regular r:id="rId26"/>
-      <p:bold r:id="rId27"/>
-      <p:italic r:id="rId28"/>
-      <p:boldItalic r:id="rId29"/>
+      <p:regular r:id="rId27"/>
+      <p:bold r:id="rId28"/>
+      <p:italic r:id="rId29"/>
+      <p:boldItalic r:id="rId30"/>
     </p:embeddedFont>
   </p:embeddedFontLst>
   <p:defaultTextStyle>
@@ -6741,7 +6742,7 @@
           <a:p>
             <a:fld id="{7CEEE0ED-A0F5-4442-9C94-5288E26FF1D3}" type="datetimeFigureOut">
               <a:rPr lang="fa-IR" smtClean="0"/>
-              <a:t>08/09/1444</a:t>
+              <a:t>13/09/1444</a:t>
             </a:fld>
             <a:endParaRPr lang="fa-IR"/>
           </a:p>
@@ -11272,7 +11273,7 @@
                   <a:srgbClr val="E6E6E6"/>
                 </a:solidFill>
               </a:rPr>
-              <a:t>3</a:t>
+              <a:t>2</a:t>
             </a:r>
             <a:endParaRPr sz="6000">
               <a:solidFill>
@@ -11282,8 +11283,8 @@
           </a:p>
           <a:p>
             <a:r>
-              <a:rPr lang="en"/>
-              <a:t>Matplotlib</a:t>
+              <a:rPr lang="en-US" b="1"/>
+              <a:t>Pandas</a:t>
             </a:r>
             <a:endParaRPr/>
           </a:p>
@@ -11334,7 +11335,7 @@
     </p:spTree>
     <p:extLst>
       <p:ext uri="{BB962C8B-B14F-4D97-AF65-F5344CB8AC3E}">
-        <p14:creationId xmlns:p14="http://schemas.microsoft.com/office/powerpoint/2010/main" val="550571345"/>
+        <p14:creationId xmlns:p14="http://schemas.microsoft.com/office/powerpoint/2010/main" val="445305485"/>
       </p:ext>
     </p:extLst>
   </p:cSld>
@@ -11401,6 +11402,135 @@
                   <a:srgbClr val="E6E6E6"/>
                 </a:solidFill>
               </a:rPr>
+              <a:t>3</a:t>
+            </a:r>
+            <a:endParaRPr sz="6000">
+              <a:solidFill>
+                <a:srgbClr val="E6E6E6"/>
+              </a:solidFill>
+            </a:endParaRPr>
+          </a:p>
+          <a:p>
+            <a:r>
+              <a:rPr lang="en"/>
+              <a:t>Matplotlib</a:t>
+            </a:r>
+            <a:endParaRPr/>
+          </a:p>
+        </p:txBody>
+      </p:sp>
+      <p:sp>
+        <p:nvSpPr>
+          <p:cNvPr id="99" name="Google Shape;99;p15"/>
+          <p:cNvSpPr txBox="1">
+            <a:spLocks noGrp="1"/>
+          </p:cNvSpPr>
+          <p:nvPr>
+            <p:ph type="sldNum" idx="4294967295"/>
+          </p:nvPr>
+        </p:nvSpPr>
+        <p:spPr>
+          <a:xfrm>
+            <a:off x="8404384" y="4749851"/>
+            <a:ext cx="548700" cy="393600"/>
+          </a:xfrm>
+          <a:prstGeom prst="rect">
+            <a:avLst/>
+          </a:prstGeom>
+        </p:spPr>
+        <p:txBody>
+          <a:bodyPr spcFirstLastPara="1" wrap="square" lIns="91425" tIns="91425" rIns="91425" bIns="91425" anchor="t" anchorCtr="0">
+            <a:noAutofit/>
+          </a:bodyPr>
+          <a:lstStyle/>
+          <a:p>
+            <a:pPr marL="0" lvl="0" indent="0" algn="r" rtl="0">
+              <a:spcBef>
+                <a:spcPts val="0"/>
+              </a:spcBef>
+              <a:spcAft>
+                <a:spcPts val="0"/>
+              </a:spcAft>
+              <a:buNone/>
+            </a:pPr>
+            <a:fld id="{00000000-1234-1234-1234-123412341234}" type="slidenum">
+              <a:rPr lang="en"/>
+              <a:t>11</a:t>
+            </a:fld>
+            <a:endParaRPr/>
+          </a:p>
+        </p:txBody>
+      </p:sp>
+    </p:spTree>
+    <p:extLst>
+      <p:ext uri="{BB962C8B-B14F-4D97-AF65-F5344CB8AC3E}">
+        <p14:creationId xmlns:p14="http://schemas.microsoft.com/office/powerpoint/2010/main" val="550571345"/>
+      </p:ext>
+    </p:extLst>
+  </p:cSld>
+  <p:clrMapOvr>
+    <a:masterClrMapping/>
+  </p:clrMapOvr>
+</p:sld>
+</file>
+
+<file path=ppt/slides/slide12.xml><?xml version="1.0" encoding="utf-8"?>
+<p:sld xmlns:a="http://schemas.openxmlformats.org/drawingml/2006/main" xmlns:r="http://schemas.openxmlformats.org/officeDocument/2006/relationships" xmlns:p="http://schemas.openxmlformats.org/presentationml/2006/main">
+  <p:cSld>
+    <p:spTree>
+      <p:nvGrpSpPr>
+        <p:cNvPr id="1" name="Shape 96"/>
+        <p:cNvGrpSpPr/>
+        <p:nvPr/>
+      </p:nvGrpSpPr>
+      <p:grpSpPr>
+        <a:xfrm>
+          <a:off x="0" y="0"/>
+          <a:ext cx="0" cy="0"/>
+          <a:chOff x="0" y="0"/>
+          <a:chExt cx="0" cy="0"/>
+        </a:xfrm>
+      </p:grpSpPr>
+      <p:sp>
+        <p:nvSpPr>
+          <p:cNvPr id="97" name="Google Shape;97;p15"/>
+          <p:cNvSpPr txBox="1">
+            <a:spLocks noGrp="1"/>
+          </p:cNvSpPr>
+          <p:nvPr>
+            <p:ph type="ctrTitle"/>
+          </p:nvPr>
+        </p:nvSpPr>
+        <p:spPr>
+          <a:xfrm>
+            <a:off x="1655700" y="1991850"/>
+            <a:ext cx="5832600" cy="1159800"/>
+          </a:xfrm>
+          <a:prstGeom prst="rect">
+            <a:avLst/>
+          </a:prstGeom>
+        </p:spPr>
+        <p:txBody>
+          <a:bodyPr spcFirstLastPara="1" wrap="square" lIns="91425" tIns="91425" rIns="91425" bIns="91425" anchor="ctr" anchorCtr="0">
+            <a:noAutofit/>
+          </a:bodyPr>
+          <a:lstStyle/>
+          <a:p>
+            <a:pPr marL="0" lvl="0" indent="0" algn="ctr" rtl="0">
+              <a:spcBef>
+                <a:spcPts val="0"/>
+              </a:spcBef>
+              <a:spcAft>
+                <a:spcPts val="0"/>
+              </a:spcAft>
+              <a:buNone/>
+            </a:pPr>
+            <a:r>
+              <a:rPr lang="en-US" sz="6000">
+                <a:solidFill>
+                  <a:srgbClr val="E6E6E6"/>
+                </a:solidFill>
+              </a:rPr>
               <a:t>4</a:t>
             </a:r>
             <a:endParaRPr sz="6000">
@@ -11454,7 +11584,7 @@
             </a:pPr>
             <a:fld id="{00000000-1234-1234-1234-123412341234}" type="slidenum">
               <a:rPr lang="en"/>
-              <a:t>11</a:t>
+              <a:t>12</a:t>
             </a:fld>
             <a:endParaRPr/>
           </a:p>
@@ -11473,7 +11603,7 @@
 </p:sld>
 </file>
 
-<file path=ppt/slides/slide12.xml><?xml version="1.0" encoding="utf-8"?>
+<file path=ppt/slides/slide13.xml><?xml version="1.0" encoding="utf-8"?>
 <p:sld xmlns:a="http://schemas.openxmlformats.org/drawingml/2006/main" xmlns:r="http://schemas.openxmlformats.org/officeDocument/2006/relationships" xmlns:p="http://schemas.openxmlformats.org/presentationml/2006/main">
   <p:cSld>
     <p:spTree>
@@ -11726,7 +11856,7 @@
             </a:pPr>
             <a:fld id="{00000000-1234-1234-1234-123412341234}" type="slidenum">
               <a:rPr lang="en"/>
-              <a:t>12</a:t>
+              <a:t>13</a:t>
             </a:fld>
             <a:endParaRPr/>
           </a:p>
@@ -12329,7 +12459,7 @@
             </a:pPr>
             <a:r>
               <a:rPr lang="en-US" sz="1400"/>
-              <a:t>Creat</a:t>
+              <a:t>Create</a:t>
             </a:r>
           </a:p>
           <a:p>
@@ -13472,7 +13602,7 @@
   <p:cSld>
     <p:spTree>
       <p:nvGrpSpPr>
-        <p:cNvPr id="1" name="Shape 96"/>
+        <p:cNvPr id="1" name=""/>
         <p:cNvGrpSpPr/>
         <p:nvPr/>
       </p:nvGrpSpPr>
@@ -13486,84 +13616,292 @@
       </p:grpSpPr>
       <p:sp>
         <p:nvSpPr>
-          <p:cNvPr id="97" name="Google Shape;97;p15"/>
-          <p:cNvSpPr txBox="1">
+          <p:cNvPr id="2" name="Title 1">
+            <a:extLst>
+              <a:ext uri="{FF2B5EF4-FFF2-40B4-BE49-F238E27FC236}">
+                <a16:creationId xmlns:a16="http://schemas.microsoft.com/office/drawing/2014/main" id="{024AD384-5AD1-4435-A943-1241B2FACD62}"/>
+              </a:ext>
+            </a:extLst>
+          </p:cNvPr>
+          <p:cNvSpPr>
             <a:spLocks noGrp="1"/>
           </p:cNvSpPr>
           <p:nvPr>
-            <p:ph type="ctrTitle"/>
+            <p:ph type="title"/>
           </p:nvPr>
         </p:nvSpPr>
-        <p:spPr>
-          <a:xfrm>
-            <a:off x="1655700" y="1991850"/>
-            <a:ext cx="5832600" cy="1159800"/>
-          </a:xfrm>
-          <a:prstGeom prst="rect">
-            <a:avLst/>
-          </a:prstGeom>
-        </p:spPr>
+        <p:spPr/>
         <p:txBody>
-          <a:bodyPr spcFirstLastPara="1" wrap="square" lIns="91425" tIns="91425" rIns="91425" bIns="91425" anchor="ctr" anchorCtr="0">
-            <a:noAutofit/>
-          </a:bodyPr>
+          <a:bodyPr/>
           <a:lstStyle/>
           <a:p>
-            <a:pPr marL="0" lvl="0" indent="0" algn="ctr" rtl="0">
-              <a:spcBef>
-                <a:spcPts val="0"/>
-              </a:spcBef>
-              <a:spcAft>
-                <a:spcPts val="0"/>
-              </a:spcAft>
-              <a:buNone/>
-            </a:pPr>
             <a:r>
-              <a:rPr lang="en-US" sz="6000">
-                <a:solidFill>
-                  <a:srgbClr val="E6E6E6"/>
-                </a:solidFill>
-              </a:rPr>
-              <a:t>2</a:t>
+              <a:rPr lang="en-US" sz="2400"/>
+              <a:t>Iterating</a:t>
             </a:r>
-            <a:endParaRPr sz="6000">
-              <a:solidFill>
-                <a:srgbClr val="E6E6E6"/>
-              </a:solidFill>
-            </a:endParaRPr>
-          </a:p>
-          <a:p>
-            <a:r>
-              <a:rPr lang="en-US" b="1"/>
-              <a:t>Pandas</a:t>
-            </a:r>
-            <a:endParaRPr/>
+            <a:endParaRPr lang="fa-IR"/>
           </a:p>
         </p:txBody>
       </p:sp>
       <p:sp>
         <p:nvSpPr>
-          <p:cNvPr id="99" name="Google Shape;99;p15"/>
-          <p:cNvSpPr txBox="1">
+          <p:cNvPr id="3" name="Text Placeholder 2">
+            <a:extLst>
+              <a:ext uri="{FF2B5EF4-FFF2-40B4-BE49-F238E27FC236}">
+                <a16:creationId xmlns:a16="http://schemas.microsoft.com/office/drawing/2014/main" id="{58BE3078-8B89-4550-B497-93E4DADBD57E}"/>
+              </a:ext>
+            </a:extLst>
+          </p:cNvPr>
+          <p:cNvSpPr>
             <a:spLocks noGrp="1"/>
           </p:cNvSpPr>
           <p:nvPr>
-            <p:ph type="sldNum" idx="4294967295"/>
+            <p:ph type="body" idx="1"/>
           </p:nvPr>
         </p:nvSpPr>
         <p:spPr>
           <a:xfrm>
-            <a:off x="8404384" y="4749851"/>
-            <a:ext cx="548700" cy="393600"/>
+            <a:off x="786150" y="1142608"/>
+            <a:ext cx="7571700" cy="3626431"/>
           </a:xfrm>
-          <a:prstGeom prst="rect">
-            <a:avLst/>
-          </a:prstGeom>
         </p:spPr>
         <p:txBody>
-          <a:bodyPr spcFirstLastPara="1" wrap="square" lIns="91425" tIns="91425" rIns="91425" bIns="91425" anchor="t" anchorCtr="0">
-            <a:noAutofit/>
-          </a:bodyPr>
+          <a:bodyPr/>
+          <a:lstStyle/>
+          <a:p>
+            <a:pPr marL="76200" indent="0">
+              <a:buNone/>
+            </a:pPr>
+            <a:r>
+              <a:rPr lang="en-US" sz="1400"/>
+              <a:t>Iterating Arrays</a:t>
+            </a:r>
+          </a:p>
+          <a:p>
+            <a:pPr marL="76200" indent="0">
+              <a:buNone/>
+            </a:pPr>
+            <a:r>
+              <a:rPr lang="en-US" sz="1100">
+                <a:latin typeface="Consolas" panose="020B0609020204030204" pitchFamily="49" charset="0"/>
+              </a:rPr>
+              <a:t>arr = np.array([[1, 2, 3, 4], [5, 6, 7, 8]])</a:t>
+            </a:r>
+          </a:p>
+          <a:p>
+            <a:pPr marL="76200" indent="0">
+              <a:buNone/>
+            </a:pPr>
+            <a:r>
+              <a:rPr lang="en-US" sz="1100">
+                <a:latin typeface="Consolas" panose="020B0609020204030204" pitchFamily="49" charset="0"/>
+              </a:rPr>
+              <a:t>for x in arr:</a:t>
+            </a:r>
+          </a:p>
+          <a:p>
+            <a:pPr marL="76200" indent="0">
+              <a:buNone/>
+            </a:pPr>
+            <a:r>
+              <a:rPr lang="en-US" sz="1100">
+                <a:latin typeface="Consolas" panose="020B0609020204030204" pitchFamily="49" charset="0"/>
+              </a:rPr>
+              <a:t>    print(x)</a:t>
+            </a:r>
+          </a:p>
+          <a:p>
+            <a:pPr marL="76200" indent="0">
+              <a:buNone/>
+            </a:pPr>
+            <a:r>
+              <a:rPr lang="en-US" sz="1100">
+                <a:latin typeface="Consolas" panose="020B0609020204030204" pitchFamily="49" charset="0"/>
+              </a:rPr>
+              <a:t>for x in np</a:t>
+            </a:r>
+            <a:r>
+              <a:rPr lang="en-US" sz="1100">
+                <a:solidFill>
+                  <a:schemeClr val="accent1"/>
+                </a:solidFill>
+                <a:latin typeface="Consolas" panose="020B0609020204030204" pitchFamily="49" charset="0"/>
+              </a:rPr>
+              <a:t>.nditer(</a:t>
+            </a:r>
+            <a:r>
+              <a:rPr lang="en-US" sz="1100">
+                <a:latin typeface="Consolas" panose="020B0609020204030204" pitchFamily="49" charset="0"/>
+              </a:rPr>
+              <a:t>arr</a:t>
+            </a:r>
+            <a:r>
+              <a:rPr lang="en-US" sz="1100">
+                <a:solidFill>
+                  <a:schemeClr val="accent1"/>
+                </a:solidFill>
+                <a:latin typeface="Consolas" panose="020B0609020204030204" pitchFamily="49" charset="0"/>
+              </a:rPr>
+              <a:t>)</a:t>
+            </a:r>
+            <a:r>
+              <a:rPr lang="en-US" sz="1100">
+                <a:latin typeface="Consolas" panose="020B0609020204030204" pitchFamily="49" charset="0"/>
+              </a:rPr>
+              <a:t>:</a:t>
+            </a:r>
+          </a:p>
+          <a:p>
+            <a:pPr marL="76200" indent="0">
+              <a:buNone/>
+            </a:pPr>
+            <a:r>
+              <a:rPr lang="en-US" sz="1100">
+                <a:latin typeface="Consolas" panose="020B0609020204030204" pitchFamily="49" charset="0"/>
+              </a:rPr>
+              <a:t>    print(x) </a:t>
+            </a:r>
+          </a:p>
+          <a:p>
+            <a:pPr marL="76200" indent="0">
+              <a:buNone/>
+            </a:pPr>
+            <a:r>
+              <a:rPr lang="en-US" sz="1100">
+                <a:latin typeface="Consolas" panose="020B0609020204030204" pitchFamily="49" charset="0"/>
+              </a:rPr>
+              <a:t>for x in np.nditer(arr</a:t>
+            </a:r>
+            <a:r>
+              <a:rPr lang="en-US" sz="1100">
+                <a:solidFill>
+                  <a:schemeClr val="accent1"/>
+                </a:solidFill>
+                <a:latin typeface="Consolas" panose="020B0609020204030204" pitchFamily="49" charset="0"/>
+              </a:rPr>
+              <a:t>[</a:t>
+            </a:r>
+            <a:r>
+              <a:rPr lang="en-US" sz="1100">
+                <a:latin typeface="Consolas" panose="020B0609020204030204" pitchFamily="49" charset="0"/>
+              </a:rPr>
+              <a:t>:</a:t>
+            </a:r>
+            <a:r>
+              <a:rPr lang="en-US" sz="1100">
+                <a:solidFill>
+                  <a:schemeClr val="accent1"/>
+                </a:solidFill>
+                <a:latin typeface="Consolas" panose="020B0609020204030204" pitchFamily="49" charset="0"/>
+              </a:rPr>
+              <a:t>,</a:t>
+            </a:r>
+            <a:r>
+              <a:rPr lang="en-US" sz="1100">
+                <a:latin typeface="Consolas" panose="020B0609020204030204" pitchFamily="49" charset="0"/>
+              </a:rPr>
+              <a:t> ::2</a:t>
+            </a:r>
+            <a:r>
+              <a:rPr lang="en-US" sz="1100">
+                <a:solidFill>
+                  <a:schemeClr val="accent1"/>
+                </a:solidFill>
+                <a:latin typeface="Consolas" panose="020B0609020204030204" pitchFamily="49" charset="0"/>
+              </a:rPr>
+              <a:t>]</a:t>
+            </a:r>
+            <a:r>
+              <a:rPr lang="en-US" sz="1100">
+                <a:latin typeface="Consolas" panose="020B0609020204030204" pitchFamily="49" charset="0"/>
+              </a:rPr>
+              <a:t>):</a:t>
+            </a:r>
+          </a:p>
+          <a:p>
+            <a:pPr marL="76200" indent="0">
+              <a:buNone/>
+            </a:pPr>
+            <a:r>
+              <a:rPr lang="en-US" sz="1100">
+                <a:latin typeface="Consolas" panose="020B0609020204030204" pitchFamily="49" charset="0"/>
+              </a:rPr>
+              <a:t>    print(x) </a:t>
+            </a:r>
+          </a:p>
+          <a:p>
+            <a:pPr marL="76200" indent="0">
+              <a:buNone/>
+            </a:pPr>
+            <a:r>
+              <a:rPr lang="en-US" sz="1100">
+                <a:latin typeface="Consolas" panose="020B0609020204030204" pitchFamily="49" charset="0"/>
+              </a:rPr>
+              <a:t>for x in np</a:t>
+            </a:r>
+            <a:r>
+              <a:rPr lang="en-US" sz="1100">
+                <a:solidFill>
+                  <a:schemeClr val="accent1"/>
+                </a:solidFill>
+                <a:latin typeface="Consolas" panose="020B0609020204030204" pitchFamily="49" charset="0"/>
+              </a:rPr>
+              <a:t>.ndenumerate(</a:t>
+            </a:r>
+            <a:r>
+              <a:rPr lang="en-US" sz="1100">
+                <a:latin typeface="Consolas" panose="020B0609020204030204" pitchFamily="49" charset="0"/>
+              </a:rPr>
+              <a:t>arr</a:t>
+            </a:r>
+            <a:r>
+              <a:rPr lang="en-US" sz="1100">
+                <a:solidFill>
+                  <a:schemeClr val="accent1"/>
+                </a:solidFill>
+                <a:latin typeface="Consolas" panose="020B0609020204030204" pitchFamily="49" charset="0"/>
+              </a:rPr>
+              <a:t>)</a:t>
+            </a:r>
+            <a:r>
+              <a:rPr lang="en-US" sz="1100">
+                <a:latin typeface="Consolas" panose="020B0609020204030204" pitchFamily="49" charset="0"/>
+              </a:rPr>
+              <a:t>:</a:t>
+            </a:r>
+          </a:p>
+          <a:p>
+            <a:pPr marL="76200" indent="0">
+              <a:buNone/>
+            </a:pPr>
+            <a:r>
+              <a:rPr lang="en-US" sz="1100">
+                <a:latin typeface="Consolas" panose="020B0609020204030204" pitchFamily="49" charset="0"/>
+              </a:rPr>
+              <a:t>    print(x)</a:t>
+            </a:r>
+          </a:p>
+        </p:txBody>
+      </p:sp>
+      <p:sp>
+        <p:nvSpPr>
+          <p:cNvPr id="4" name="Slide Number Placeholder 3">
+            <a:extLst>
+              <a:ext uri="{FF2B5EF4-FFF2-40B4-BE49-F238E27FC236}">
+                <a16:creationId xmlns:a16="http://schemas.microsoft.com/office/drawing/2014/main" id="{64987AE6-EC0E-43DD-9376-95A5602EE5E1}"/>
+              </a:ext>
+            </a:extLst>
+          </p:cNvPr>
+          <p:cNvSpPr>
+            <a:spLocks noGrp="1"/>
+          </p:cNvSpPr>
+          <p:nvPr>
+            <p:ph type="sldNum" idx="12"/>
+          </p:nvPr>
+        </p:nvSpPr>
+        <p:spPr/>
+        <p:txBody>
+          <a:bodyPr/>
           <a:lstStyle/>
           <a:p>
             <a:pPr marL="0" lvl="0" indent="0" algn="r" rtl="0">
@@ -13576,17 +13914,17 @@
               <a:buNone/>
             </a:pPr>
             <a:fld id="{00000000-1234-1234-1234-123412341234}" type="slidenum">
-              <a:rPr lang="en"/>
+              <a:rPr lang="en" smtClean="0"/>
               <a:t>9</a:t>
             </a:fld>
-            <a:endParaRPr/>
+            <a:endParaRPr lang="en"/>
           </a:p>
         </p:txBody>
       </p:sp>
     </p:spTree>
     <p:extLst>
       <p:ext uri="{BB962C8B-B14F-4D97-AF65-F5344CB8AC3E}">
-        <p14:creationId xmlns:p14="http://schemas.microsoft.com/office/powerpoint/2010/main" val="445305485"/>
+        <p14:creationId xmlns:p14="http://schemas.microsoft.com/office/powerpoint/2010/main" val="1384881879"/>
       </p:ext>
     </p:extLst>
   </p:cSld>

</xml_diff>

<commit_message>
add numpy serch, filter and sort
</commit_message>
<xml_diff>
--- a/2 Data Science.pptx
+++ b/2 Data Science.pptx
@@ -5,10 +5,10 @@
     <p:sldMasterId id="2147483658" r:id="rId1"/>
   </p:sldMasterIdLst>
   <p:notesMasterIdLst>
-    <p:notesMasterId r:id="rId15"/>
+    <p:notesMasterId r:id="rId18"/>
   </p:notesMasterIdLst>
   <p:handoutMasterIdLst>
-    <p:handoutMasterId r:id="rId16"/>
+    <p:handoutMasterId r:id="rId19"/>
   </p:handoutMasterIdLst>
   <p:sldIdLst>
     <p:sldId id="256" r:id="rId2"/>
@@ -20,39 +20,42 @@
     <p:sldId id="339" r:id="rId8"/>
     <p:sldId id="342" r:id="rId9"/>
     <p:sldId id="343" r:id="rId10"/>
-    <p:sldId id="334" r:id="rId11"/>
-    <p:sldId id="335" r:id="rId12"/>
-    <p:sldId id="340" r:id="rId13"/>
-    <p:sldId id="280" r:id="rId14"/>
+    <p:sldId id="344" r:id="rId11"/>
+    <p:sldId id="345" r:id="rId12"/>
+    <p:sldId id="346" r:id="rId13"/>
+    <p:sldId id="334" r:id="rId14"/>
+    <p:sldId id="335" r:id="rId15"/>
+    <p:sldId id="340" r:id="rId16"/>
+    <p:sldId id="280" r:id="rId17"/>
   </p:sldIdLst>
   <p:sldSz cx="9144000" cy="5143500" type="screen16x9"/>
   <p:notesSz cx="6858000" cy="9144000"/>
   <p:embeddedFontLst>
     <p:embeddedFont>
       <p:font typeface="Consolas" panose="020B0609020204030204" pitchFamily="49" charset="0"/>
-      <p:regular r:id="rId17"/>
-      <p:bold r:id="rId18"/>
-      <p:italic r:id="rId19"/>
-      <p:boldItalic r:id="rId20"/>
+      <p:regular r:id="rId20"/>
+      <p:bold r:id="rId21"/>
+      <p:italic r:id="rId22"/>
+      <p:boldItalic r:id="rId23"/>
     </p:embeddedFont>
     <p:embeddedFont>
       <p:font typeface="Roboto Slab" panose="020B0604020202020204" charset="0"/>
-      <p:regular r:id="rId21"/>
-      <p:bold r:id="rId22"/>
+      <p:regular r:id="rId24"/>
+      <p:bold r:id="rId25"/>
     </p:embeddedFont>
     <p:embeddedFont>
       <p:font typeface="Source Sans Pro" panose="020B0503030403020204" pitchFamily="34" charset="0"/>
-      <p:regular r:id="rId23"/>
-      <p:bold r:id="rId24"/>
-      <p:italic r:id="rId25"/>
-      <p:boldItalic r:id="rId26"/>
+      <p:regular r:id="rId26"/>
+      <p:bold r:id="rId27"/>
+      <p:italic r:id="rId28"/>
+      <p:boldItalic r:id="rId29"/>
     </p:embeddedFont>
     <p:embeddedFont>
       <p:font typeface="Trebuchet MS" panose="020B0603020202020204" pitchFamily="34" charset="0"/>
-      <p:regular r:id="rId27"/>
-      <p:bold r:id="rId28"/>
-      <p:italic r:id="rId29"/>
-      <p:boldItalic r:id="rId30"/>
+      <p:regular r:id="rId30"/>
+      <p:bold r:id="rId31"/>
+      <p:italic r:id="rId32"/>
+      <p:boldItalic r:id="rId33"/>
     </p:embeddedFont>
   </p:embeddedFontLst>
   <p:defaultTextStyle>
@@ -6742,7 +6745,7 @@
           <a:p>
             <a:fld id="{7CEEE0ED-A0F5-4442-9C94-5288E26FF1D3}" type="datetimeFigureOut">
               <a:rPr lang="fa-IR" smtClean="0"/>
-              <a:t>13/09/1444</a:t>
+              <a:t>14/09/1444</a:t>
             </a:fld>
             <a:endParaRPr lang="fa-IR"/>
           </a:p>
@@ -11221,7 +11224,7 @@
   <p:cSld>
     <p:spTree>
       <p:nvGrpSpPr>
-        <p:cNvPr id="1" name="Shape 96"/>
+        <p:cNvPr id="1" name=""/>
         <p:cNvGrpSpPr/>
         <p:nvPr/>
       </p:nvGrpSpPr>
@@ -11235,84 +11238,339 @@
       </p:grpSpPr>
       <p:sp>
         <p:nvSpPr>
-          <p:cNvPr id="97" name="Google Shape;97;p15"/>
-          <p:cNvSpPr txBox="1">
+          <p:cNvPr id="2" name="Title 1">
+            <a:extLst>
+              <a:ext uri="{FF2B5EF4-FFF2-40B4-BE49-F238E27FC236}">
+                <a16:creationId xmlns:a16="http://schemas.microsoft.com/office/drawing/2014/main" id="{024AD384-5AD1-4435-A943-1241B2FACD62}"/>
+              </a:ext>
+            </a:extLst>
+          </p:cNvPr>
+          <p:cNvSpPr>
             <a:spLocks noGrp="1"/>
           </p:cNvSpPr>
           <p:nvPr>
-            <p:ph type="ctrTitle"/>
+            <p:ph type="title"/>
+          </p:nvPr>
+        </p:nvSpPr>
+        <p:spPr/>
+        <p:txBody>
+          <a:bodyPr/>
+          <a:lstStyle/>
+          <a:p>
+            <a:r>
+              <a:rPr lang="en-US" sz="2400"/>
+              <a:t>Joins and Splits</a:t>
+            </a:r>
+            <a:endParaRPr lang="fa-IR"/>
+          </a:p>
+        </p:txBody>
+      </p:sp>
+      <p:sp>
+        <p:nvSpPr>
+          <p:cNvPr id="3" name="Text Placeholder 2">
+            <a:extLst>
+              <a:ext uri="{FF2B5EF4-FFF2-40B4-BE49-F238E27FC236}">
+                <a16:creationId xmlns:a16="http://schemas.microsoft.com/office/drawing/2014/main" id="{58BE3078-8B89-4550-B497-93E4DADBD57E}"/>
+              </a:ext>
+            </a:extLst>
+          </p:cNvPr>
+          <p:cNvSpPr>
+            <a:spLocks noGrp="1"/>
+          </p:cNvSpPr>
+          <p:nvPr>
+            <p:ph type="body" idx="1"/>
           </p:nvPr>
         </p:nvSpPr>
         <p:spPr>
           <a:xfrm>
-            <a:off x="1655700" y="1991850"/>
-            <a:ext cx="5832600" cy="1159800"/>
+            <a:off x="786150" y="1142608"/>
+            <a:ext cx="7571700" cy="3626431"/>
           </a:xfrm>
-          <a:prstGeom prst="rect">
-            <a:avLst/>
-          </a:prstGeom>
         </p:spPr>
         <p:txBody>
-          <a:bodyPr spcFirstLastPara="1" wrap="square" lIns="91425" tIns="91425" rIns="91425" bIns="91425" anchor="ctr" anchorCtr="0">
-            <a:noAutofit/>
-          </a:bodyPr>
+          <a:bodyPr/>
           <a:lstStyle/>
           <a:p>
-            <a:pPr marL="0" lvl="0" indent="0" algn="ctr" rtl="0">
-              <a:spcBef>
-                <a:spcPts val="0"/>
-              </a:spcBef>
-              <a:spcAft>
-                <a:spcPts val="0"/>
-              </a:spcAft>
+            <a:pPr marL="76200" indent="0">
               <a:buNone/>
             </a:pPr>
             <a:r>
-              <a:rPr lang="en-US" sz="6000">
+              <a:rPr lang="en-US" sz="1400"/>
+              <a:t>Joining arrays</a:t>
+            </a:r>
+          </a:p>
+          <a:p>
+            <a:pPr marL="76200" indent="0">
+              <a:buNone/>
+            </a:pPr>
+            <a:r>
+              <a:rPr lang="en-US" sz="1100">
+                <a:latin typeface="Consolas" panose="020B0609020204030204" pitchFamily="49" charset="0"/>
+              </a:rPr>
+              <a:t>arr1, arr2 = np.array([[1, 2], [3, 4]]), np.array([[5, 6], [7, 8]])</a:t>
+            </a:r>
+          </a:p>
+          <a:p>
+            <a:pPr marL="76200" indent="0">
+              <a:buNone/>
+            </a:pPr>
+            <a:r>
+              <a:rPr lang="en-US" sz="1100">
+                <a:latin typeface="Consolas" panose="020B0609020204030204" pitchFamily="49" charset="0"/>
+              </a:rPr>
+              <a:t>print(np.</a:t>
+            </a:r>
+            <a:r>
+              <a:rPr lang="en-US" sz="1100">
                 <a:solidFill>
-                  <a:srgbClr val="E6E6E6"/>
+                  <a:schemeClr val="accent1"/>
                 </a:solidFill>
+                <a:latin typeface="Consolas" panose="020B0609020204030204" pitchFamily="49" charset="0"/>
               </a:rPr>
-              <a:t>2</a:t>
-            </a:r>
-            <a:endParaRPr sz="6000">
-              <a:solidFill>
-                <a:srgbClr val="E6E6E6"/>
-              </a:solidFill>
+              <a:t>concatenate(</a:t>
+            </a:r>
+            <a:r>
+              <a:rPr lang="en-US" sz="1100">
+                <a:latin typeface="Consolas" panose="020B0609020204030204" pitchFamily="49" charset="0"/>
+              </a:rPr>
+              <a:t>(arr1, arr2)</a:t>
+            </a:r>
+            <a:r>
+              <a:rPr lang="en-US" sz="1100">
+                <a:solidFill>
+                  <a:schemeClr val="accent1"/>
+                </a:solidFill>
+                <a:latin typeface="Consolas" panose="020B0609020204030204" pitchFamily="49" charset="0"/>
+              </a:rPr>
+              <a:t>)</a:t>
+            </a:r>
+            <a:r>
+              <a:rPr lang="en-US" sz="1100">
+                <a:latin typeface="Consolas" panose="020B0609020204030204" pitchFamily="49" charset="0"/>
+              </a:rPr>
+              <a:t>)</a:t>
+            </a:r>
+          </a:p>
+          <a:p>
+            <a:pPr marL="76200" indent="0">
+              <a:buNone/>
+            </a:pPr>
+            <a:r>
+              <a:rPr lang="en-US" sz="1100">
+                <a:latin typeface="Consolas" panose="020B0609020204030204" pitchFamily="49" charset="0"/>
+              </a:rPr>
+              <a:t>print(np.concatenate((arr1, arr2), </a:t>
+            </a:r>
+            <a:r>
+              <a:rPr lang="en-US" sz="1100">
+                <a:solidFill>
+                  <a:schemeClr val="accent1"/>
+                </a:solidFill>
+                <a:latin typeface="Consolas" panose="020B0609020204030204" pitchFamily="49" charset="0"/>
+              </a:rPr>
+              <a:t>axis =</a:t>
+            </a:r>
+            <a:r>
+              <a:rPr lang="en-US" sz="1100">
+                <a:latin typeface="Consolas" panose="020B0609020204030204" pitchFamily="49" charset="0"/>
+              </a:rPr>
+              <a:t> 1))</a:t>
+            </a:r>
+          </a:p>
+          <a:p>
+            <a:pPr marL="76200" indent="0">
+              <a:buNone/>
+            </a:pPr>
+            <a:r>
+              <a:rPr lang="en-US" sz="1100">
+                <a:latin typeface="Consolas" panose="020B0609020204030204" pitchFamily="49" charset="0"/>
+              </a:rPr>
+              <a:t>print(np.</a:t>
+            </a:r>
+            <a:r>
+              <a:rPr lang="en-US" sz="1100">
+                <a:solidFill>
+                  <a:schemeClr val="accent1"/>
+                </a:solidFill>
+                <a:latin typeface="Consolas" panose="020B0609020204030204" pitchFamily="49" charset="0"/>
+              </a:rPr>
+              <a:t>stack(</a:t>
+            </a:r>
+            <a:r>
+              <a:rPr lang="en-US" sz="1100">
+                <a:latin typeface="Consolas" panose="020B0609020204030204" pitchFamily="49" charset="0"/>
+              </a:rPr>
+              <a:t>(arr1, arr2), axis = 1</a:t>
+            </a:r>
+            <a:r>
+              <a:rPr lang="en-US" sz="1100">
+                <a:solidFill>
+                  <a:schemeClr val="accent1"/>
+                </a:solidFill>
+                <a:latin typeface="Consolas" panose="020B0609020204030204" pitchFamily="49" charset="0"/>
+              </a:rPr>
+              <a:t>)</a:t>
+            </a:r>
+            <a:r>
+              <a:rPr lang="en-US" sz="1100">
+                <a:latin typeface="Consolas" panose="020B0609020204030204" pitchFamily="49" charset="0"/>
+              </a:rPr>
+              <a:t>)</a:t>
+            </a:r>
+          </a:p>
+          <a:p>
+            <a:pPr marL="76200" indent="0">
+              <a:buNone/>
+            </a:pPr>
+            <a:endParaRPr lang="en-US" sz="1100">
+              <a:latin typeface="Consolas" panose="020B0609020204030204" pitchFamily="49" charset="0"/>
             </a:endParaRPr>
           </a:p>
           <a:p>
-            <a:r>
-              <a:rPr lang="en-US" b="1"/>
-              <a:t>Pandas</a:t>
-            </a:r>
-            <a:endParaRPr/>
+            <a:pPr marL="76200" indent="0">
+              <a:buNone/>
+            </a:pPr>
+            <a:r>
+              <a:rPr lang="en-US" sz="1400"/>
+              <a:t>Splitting arrays</a:t>
+            </a:r>
+          </a:p>
+          <a:p>
+            <a:pPr marL="76200" indent="0">
+              <a:buNone/>
+            </a:pPr>
+            <a:r>
+              <a:rPr lang="en-US" sz="1100">
+                <a:latin typeface="Consolas" panose="020B0609020204030204" pitchFamily="49" charset="0"/>
+              </a:rPr>
+              <a:t>arr = np.array([[1, 2, 3, 4], [5, 6, 7, 8], [9, 10, 11, 12], [13, 14, 15, 16]])</a:t>
+            </a:r>
+          </a:p>
+          <a:p>
+            <a:pPr marL="76200" indent="0">
+              <a:buNone/>
+            </a:pPr>
+            <a:r>
+              <a:rPr lang="en-US" sz="1100">
+                <a:latin typeface="Consolas" panose="020B0609020204030204" pitchFamily="49" charset="0"/>
+              </a:rPr>
+              <a:t>print(np.</a:t>
+            </a:r>
+            <a:r>
+              <a:rPr lang="en-US" sz="1100">
+                <a:solidFill>
+                  <a:schemeClr val="accent1"/>
+                </a:solidFill>
+                <a:latin typeface="Consolas" panose="020B0609020204030204" pitchFamily="49" charset="0"/>
+              </a:rPr>
+              <a:t>array_split(</a:t>
+            </a:r>
+            <a:r>
+              <a:rPr lang="en-US" sz="1100">
+                <a:latin typeface="Consolas" panose="020B0609020204030204" pitchFamily="49" charset="0"/>
+              </a:rPr>
+              <a:t>arr, 2</a:t>
+            </a:r>
+            <a:r>
+              <a:rPr lang="en-US" sz="1100">
+                <a:solidFill>
+                  <a:schemeClr val="accent1"/>
+                </a:solidFill>
+                <a:latin typeface="Consolas" panose="020B0609020204030204" pitchFamily="49" charset="0"/>
+              </a:rPr>
+              <a:t>)</a:t>
+            </a:r>
+            <a:r>
+              <a:rPr lang="en-US" sz="1100">
+                <a:latin typeface="Consolas" panose="020B0609020204030204" pitchFamily="49" charset="0"/>
+              </a:rPr>
+              <a:t>)</a:t>
+            </a:r>
+          </a:p>
+          <a:p>
+            <a:pPr marL="76200" indent="0">
+              <a:buNone/>
+            </a:pPr>
+            <a:r>
+              <a:rPr lang="en-US" sz="1100">
+                <a:latin typeface="Consolas" panose="020B0609020204030204" pitchFamily="49" charset="0"/>
+              </a:rPr>
+              <a:t>print(np.array_split(arr, 3))</a:t>
+            </a:r>
+          </a:p>
+          <a:p>
+            <a:pPr marL="76200" indent="0">
+              <a:buNone/>
+            </a:pPr>
+            <a:r>
+              <a:rPr lang="en-US" sz="1100">
+                <a:latin typeface="Consolas" panose="020B0609020204030204" pitchFamily="49" charset="0"/>
+              </a:rPr>
+              <a:t>print(np.array_split(arr, 6))</a:t>
+            </a:r>
+          </a:p>
+          <a:p>
+            <a:pPr marL="76200" indent="0">
+              <a:buNone/>
+            </a:pPr>
+            <a:r>
+              <a:rPr lang="en-US" sz="1100">
+                <a:latin typeface="Consolas" panose="020B0609020204030204" pitchFamily="49" charset="0"/>
+              </a:rPr>
+              <a:t>print(np.array_split(arr, 2, </a:t>
+            </a:r>
+            <a:r>
+              <a:rPr lang="en-US" sz="1100">
+                <a:solidFill>
+                  <a:schemeClr val="accent1"/>
+                </a:solidFill>
+                <a:latin typeface="Consolas" panose="020B0609020204030204" pitchFamily="49" charset="0"/>
+              </a:rPr>
+              <a:t>axis</a:t>
+            </a:r>
+            <a:r>
+              <a:rPr lang="en-US" sz="1100">
+                <a:latin typeface="Consolas" panose="020B0609020204030204" pitchFamily="49" charset="0"/>
+              </a:rPr>
+              <a:t> </a:t>
+            </a:r>
+            <a:r>
+              <a:rPr lang="en-US" sz="1100">
+                <a:solidFill>
+                  <a:schemeClr val="accent1"/>
+                </a:solidFill>
+                <a:latin typeface="Consolas" panose="020B0609020204030204" pitchFamily="49" charset="0"/>
+              </a:rPr>
+              <a:t>=</a:t>
+            </a:r>
+            <a:r>
+              <a:rPr lang="en-US" sz="1100">
+                <a:latin typeface="Consolas" panose="020B0609020204030204" pitchFamily="49" charset="0"/>
+              </a:rPr>
+              <a:t> 1))</a:t>
+            </a:r>
           </a:p>
         </p:txBody>
       </p:sp>
       <p:sp>
         <p:nvSpPr>
-          <p:cNvPr id="99" name="Google Shape;99;p15"/>
-          <p:cNvSpPr txBox="1">
+          <p:cNvPr id="4" name="Slide Number Placeholder 3">
+            <a:extLst>
+              <a:ext uri="{FF2B5EF4-FFF2-40B4-BE49-F238E27FC236}">
+                <a16:creationId xmlns:a16="http://schemas.microsoft.com/office/drawing/2014/main" id="{64987AE6-EC0E-43DD-9376-95A5602EE5E1}"/>
+              </a:ext>
+            </a:extLst>
+          </p:cNvPr>
+          <p:cNvSpPr>
             <a:spLocks noGrp="1"/>
           </p:cNvSpPr>
           <p:nvPr>
-            <p:ph type="sldNum" idx="4294967295"/>
+            <p:ph type="sldNum" idx="12"/>
           </p:nvPr>
         </p:nvSpPr>
-        <p:spPr>
-          <a:xfrm>
-            <a:off x="8404384" y="4749851"/>
-            <a:ext cx="548700" cy="393600"/>
-          </a:xfrm>
-          <a:prstGeom prst="rect">
-            <a:avLst/>
-          </a:prstGeom>
-        </p:spPr>
+        <p:spPr/>
         <p:txBody>
-          <a:bodyPr spcFirstLastPara="1" wrap="square" lIns="91425" tIns="91425" rIns="91425" bIns="91425" anchor="t" anchorCtr="0">
-            <a:noAutofit/>
-          </a:bodyPr>
+          <a:bodyPr/>
           <a:lstStyle/>
           <a:p>
             <a:pPr marL="0" lvl="0" indent="0" algn="r" rtl="0">
@@ -11325,17 +11583,17 @@
               <a:buNone/>
             </a:pPr>
             <a:fld id="{00000000-1234-1234-1234-123412341234}" type="slidenum">
-              <a:rPr lang="en"/>
+              <a:rPr lang="en" smtClean="0"/>
               <a:t>10</a:t>
             </a:fld>
-            <a:endParaRPr/>
+            <a:endParaRPr lang="en"/>
           </a:p>
         </p:txBody>
       </p:sp>
     </p:spTree>
     <p:extLst>
       <p:ext uri="{BB962C8B-B14F-4D97-AF65-F5344CB8AC3E}">
-        <p14:creationId xmlns:p14="http://schemas.microsoft.com/office/powerpoint/2010/main" val="445305485"/>
+        <p14:creationId xmlns:p14="http://schemas.microsoft.com/office/powerpoint/2010/main" val="390768587"/>
       </p:ext>
     </p:extLst>
   </p:cSld>
@@ -11346,6 +11604,536 @@
 </file>
 
 <file path=ppt/slides/slide11.xml><?xml version="1.0" encoding="utf-8"?>
+<p:sld xmlns:a="http://schemas.openxmlformats.org/drawingml/2006/main" xmlns:r="http://schemas.openxmlformats.org/officeDocument/2006/relationships" xmlns:p="http://schemas.openxmlformats.org/presentationml/2006/main">
+  <p:cSld>
+    <p:spTree>
+      <p:nvGrpSpPr>
+        <p:cNvPr id="1" name=""/>
+        <p:cNvGrpSpPr/>
+        <p:nvPr/>
+      </p:nvGrpSpPr>
+      <p:grpSpPr>
+        <a:xfrm>
+          <a:off x="0" y="0"/>
+          <a:ext cx="0" cy="0"/>
+          <a:chOff x="0" y="0"/>
+          <a:chExt cx="0" cy="0"/>
+        </a:xfrm>
+      </p:grpSpPr>
+      <p:sp>
+        <p:nvSpPr>
+          <p:cNvPr id="2" name="Title 1">
+            <a:extLst>
+              <a:ext uri="{FF2B5EF4-FFF2-40B4-BE49-F238E27FC236}">
+                <a16:creationId xmlns:a16="http://schemas.microsoft.com/office/drawing/2014/main" id="{024AD384-5AD1-4435-A943-1241B2FACD62}"/>
+              </a:ext>
+            </a:extLst>
+          </p:cNvPr>
+          <p:cNvSpPr>
+            <a:spLocks noGrp="1"/>
+          </p:cNvSpPr>
+          <p:nvPr>
+            <p:ph type="title"/>
+          </p:nvPr>
+        </p:nvSpPr>
+        <p:spPr/>
+        <p:txBody>
+          <a:bodyPr/>
+          <a:lstStyle/>
+          <a:p>
+            <a:r>
+              <a:rPr lang="en-US" sz="2400"/>
+              <a:t>Search and Filter</a:t>
+            </a:r>
+            <a:endParaRPr lang="fa-IR"/>
+          </a:p>
+        </p:txBody>
+      </p:sp>
+      <p:sp>
+        <p:nvSpPr>
+          <p:cNvPr id="3" name="Text Placeholder 2">
+            <a:extLst>
+              <a:ext uri="{FF2B5EF4-FFF2-40B4-BE49-F238E27FC236}">
+                <a16:creationId xmlns:a16="http://schemas.microsoft.com/office/drawing/2014/main" id="{58BE3078-8B89-4550-B497-93E4DADBD57E}"/>
+              </a:ext>
+            </a:extLst>
+          </p:cNvPr>
+          <p:cNvSpPr>
+            <a:spLocks noGrp="1"/>
+          </p:cNvSpPr>
+          <p:nvPr>
+            <p:ph type="body" idx="1"/>
+          </p:nvPr>
+        </p:nvSpPr>
+        <p:spPr>
+          <a:xfrm>
+            <a:off x="786150" y="1142608"/>
+            <a:ext cx="7571700" cy="3626431"/>
+          </a:xfrm>
+        </p:spPr>
+        <p:txBody>
+          <a:bodyPr/>
+          <a:lstStyle/>
+          <a:p>
+            <a:pPr marL="76200" indent="0">
+              <a:buNone/>
+            </a:pPr>
+            <a:r>
+              <a:rPr lang="en-US" sz="1400"/>
+              <a:t>Searching arrays</a:t>
+            </a:r>
+          </a:p>
+          <a:p>
+            <a:pPr marL="76200" indent="0">
+              <a:buNone/>
+            </a:pPr>
+            <a:r>
+              <a:rPr lang="en-US" sz="1100">
+                <a:latin typeface="Consolas" panose="020B0609020204030204" pitchFamily="49" charset="0"/>
+              </a:rPr>
+              <a:t>arr = np.array([[1, 3], [2, 4], [6, 4], [4, 0]])</a:t>
+            </a:r>
+          </a:p>
+          <a:p>
+            <a:pPr marL="76200" indent="0">
+              <a:buNone/>
+            </a:pPr>
+            <a:r>
+              <a:rPr lang="en-US" sz="1100">
+                <a:latin typeface="Consolas" panose="020B0609020204030204" pitchFamily="49" charset="0"/>
+              </a:rPr>
+              <a:t>print(np.</a:t>
+            </a:r>
+            <a:r>
+              <a:rPr lang="en-US" sz="1100">
+                <a:solidFill>
+                  <a:schemeClr val="accent1"/>
+                </a:solidFill>
+                <a:latin typeface="Consolas" panose="020B0609020204030204" pitchFamily="49" charset="0"/>
+              </a:rPr>
+              <a:t>where(</a:t>
+            </a:r>
+            <a:r>
+              <a:rPr lang="en-US" sz="1100">
+                <a:latin typeface="Consolas" panose="020B0609020204030204" pitchFamily="49" charset="0"/>
+              </a:rPr>
+              <a:t>arr == 4</a:t>
+            </a:r>
+            <a:r>
+              <a:rPr lang="en-US" sz="1100">
+                <a:solidFill>
+                  <a:schemeClr val="accent1"/>
+                </a:solidFill>
+                <a:latin typeface="Consolas" panose="020B0609020204030204" pitchFamily="49" charset="0"/>
+              </a:rPr>
+              <a:t>)</a:t>
+            </a:r>
+            <a:r>
+              <a:rPr lang="en-US" sz="1100">
+                <a:latin typeface="Consolas" panose="020B0609020204030204" pitchFamily="49" charset="0"/>
+              </a:rPr>
+              <a:t>)</a:t>
+            </a:r>
+          </a:p>
+          <a:p>
+            <a:pPr marL="76200" indent="0">
+              <a:buNone/>
+            </a:pPr>
+            <a:r>
+              <a:rPr lang="en-US" sz="1100">
+                <a:latin typeface="Consolas" panose="020B0609020204030204" pitchFamily="49" charset="0"/>
+              </a:rPr>
+              <a:t>print(np.where(arr % 2 == 0))</a:t>
+            </a:r>
+          </a:p>
+          <a:p>
+            <a:pPr marL="76200" indent="0">
+              <a:buNone/>
+            </a:pPr>
+            <a:endParaRPr lang="en-US" sz="1100">
+              <a:latin typeface="Consolas" panose="020B0609020204030204" pitchFamily="49" charset="0"/>
+            </a:endParaRPr>
+          </a:p>
+          <a:p>
+            <a:pPr marL="76200" indent="0">
+              <a:buNone/>
+            </a:pPr>
+            <a:r>
+              <a:rPr lang="en-US" sz="1400"/>
+              <a:t>Filtering arrays</a:t>
+            </a:r>
+          </a:p>
+          <a:p>
+            <a:pPr marL="76200" indent="0">
+              <a:buNone/>
+            </a:pPr>
+            <a:r>
+              <a:rPr lang="en-US" sz="1100">
+                <a:latin typeface="Consolas" panose="020B0609020204030204" pitchFamily="49" charset="0"/>
+              </a:rPr>
+              <a:t>arr = np.array([1, 3, 2, 4, 6, 4, 4, 0])</a:t>
+            </a:r>
+          </a:p>
+          <a:p>
+            <a:pPr marL="76200" indent="0">
+              <a:buNone/>
+            </a:pPr>
+            <a:r>
+              <a:rPr lang="en-US" sz="1100">
+                <a:latin typeface="Consolas" panose="020B0609020204030204" pitchFamily="49" charset="0"/>
+              </a:rPr>
+              <a:t>print(arr</a:t>
+            </a:r>
+            <a:r>
+              <a:rPr lang="en-US" sz="1100">
+                <a:solidFill>
+                  <a:schemeClr val="accent1"/>
+                </a:solidFill>
+                <a:latin typeface="Consolas" panose="020B0609020204030204" pitchFamily="49" charset="0"/>
+              </a:rPr>
+              <a:t>[</a:t>
+            </a:r>
+            <a:r>
+              <a:rPr lang="en-US" sz="1100">
+                <a:latin typeface="Consolas" panose="020B0609020204030204" pitchFamily="49" charset="0"/>
+              </a:rPr>
+              <a:t>arr % 2 == 0</a:t>
+            </a:r>
+            <a:r>
+              <a:rPr lang="en-US" sz="1100">
+                <a:solidFill>
+                  <a:schemeClr val="accent1"/>
+                </a:solidFill>
+                <a:latin typeface="Consolas" panose="020B0609020204030204" pitchFamily="49" charset="0"/>
+              </a:rPr>
+              <a:t>]</a:t>
+            </a:r>
+            <a:r>
+              <a:rPr lang="en-US" sz="1100">
+                <a:latin typeface="Consolas" panose="020B0609020204030204" pitchFamily="49" charset="0"/>
+              </a:rPr>
+              <a:t>)</a:t>
+            </a:r>
+          </a:p>
+        </p:txBody>
+      </p:sp>
+      <p:sp>
+        <p:nvSpPr>
+          <p:cNvPr id="4" name="Slide Number Placeholder 3">
+            <a:extLst>
+              <a:ext uri="{FF2B5EF4-FFF2-40B4-BE49-F238E27FC236}">
+                <a16:creationId xmlns:a16="http://schemas.microsoft.com/office/drawing/2014/main" id="{64987AE6-EC0E-43DD-9376-95A5602EE5E1}"/>
+              </a:ext>
+            </a:extLst>
+          </p:cNvPr>
+          <p:cNvSpPr>
+            <a:spLocks noGrp="1"/>
+          </p:cNvSpPr>
+          <p:nvPr>
+            <p:ph type="sldNum" idx="12"/>
+          </p:nvPr>
+        </p:nvSpPr>
+        <p:spPr/>
+        <p:txBody>
+          <a:bodyPr/>
+          <a:lstStyle/>
+          <a:p>
+            <a:pPr marL="0" lvl="0" indent="0" algn="r" rtl="0">
+              <a:spcBef>
+                <a:spcPts val="0"/>
+              </a:spcBef>
+              <a:spcAft>
+                <a:spcPts val="0"/>
+              </a:spcAft>
+              <a:buNone/>
+            </a:pPr>
+            <a:fld id="{00000000-1234-1234-1234-123412341234}" type="slidenum">
+              <a:rPr lang="en" smtClean="0"/>
+              <a:t>11</a:t>
+            </a:fld>
+            <a:endParaRPr lang="en"/>
+          </a:p>
+        </p:txBody>
+      </p:sp>
+    </p:spTree>
+    <p:extLst>
+      <p:ext uri="{BB962C8B-B14F-4D97-AF65-F5344CB8AC3E}">
+        <p14:creationId xmlns:p14="http://schemas.microsoft.com/office/powerpoint/2010/main" val="1557836894"/>
+      </p:ext>
+    </p:extLst>
+  </p:cSld>
+  <p:clrMapOvr>
+    <a:masterClrMapping/>
+  </p:clrMapOvr>
+</p:sld>
+</file>
+
+<file path=ppt/slides/slide12.xml><?xml version="1.0" encoding="utf-8"?>
+<p:sld xmlns:a="http://schemas.openxmlformats.org/drawingml/2006/main" xmlns:r="http://schemas.openxmlformats.org/officeDocument/2006/relationships" xmlns:p="http://schemas.openxmlformats.org/presentationml/2006/main">
+  <p:cSld>
+    <p:spTree>
+      <p:nvGrpSpPr>
+        <p:cNvPr id="1" name=""/>
+        <p:cNvGrpSpPr/>
+        <p:nvPr/>
+      </p:nvGrpSpPr>
+      <p:grpSpPr>
+        <a:xfrm>
+          <a:off x="0" y="0"/>
+          <a:ext cx="0" cy="0"/>
+          <a:chOff x="0" y="0"/>
+          <a:chExt cx="0" cy="0"/>
+        </a:xfrm>
+      </p:grpSpPr>
+      <p:sp>
+        <p:nvSpPr>
+          <p:cNvPr id="2" name="Title 1">
+            <a:extLst>
+              <a:ext uri="{FF2B5EF4-FFF2-40B4-BE49-F238E27FC236}">
+                <a16:creationId xmlns:a16="http://schemas.microsoft.com/office/drawing/2014/main" id="{024AD384-5AD1-4435-A943-1241B2FACD62}"/>
+              </a:ext>
+            </a:extLst>
+          </p:cNvPr>
+          <p:cNvSpPr>
+            <a:spLocks noGrp="1"/>
+          </p:cNvSpPr>
+          <p:nvPr>
+            <p:ph type="title"/>
+          </p:nvPr>
+        </p:nvSpPr>
+        <p:spPr/>
+        <p:txBody>
+          <a:bodyPr/>
+          <a:lstStyle/>
+          <a:p>
+            <a:r>
+              <a:rPr lang="en-US" sz="2400"/>
+              <a:t>Sort</a:t>
+            </a:r>
+            <a:endParaRPr lang="fa-IR"/>
+          </a:p>
+        </p:txBody>
+      </p:sp>
+      <p:sp>
+        <p:nvSpPr>
+          <p:cNvPr id="3" name="Text Placeholder 2">
+            <a:extLst>
+              <a:ext uri="{FF2B5EF4-FFF2-40B4-BE49-F238E27FC236}">
+                <a16:creationId xmlns:a16="http://schemas.microsoft.com/office/drawing/2014/main" id="{58BE3078-8B89-4550-B497-93E4DADBD57E}"/>
+              </a:ext>
+            </a:extLst>
+          </p:cNvPr>
+          <p:cNvSpPr>
+            <a:spLocks noGrp="1"/>
+          </p:cNvSpPr>
+          <p:nvPr>
+            <p:ph type="body" idx="1"/>
+          </p:nvPr>
+        </p:nvSpPr>
+        <p:spPr>
+          <a:xfrm>
+            <a:off x="786150" y="1142608"/>
+            <a:ext cx="7571700" cy="3626431"/>
+          </a:xfrm>
+        </p:spPr>
+        <p:txBody>
+          <a:bodyPr/>
+          <a:lstStyle/>
+          <a:p>
+            <a:pPr marL="76200" indent="0">
+              <a:buNone/>
+            </a:pPr>
+            <a:r>
+              <a:rPr lang="en-US" sz="1400"/>
+              <a:t>Sorting arrays</a:t>
+            </a:r>
+          </a:p>
+          <a:p>
+            <a:pPr marL="76200" indent="0">
+              <a:buNone/>
+            </a:pPr>
+            <a:r>
+              <a:rPr lang="en-US" sz="1100">
+                <a:latin typeface="Consolas" panose="020B0609020204030204" pitchFamily="49" charset="0"/>
+              </a:rPr>
+              <a:t>arr = np.array([[1, 3], [2, 4], [6, 4], [4, 0]])</a:t>
+            </a:r>
+          </a:p>
+          <a:p>
+            <a:pPr marL="76200" indent="0">
+              <a:buNone/>
+            </a:pPr>
+            <a:r>
+              <a:rPr lang="en-US" sz="1100">
+                <a:latin typeface="Consolas" panose="020B0609020204030204" pitchFamily="49" charset="0"/>
+              </a:rPr>
+              <a:t>print(np.</a:t>
+            </a:r>
+            <a:r>
+              <a:rPr lang="en-US" sz="1100">
+                <a:solidFill>
+                  <a:schemeClr val="accent1"/>
+                </a:solidFill>
+                <a:latin typeface="Consolas" panose="020B0609020204030204" pitchFamily="49" charset="0"/>
+              </a:rPr>
+              <a:t>sort(</a:t>
+            </a:r>
+            <a:r>
+              <a:rPr lang="en-US" sz="1100">
+                <a:latin typeface="Consolas" panose="020B0609020204030204" pitchFamily="49" charset="0"/>
+              </a:rPr>
+              <a:t>arr</a:t>
+            </a:r>
+            <a:r>
+              <a:rPr lang="en-US" sz="1100">
+                <a:solidFill>
+                  <a:schemeClr val="accent1"/>
+                </a:solidFill>
+                <a:latin typeface="Consolas" panose="020B0609020204030204" pitchFamily="49" charset="0"/>
+              </a:rPr>
+              <a:t>)</a:t>
+            </a:r>
+            <a:r>
+              <a:rPr lang="en-US" sz="1100">
+                <a:latin typeface="Consolas" panose="020B0609020204030204" pitchFamily="49" charset="0"/>
+              </a:rPr>
+              <a:t>)</a:t>
+            </a:r>
+          </a:p>
+          <a:p>
+            <a:pPr marL="76200" indent="0">
+              <a:buNone/>
+            </a:pPr>
+            <a:endParaRPr lang="en-US" sz="1100">
+              <a:latin typeface="Consolas" panose="020B0609020204030204" pitchFamily="49" charset="0"/>
+            </a:endParaRPr>
+          </a:p>
+          <a:p>
+            <a:pPr marL="76200" indent="0">
+              <a:buNone/>
+            </a:pPr>
+            <a:r>
+              <a:rPr lang="en-US" sz="1400"/>
+              <a:t>Search Sorted</a:t>
+            </a:r>
+          </a:p>
+          <a:p>
+            <a:pPr marL="76200" indent="0">
+              <a:buNone/>
+            </a:pPr>
+            <a:r>
+              <a:rPr lang="en-US" sz="1100">
+                <a:latin typeface="Consolas" panose="020B0609020204030204" pitchFamily="49" charset="0"/>
+              </a:rPr>
+              <a:t>arr = np.array([1, 3, 2, 4, 6, 4, 4, 0])</a:t>
+            </a:r>
+          </a:p>
+          <a:p>
+            <a:pPr marL="76200" indent="0">
+              <a:buNone/>
+            </a:pPr>
+            <a:r>
+              <a:rPr lang="en-US" sz="1100">
+                <a:latin typeface="Consolas" panose="020B0609020204030204" pitchFamily="49" charset="0"/>
+              </a:rPr>
+              <a:t>print(np.</a:t>
+            </a:r>
+            <a:r>
+              <a:rPr lang="en-US" sz="1100">
+                <a:solidFill>
+                  <a:schemeClr val="accent1"/>
+                </a:solidFill>
+                <a:latin typeface="Consolas" panose="020B0609020204030204" pitchFamily="49" charset="0"/>
+              </a:rPr>
+              <a:t>searchsorted(</a:t>
+            </a:r>
+            <a:r>
+              <a:rPr lang="en-US" sz="1100">
+                <a:latin typeface="Consolas" panose="020B0609020204030204" pitchFamily="49" charset="0"/>
+              </a:rPr>
+              <a:t>arr, 3</a:t>
+            </a:r>
+            <a:r>
+              <a:rPr lang="en-US" sz="1100">
+                <a:solidFill>
+                  <a:schemeClr val="accent1"/>
+                </a:solidFill>
+                <a:latin typeface="Consolas" panose="020B0609020204030204" pitchFamily="49" charset="0"/>
+              </a:rPr>
+              <a:t>)</a:t>
+            </a:r>
+            <a:r>
+              <a:rPr lang="en-US" sz="1100">
+                <a:latin typeface="Consolas" panose="020B0609020204030204" pitchFamily="49" charset="0"/>
+              </a:rPr>
+              <a:t>)</a:t>
+            </a:r>
+          </a:p>
+          <a:p>
+            <a:pPr marL="76200" indent="0">
+              <a:buNone/>
+            </a:pPr>
+            <a:r>
+              <a:rPr lang="en-US" sz="1100">
+                <a:latin typeface="Consolas" panose="020B0609020204030204" pitchFamily="49" charset="0"/>
+              </a:rPr>
+              <a:t>print(np.searchsorted(arr, 5))</a:t>
+            </a:r>
+          </a:p>
+        </p:txBody>
+      </p:sp>
+      <p:sp>
+        <p:nvSpPr>
+          <p:cNvPr id="4" name="Slide Number Placeholder 3">
+            <a:extLst>
+              <a:ext uri="{FF2B5EF4-FFF2-40B4-BE49-F238E27FC236}">
+                <a16:creationId xmlns:a16="http://schemas.microsoft.com/office/drawing/2014/main" id="{64987AE6-EC0E-43DD-9376-95A5602EE5E1}"/>
+              </a:ext>
+            </a:extLst>
+          </p:cNvPr>
+          <p:cNvSpPr>
+            <a:spLocks noGrp="1"/>
+          </p:cNvSpPr>
+          <p:nvPr>
+            <p:ph type="sldNum" idx="12"/>
+          </p:nvPr>
+        </p:nvSpPr>
+        <p:spPr/>
+        <p:txBody>
+          <a:bodyPr/>
+          <a:lstStyle/>
+          <a:p>
+            <a:pPr marL="0" lvl="0" indent="0" algn="r" rtl="0">
+              <a:spcBef>
+                <a:spcPts val="0"/>
+              </a:spcBef>
+              <a:spcAft>
+                <a:spcPts val="0"/>
+              </a:spcAft>
+              <a:buNone/>
+            </a:pPr>
+            <a:fld id="{00000000-1234-1234-1234-123412341234}" type="slidenum">
+              <a:rPr lang="en" smtClean="0"/>
+              <a:t>12</a:t>
+            </a:fld>
+            <a:endParaRPr lang="en"/>
+          </a:p>
+        </p:txBody>
+      </p:sp>
+    </p:spTree>
+    <p:extLst>
+      <p:ext uri="{BB962C8B-B14F-4D97-AF65-F5344CB8AC3E}">
+        <p14:creationId xmlns:p14="http://schemas.microsoft.com/office/powerpoint/2010/main" val="133725986"/>
+      </p:ext>
+    </p:extLst>
+  </p:cSld>
+  <p:clrMapOvr>
+    <a:masterClrMapping/>
+  </p:clrMapOvr>
+</p:sld>
+</file>
+
+<file path=ppt/slides/slide13.xml><?xml version="1.0" encoding="utf-8"?>
 <p:sld xmlns:a="http://schemas.openxmlformats.org/drawingml/2006/main" xmlns:r="http://schemas.openxmlformats.org/officeDocument/2006/relationships" xmlns:p="http://schemas.openxmlformats.org/presentationml/2006/main">
   <p:cSld>
     <p:spTree>
@@ -11402,7 +12190,7 @@
                   <a:srgbClr val="E6E6E6"/>
                 </a:solidFill>
               </a:rPr>
-              <a:t>3</a:t>
+              <a:t>2</a:t>
             </a:r>
             <a:endParaRPr sz="6000">
               <a:solidFill>
@@ -11412,8 +12200,8 @@
           </a:p>
           <a:p>
             <a:r>
-              <a:rPr lang="en"/>
-              <a:t>Matplotlib</a:t>
+              <a:rPr lang="en-US" b="1"/>
+              <a:t>Pandas</a:t>
             </a:r>
             <a:endParaRPr/>
           </a:p>
@@ -11455,7 +12243,7 @@
             </a:pPr>
             <a:fld id="{00000000-1234-1234-1234-123412341234}" type="slidenum">
               <a:rPr lang="en"/>
-              <a:t>11</a:t>
+              <a:t>13</a:t>
             </a:fld>
             <a:endParaRPr/>
           </a:p>
@@ -11464,7 +12252,7 @@
     </p:spTree>
     <p:extLst>
       <p:ext uri="{BB962C8B-B14F-4D97-AF65-F5344CB8AC3E}">
-        <p14:creationId xmlns:p14="http://schemas.microsoft.com/office/powerpoint/2010/main" val="550571345"/>
+        <p14:creationId xmlns:p14="http://schemas.microsoft.com/office/powerpoint/2010/main" val="445305485"/>
       </p:ext>
     </p:extLst>
   </p:cSld>
@@ -11474,7 +12262,7 @@
 </p:sld>
 </file>
 
-<file path=ppt/slides/slide12.xml><?xml version="1.0" encoding="utf-8"?>
+<file path=ppt/slides/slide14.xml><?xml version="1.0" encoding="utf-8"?>
 <p:sld xmlns:a="http://schemas.openxmlformats.org/drawingml/2006/main" xmlns:r="http://schemas.openxmlformats.org/officeDocument/2006/relationships" xmlns:p="http://schemas.openxmlformats.org/presentationml/2006/main">
   <p:cSld>
     <p:spTree>
@@ -11531,7 +12319,7 @@
                   <a:srgbClr val="E6E6E6"/>
                 </a:solidFill>
               </a:rPr>
-              <a:t>4</a:t>
+              <a:t>3</a:t>
             </a:r>
             <a:endParaRPr sz="6000">
               <a:solidFill>
@@ -11541,8 +12329,8 @@
           </a:p>
           <a:p>
             <a:r>
-              <a:rPr lang="en-US"/>
-              <a:t>Scikit-learn</a:t>
+              <a:rPr lang="en"/>
+              <a:t>Matplotlib</a:t>
             </a:r>
             <a:endParaRPr/>
           </a:p>
@@ -11584,7 +12372,136 @@
             </a:pPr>
             <a:fld id="{00000000-1234-1234-1234-123412341234}" type="slidenum">
               <a:rPr lang="en"/>
-              <a:t>12</a:t>
+              <a:t>14</a:t>
+            </a:fld>
+            <a:endParaRPr/>
+          </a:p>
+        </p:txBody>
+      </p:sp>
+    </p:spTree>
+    <p:extLst>
+      <p:ext uri="{BB962C8B-B14F-4D97-AF65-F5344CB8AC3E}">
+        <p14:creationId xmlns:p14="http://schemas.microsoft.com/office/powerpoint/2010/main" val="550571345"/>
+      </p:ext>
+    </p:extLst>
+  </p:cSld>
+  <p:clrMapOvr>
+    <a:masterClrMapping/>
+  </p:clrMapOvr>
+</p:sld>
+</file>
+
+<file path=ppt/slides/slide15.xml><?xml version="1.0" encoding="utf-8"?>
+<p:sld xmlns:a="http://schemas.openxmlformats.org/drawingml/2006/main" xmlns:r="http://schemas.openxmlformats.org/officeDocument/2006/relationships" xmlns:p="http://schemas.openxmlformats.org/presentationml/2006/main">
+  <p:cSld>
+    <p:spTree>
+      <p:nvGrpSpPr>
+        <p:cNvPr id="1" name="Shape 96"/>
+        <p:cNvGrpSpPr/>
+        <p:nvPr/>
+      </p:nvGrpSpPr>
+      <p:grpSpPr>
+        <a:xfrm>
+          <a:off x="0" y="0"/>
+          <a:ext cx="0" cy="0"/>
+          <a:chOff x="0" y="0"/>
+          <a:chExt cx="0" cy="0"/>
+        </a:xfrm>
+      </p:grpSpPr>
+      <p:sp>
+        <p:nvSpPr>
+          <p:cNvPr id="97" name="Google Shape;97;p15"/>
+          <p:cNvSpPr txBox="1">
+            <a:spLocks noGrp="1"/>
+          </p:cNvSpPr>
+          <p:nvPr>
+            <p:ph type="ctrTitle"/>
+          </p:nvPr>
+        </p:nvSpPr>
+        <p:spPr>
+          <a:xfrm>
+            <a:off x="1655700" y="1991850"/>
+            <a:ext cx="5832600" cy="1159800"/>
+          </a:xfrm>
+          <a:prstGeom prst="rect">
+            <a:avLst/>
+          </a:prstGeom>
+        </p:spPr>
+        <p:txBody>
+          <a:bodyPr spcFirstLastPara="1" wrap="square" lIns="91425" tIns="91425" rIns="91425" bIns="91425" anchor="ctr" anchorCtr="0">
+            <a:noAutofit/>
+          </a:bodyPr>
+          <a:lstStyle/>
+          <a:p>
+            <a:pPr marL="0" lvl="0" indent="0" algn="ctr" rtl="0">
+              <a:spcBef>
+                <a:spcPts val="0"/>
+              </a:spcBef>
+              <a:spcAft>
+                <a:spcPts val="0"/>
+              </a:spcAft>
+              <a:buNone/>
+            </a:pPr>
+            <a:r>
+              <a:rPr lang="en-US" sz="6000">
+                <a:solidFill>
+                  <a:srgbClr val="E6E6E6"/>
+                </a:solidFill>
+              </a:rPr>
+              <a:t>4</a:t>
+            </a:r>
+            <a:endParaRPr sz="6000">
+              <a:solidFill>
+                <a:srgbClr val="E6E6E6"/>
+              </a:solidFill>
+            </a:endParaRPr>
+          </a:p>
+          <a:p>
+            <a:r>
+              <a:rPr lang="en-US"/>
+              <a:t>Scikit-learn</a:t>
+            </a:r>
+            <a:endParaRPr/>
+          </a:p>
+        </p:txBody>
+      </p:sp>
+      <p:sp>
+        <p:nvSpPr>
+          <p:cNvPr id="99" name="Google Shape;99;p15"/>
+          <p:cNvSpPr txBox="1">
+            <a:spLocks noGrp="1"/>
+          </p:cNvSpPr>
+          <p:nvPr>
+            <p:ph type="sldNum" idx="4294967295"/>
+          </p:nvPr>
+        </p:nvSpPr>
+        <p:spPr>
+          <a:xfrm>
+            <a:off x="8404384" y="4749851"/>
+            <a:ext cx="548700" cy="393600"/>
+          </a:xfrm>
+          <a:prstGeom prst="rect">
+            <a:avLst/>
+          </a:prstGeom>
+        </p:spPr>
+        <p:txBody>
+          <a:bodyPr spcFirstLastPara="1" wrap="square" lIns="91425" tIns="91425" rIns="91425" bIns="91425" anchor="t" anchorCtr="0">
+            <a:noAutofit/>
+          </a:bodyPr>
+          <a:lstStyle/>
+          <a:p>
+            <a:pPr marL="0" lvl="0" indent="0" algn="r" rtl="0">
+              <a:spcBef>
+                <a:spcPts val="0"/>
+              </a:spcBef>
+              <a:spcAft>
+                <a:spcPts val="0"/>
+              </a:spcAft>
+              <a:buNone/>
+            </a:pPr>
+            <a:fld id="{00000000-1234-1234-1234-123412341234}" type="slidenum">
+              <a:rPr lang="en"/>
+              <a:t>15</a:t>
             </a:fld>
             <a:endParaRPr/>
           </a:p>
@@ -11603,7 +12520,7 @@
 </p:sld>
 </file>
 
-<file path=ppt/slides/slide13.xml><?xml version="1.0" encoding="utf-8"?>
+<file path=ppt/slides/slide16.xml><?xml version="1.0" encoding="utf-8"?>
 <p:sld xmlns:a="http://schemas.openxmlformats.org/drawingml/2006/main" xmlns:r="http://schemas.openxmlformats.org/officeDocument/2006/relationships" xmlns:p="http://schemas.openxmlformats.org/presentationml/2006/main">
   <p:cSld>
     <p:spTree>
@@ -11856,7 +12773,7 @@
             </a:pPr>
             <a:fld id="{00000000-1234-1234-1234-123412341234}" type="slidenum">
               <a:rPr lang="en"/>
-              <a:t>13</a:t>
+              <a:t>16</a:t>
             </a:fld>
             <a:endParaRPr/>
           </a:p>
@@ -13637,7 +14554,7 @@
           <a:p>
             <a:r>
               <a:rPr lang="en-US" sz="2400"/>
-              <a:t>Iterating</a:t>
+              <a:t>Loops</a:t>
             </a:r>
             <a:endParaRPr lang="fa-IR"/>
           </a:p>
@@ -13674,7 +14591,7 @@
             </a:pPr>
             <a:r>
               <a:rPr lang="en-US" sz="1400"/>
-              <a:t>Iterating Arrays</a:t>
+              <a:t>Iterating arrays</a:t>
             </a:r>
           </a:p>
           <a:p>
@@ -13718,7 +14635,7 @@
               <a:rPr lang="en-US" sz="1100">
                 <a:latin typeface="Consolas" panose="020B0609020204030204" pitchFamily="49" charset="0"/>
               </a:rPr>
-              <a:t>for x in np</a:t>
+              <a:t>for x in np.</a:t>
             </a:r>
             <a:r>
               <a:rPr lang="en-US" sz="1100">
@@ -13727,7 +14644,7 @@
                 </a:solidFill>
                 <a:latin typeface="Consolas" panose="020B0609020204030204" pitchFamily="49" charset="0"/>
               </a:rPr>
-              <a:t>.nditer(</a:t>
+              <a:t>nditer(</a:t>
             </a:r>
             <a:r>
               <a:rPr lang="en-US" sz="1100">
@@ -13837,7 +14754,7 @@
               <a:rPr lang="en-US" sz="1100">
                 <a:latin typeface="Consolas" panose="020B0609020204030204" pitchFamily="49" charset="0"/>
               </a:rPr>
-              <a:t>for x in np</a:t>
+              <a:t>for x in np.</a:t>
             </a:r>
             <a:r>
               <a:rPr lang="en-US" sz="1100">
@@ -13846,7 +14763,7 @@
                 </a:solidFill>
                 <a:latin typeface="Consolas" panose="020B0609020204030204" pitchFamily="49" charset="0"/>
               </a:rPr>
-              <a:t>.ndenumerate(</a:t>
+              <a:t>ndenumerate(</a:t>
             </a:r>
             <a:r>
               <a:rPr lang="en-US" sz="1100">

</xml_diff>

<commit_message>
add np random numbers
</commit_message>
<xml_diff>
--- a/2 Data Science.pptx
+++ b/2 Data Science.pptx
@@ -5,10 +5,10 @@
     <p:sldMasterId id="2147483658" r:id="rId1"/>
   </p:sldMasterIdLst>
   <p:notesMasterIdLst>
-    <p:notesMasterId r:id="rId18"/>
+    <p:notesMasterId r:id="rId19"/>
   </p:notesMasterIdLst>
   <p:handoutMasterIdLst>
-    <p:handoutMasterId r:id="rId19"/>
+    <p:handoutMasterId r:id="rId20"/>
   </p:handoutMasterIdLst>
   <p:sldIdLst>
     <p:sldId id="256" r:id="rId2"/>
@@ -23,39 +23,40 @@
     <p:sldId id="344" r:id="rId11"/>
     <p:sldId id="345" r:id="rId12"/>
     <p:sldId id="346" r:id="rId13"/>
-    <p:sldId id="334" r:id="rId14"/>
-    <p:sldId id="335" r:id="rId15"/>
-    <p:sldId id="340" r:id="rId16"/>
-    <p:sldId id="280" r:id="rId17"/>
+    <p:sldId id="347" r:id="rId14"/>
+    <p:sldId id="334" r:id="rId15"/>
+    <p:sldId id="335" r:id="rId16"/>
+    <p:sldId id="340" r:id="rId17"/>
+    <p:sldId id="280" r:id="rId18"/>
   </p:sldIdLst>
   <p:sldSz cx="9144000" cy="5143500" type="screen16x9"/>
   <p:notesSz cx="6858000" cy="9144000"/>
   <p:embeddedFontLst>
     <p:embeddedFont>
       <p:font typeface="Consolas" panose="020B0609020204030204" pitchFamily="49" charset="0"/>
-      <p:regular r:id="rId20"/>
-      <p:bold r:id="rId21"/>
-      <p:italic r:id="rId22"/>
-      <p:boldItalic r:id="rId23"/>
+      <p:regular r:id="rId21"/>
+      <p:bold r:id="rId22"/>
+      <p:italic r:id="rId23"/>
+      <p:boldItalic r:id="rId24"/>
     </p:embeddedFont>
     <p:embeddedFont>
       <p:font typeface="Roboto Slab" panose="020B0604020202020204" charset="0"/>
-      <p:regular r:id="rId24"/>
-      <p:bold r:id="rId25"/>
+      <p:regular r:id="rId25"/>
+      <p:bold r:id="rId26"/>
     </p:embeddedFont>
     <p:embeddedFont>
       <p:font typeface="Source Sans Pro" panose="020B0503030403020204" pitchFamily="34" charset="0"/>
-      <p:regular r:id="rId26"/>
-      <p:bold r:id="rId27"/>
-      <p:italic r:id="rId28"/>
-      <p:boldItalic r:id="rId29"/>
+      <p:regular r:id="rId27"/>
+      <p:bold r:id="rId28"/>
+      <p:italic r:id="rId29"/>
+      <p:boldItalic r:id="rId30"/>
     </p:embeddedFont>
     <p:embeddedFont>
       <p:font typeface="Trebuchet MS" panose="020B0603020202020204" pitchFamily="34" charset="0"/>
-      <p:regular r:id="rId30"/>
-      <p:bold r:id="rId31"/>
-      <p:italic r:id="rId32"/>
-      <p:boldItalic r:id="rId33"/>
+      <p:regular r:id="rId31"/>
+      <p:bold r:id="rId32"/>
+      <p:italic r:id="rId33"/>
+      <p:boldItalic r:id="rId34"/>
     </p:embeddedFont>
   </p:embeddedFontLst>
   <p:defaultTextStyle>
@@ -12138,7 +12139,7 @@
   <p:cSld>
     <p:spTree>
       <p:nvGrpSpPr>
-        <p:cNvPr id="1" name="Shape 96"/>
+        <p:cNvPr id="1" name=""/>
         <p:cNvGrpSpPr/>
         <p:nvPr/>
       </p:nvGrpSpPr>
@@ -12152,84 +12153,332 @@
       </p:grpSpPr>
       <p:sp>
         <p:nvSpPr>
-          <p:cNvPr id="97" name="Google Shape;97;p15"/>
-          <p:cNvSpPr txBox="1">
+          <p:cNvPr id="2" name="Title 1">
+            <a:extLst>
+              <a:ext uri="{FF2B5EF4-FFF2-40B4-BE49-F238E27FC236}">
+                <a16:creationId xmlns:a16="http://schemas.microsoft.com/office/drawing/2014/main" id="{024AD384-5AD1-4435-A943-1241B2FACD62}"/>
+              </a:ext>
+            </a:extLst>
+          </p:cNvPr>
+          <p:cNvSpPr>
             <a:spLocks noGrp="1"/>
           </p:cNvSpPr>
           <p:nvPr>
-            <p:ph type="ctrTitle"/>
+            <p:ph type="title"/>
+          </p:nvPr>
+        </p:nvSpPr>
+        <p:spPr/>
+        <p:txBody>
+          <a:bodyPr/>
+          <a:lstStyle/>
+          <a:p>
+            <a:r>
+              <a:rPr lang="en-US" sz="2400"/>
+              <a:t>Random Numbers</a:t>
+            </a:r>
+            <a:endParaRPr lang="fa-IR"/>
+          </a:p>
+        </p:txBody>
+      </p:sp>
+      <p:sp>
+        <p:nvSpPr>
+          <p:cNvPr id="3" name="Text Placeholder 2">
+            <a:extLst>
+              <a:ext uri="{FF2B5EF4-FFF2-40B4-BE49-F238E27FC236}">
+                <a16:creationId xmlns:a16="http://schemas.microsoft.com/office/drawing/2014/main" id="{58BE3078-8B89-4550-B497-93E4DADBD57E}"/>
+              </a:ext>
+            </a:extLst>
+          </p:cNvPr>
+          <p:cNvSpPr>
+            <a:spLocks noGrp="1"/>
+          </p:cNvSpPr>
+          <p:nvPr>
+            <p:ph type="body" idx="1"/>
           </p:nvPr>
         </p:nvSpPr>
         <p:spPr>
           <a:xfrm>
-            <a:off x="1655700" y="1991850"/>
-            <a:ext cx="5832600" cy="1159800"/>
+            <a:off x="786150" y="1142608"/>
+            <a:ext cx="7571700" cy="3626431"/>
           </a:xfrm>
-          <a:prstGeom prst="rect">
-            <a:avLst/>
-          </a:prstGeom>
         </p:spPr>
         <p:txBody>
-          <a:bodyPr spcFirstLastPara="1" wrap="square" lIns="91425" tIns="91425" rIns="91425" bIns="91425" anchor="ctr" anchorCtr="0">
-            <a:noAutofit/>
-          </a:bodyPr>
+          <a:bodyPr/>
           <a:lstStyle/>
           <a:p>
-            <a:pPr marL="0" lvl="0" indent="0" algn="ctr" rtl="0">
-              <a:spcBef>
-                <a:spcPts val="0"/>
-              </a:spcBef>
-              <a:spcAft>
-                <a:spcPts val="0"/>
-              </a:spcAft>
+            <a:pPr marL="76200" indent="0">
               <a:buNone/>
             </a:pPr>
             <a:r>
-              <a:rPr lang="en-US" sz="6000">
+              <a:rPr lang="en-US" sz="1400"/>
+              <a:t>Generate Random Number</a:t>
+            </a:r>
+          </a:p>
+          <a:p>
+            <a:pPr marL="76200" indent="0">
+              <a:buNone/>
+            </a:pPr>
+            <a:r>
+              <a:rPr lang="en-US" sz="1100">
+                <a:latin typeface="Consolas" panose="020B0609020204030204" pitchFamily="49" charset="0"/>
+              </a:rPr>
+              <a:t>print(np.</a:t>
+            </a:r>
+            <a:r>
+              <a:rPr lang="en-US" sz="1100">
                 <a:solidFill>
-                  <a:srgbClr val="E6E6E6"/>
+                  <a:schemeClr val="accent1"/>
                 </a:solidFill>
-              </a:rPr>
-              <a:t>2</a:t>
-            </a:r>
-            <a:endParaRPr sz="6000">
-              <a:solidFill>
-                <a:srgbClr val="E6E6E6"/>
-              </a:solidFill>
+                <a:latin typeface="Consolas" panose="020B0609020204030204" pitchFamily="49" charset="0"/>
+              </a:rPr>
+              <a:t>random.rand()</a:t>
+            </a:r>
+            <a:r>
+              <a:rPr lang="en-US" sz="1100">
+                <a:latin typeface="Consolas" panose="020B0609020204030204" pitchFamily="49" charset="0"/>
+              </a:rPr>
+              <a:t>)</a:t>
+            </a:r>
+          </a:p>
+          <a:p>
+            <a:pPr marL="76200" indent="0">
+              <a:buNone/>
+            </a:pPr>
+            <a:r>
+              <a:rPr lang="en-US" sz="1100">
+                <a:latin typeface="Consolas" panose="020B0609020204030204" pitchFamily="49" charset="0"/>
+              </a:rPr>
+              <a:t>print(np.random.rand(2, 3))</a:t>
+            </a:r>
+          </a:p>
+          <a:p>
+            <a:pPr marL="76200" indent="0">
+              <a:buNone/>
+            </a:pPr>
+            <a:r>
+              <a:rPr lang="en-US" sz="1100">
+                <a:latin typeface="Consolas" panose="020B0609020204030204" pitchFamily="49" charset="0"/>
+              </a:rPr>
+              <a:t>print(np.random</a:t>
+            </a:r>
+            <a:r>
+              <a:rPr lang="en-US" sz="1100">
+                <a:solidFill>
+                  <a:schemeClr val="accent1"/>
+                </a:solidFill>
+                <a:latin typeface="Consolas" panose="020B0609020204030204" pitchFamily="49" charset="0"/>
+              </a:rPr>
+              <a:t>.randint(</a:t>
+            </a:r>
+            <a:r>
+              <a:rPr lang="en-US" sz="1100">
+                <a:latin typeface="Consolas" panose="020B0609020204030204" pitchFamily="49" charset="0"/>
+              </a:rPr>
+              <a:t>50, 100</a:t>
+            </a:r>
+            <a:r>
+              <a:rPr lang="en-US" sz="1100">
+                <a:solidFill>
+                  <a:schemeClr val="accent1"/>
+                </a:solidFill>
+                <a:latin typeface="Consolas" panose="020B0609020204030204" pitchFamily="49" charset="0"/>
+              </a:rPr>
+              <a:t>)</a:t>
+            </a:r>
+            <a:r>
+              <a:rPr lang="en-US" sz="1100">
+                <a:latin typeface="Consolas" panose="020B0609020204030204" pitchFamily="49" charset="0"/>
+              </a:rPr>
+              <a:t>)</a:t>
+            </a:r>
+          </a:p>
+          <a:p>
+            <a:pPr marL="76200" indent="0">
+              <a:buNone/>
+            </a:pPr>
+            <a:r>
+              <a:rPr lang="en-US" sz="1100">
+                <a:latin typeface="Consolas" panose="020B0609020204030204" pitchFamily="49" charset="0"/>
+              </a:rPr>
+              <a:t>print(np.random.randint(50, 100, </a:t>
+            </a:r>
+            <a:r>
+              <a:rPr lang="en-US" sz="1100">
+                <a:solidFill>
+                  <a:schemeClr val="accent1"/>
+                </a:solidFill>
+                <a:latin typeface="Consolas" panose="020B0609020204030204" pitchFamily="49" charset="0"/>
+              </a:rPr>
+              <a:t>size</a:t>
+            </a:r>
+            <a:r>
+              <a:rPr lang="en-US" sz="1100">
+                <a:latin typeface="Consolas" panose="020B0609020204030204" pitchFamily="49" charset="0"/>
+              </a:rPr>
+              <a:t> </a:t>
+            </a:r>
+            <a:r>
+              <a:rPr lang="en-US" sz="1100">
+                <a:solidFill>
+                  <a:schemeClr val="accent1"/>
+                </a:solidFill>
+                <a:latin typeface="Consolas" panose="020B0609020204030204" pitchFamily="49" charset="0"/>
+              </a:rPr>
+              <a:t>=</a:t>
+            </a:r>
+            <a:r>
+              <a:rPr lang="en-US" sz="1100">
+                <a:latin typeface="Consolas" panose="020B0609020204030204" pitchFamily="49" charset="0"/>
+              </a:rPr>
+              <a:t> (2, 3)))</a:t>
+            </a:r>
+          </a:p>
+          <a:p>
+            <a:pPr marL="76200" indent="0">
+              <a:buNone/>
+            </a:pPr>
+            <a:endParaRPr lang="en-US" sz="1100">
+              <a:latin typeface="Consolas" panose="020B0609020204030204" pitchFamily="49" charset="0"/>
             </a:endParaRPr>
           </a:p>
           <a:p>
-            <a:r>
-              <a:rPr lang="en-US" b="1"/>
-              <a:t>Pandas</a:t>
-            </a:r>
-            <a:endParaRPr/>
+            <a:pPr marL="76200" indent="0">
+              <a:buNone/>
+            </a:pPr>
+            <a:r>
+              <a:rPr lang="en-US" sz="1400"/>
+              <a:t>Generate Random Number From Array</a:t>
+            </a:r>
+          </a:p>
+          <a:p>
+            <a:pPr marL="76200" indent="0">
+              <a:buNone/>
+            </a:pPr>
+            <a:r>
+              <a:rPr lang="en-US" sz="1100">
+                <a:latin typeface="Consolas" panose="020B0609020204030204" pitchFamily="49" charset="0"/>
+              </a:rPr>
+              <a:t>print(np.random.</a:t>
+            </a:r>
+            <a:r>
+              <a:rPr lang="en-US" sz="1100">
+                <a:solidFill>
+                  <a:schemeClr val="accent1"/>
+                </a:solidFill>
+                <a:latin typeface="Consolas" panose="020B0609020204030204" pitchFamily="49" charset="0"/>
+              </a:rPr>
+              <a:t>choice(</a:t>
+            </a:r>
+            <a:r>
+              <a:rPr lang="en-US" sz="1100">
+                <a:latin typeface="Consolas" panose="020B0609020204030204" pitchFamily="49" charset="0"/>
+              </a:rPr>
+              <a:t>[3, 5, 7, 9]</a:t>
+            </a:r>
+            <a:r>
+              <a:rPr lang="en-US" sz="1100">
+                <a:solidFill>
+                  <a:schemeClr val="accent1"/>
+                </a:solidFill>
+                <a:latin typeface="Consolas" panose="020B0609020204030204" pitchFamily="49" charset="0"/>
+              </a:rPr>
+              <a:t>)</a:t>
+            </a:r>
+            <a:r>
+              <a:rPr lang="en-US" sz="1100">
+                <a:latin typeface="Consolas" panose="020B0609020204030204" pitchFamily="49" charset="0"/>
+              </a:rPr>
+              <a:t>)</a:t>
+            </a:r>
+          </a:p>
+          <a:p>
+            <a:pPr marL="76200" indent="0">
+              <a:buNone/>
+            </a:pPr>
+            <a:r>
+              <a:rPr lang="en-US" sz="1100">
+                <a:latin typeface="Consolas" panose="020B0609020204030204" pitchFamily="49" charset="0"/>
+              </a:rPr>
+              <a:t>print(np.random.choice([3, 5, 7, 9],</a:t>
+            </a:r>
+            <a:r>
+              <a:rPr lang="en-US" sz="1100">
+                <a:solidFill>
+                  <a:schemeClr val="accent1"/>
+                </a:solidFill>
+                <a:latin typeface="Consolas" panose="020B0609020204030204" pitchFamily="49" charset="0"/>
+              </a:rPr>
+              <a:t> size</a:t>
+            </a:r>
+            <a:r>
+              <a:rPr lang="en-US" sz="1100">
+                <a:latin typeface="Consolas" panose="020B0609020204030204" pitchFamily="49" charset="0"/>
+              </a:rPr>
+              <a:t> </a:t>
+            </a:r>
+            <a:r>
+              <a:rPr lang="en-US" sz="1100">
+                <a:solidFill>
+                  <a:schemeClr val="accent1"/>
+                </a:solidFill>
+                <a:latin typeface="Consolas" panose="020B0609020204030204" pitchFamily="49" charset="0"/>
+              </a:rPr>
+              <a:t>=</a:t>
+            </a:r>
+            <a:r>
+              <a:rPr lang="en-US" sz="1100">
+                <a:latin typeface="Consolas" panose="020B0609020204030204" pitchFamily="49" charset="0"/>
+              </a:rPr>
+              <a:t> (2, 3)))</a:t>
+            </a:r>
+          </a:p>
+          <a:p>
+            <a:pPr marL="76200" indent="0">
+              <a:buNone/>
+            </a:pPr>
+            <a:r>
+              <a:rPr lang="en-US" sz="1100">
+                <a:latin typeface="Consolas" panose="020B0609020204030204" pitchFamily="49" charset="0"/>
+              </a:rPr>
+              <a:t>print(np.random.choice([3, 5, 7, 9], </a:t>
+            </a:r>
+            <a:r>
+              <a:rPr lang="en-US" sz="1100">
+                <a:solidFill>
+                  <a:schemeClr val="accent1"/>
+                </a:solidFill>
+                <a:latin typeface="Consolas" panose="020B0609020204030204" pitchFamily="49" charset="0"/>
+              </a:rPr>
+              <a:t>p =</a:t>
+            </a:r>
+            <a:r>
+              <a:rPr lang="en-US" sz="1100">
+                <a:latin typeface="Consolas" panose="020B0609020204030204" pitchFamily="49" charset="0"/>
+              </a:rPr>
+              <a:t> [0.1, 0.3, 0.6, 0.0]))</a:t>
+            </a:r>
           </a:p>
         </p:txBody>
       </p:sp>
       <p:sp>
         <p:nvSpPr>
-          <p:cNvPr id="99" name="Google Shape;99;p15"/>
-          <p:cNvSpPr txBox="1">
+          <p:cNvPr id="4" name="Slide Number Placeholder 3">
+            <a:extLst>
+              <a:ext uri="{FF2B5EF4-FFF2-40B4-BE49-F238E27FC236}">
+                <a16:creationId xmlns:a16="http://schemas.microsoft.com/office/drawing/2014/main" id="{64987AE6-EC0E-43DD-9376-95A5602EE5E1}"/>
+              </a:ext>
+            </a:extLst>
+          </p:cNvPr>
+          <p:cNvSpPr>
             <a:spLocks noGrp="1"/>
           </p:cNvSpPr>
           <p:nvPr>
-            <p:ph type="sldNum" idx="4294967295"/>
+            <p:ph type="sldNum" idx="12"/>
           </p:nvPr>
         </p:nvSpPr>
-        <p:spPr>
-          <a:xfrm>
-            <a:off x="8404384" y="4749851"/>
-            <a:ext cx="548700" cy="393600"/>
-          </a:xfrm>
-          <a:prstGeom prst="rect">
-            <a:avLst/>
-          </a:prstGeom>
-        </p:spPr>
+        <p:spPr/>
         <p:txBody>
-          <a:bodyPr spcFirstLastPara="1" wrap="square" lIns="91425" tIns="91425" rIns="91425" bIns="91425" anchor="t" anchorCtr="0">
-            <a:noAutofit/>
-          </a:bodyPr>
+          <a:bodyPr/>
           <a:lstStyle/>
           <a:p>
             <a:pPr marL="0" lvl="0" indent="0" algn="r" rtl="0">
@@ -12242,17 +12491,17 @@
               <a:buNone/>
             </a:pPr>
             <a:fld id="{00000000-1234-1234-1234-123412341234}" type="slidenum">
-              <a:rPr lang="en"/>
+              <a:rPr lang="en" smtClean="0"/>
               <a:t>13</a:t>
             </a:fld>
-            <a:endParaRPr/>
+            <a:endParaRPr lang="en"/>
           </a:p>
         </p:txBody>
       </p:sp>
     </p:spTree>
     <p:extLst>
       <p:ext uri="{BB962C8B-B14F-4D97-AF65-F5344CB8AC3E}">
-        <p14:creationId xmlns:p14="http://schemas.microsoft.com/office/powerpoint/2010/main" val="445305485"/>
+        <p14:creationId xmlns:p14="http://schemas.microsoft.com/office/powerpoint/2010/main" val="3730435872"/>
       </p:ext>
     </p:extLst>
   </p:cSld>
@@ -12319,7 +12568,7 @@
                   <a:srgbClr val="E6E6E6"/>
                 </a:solidFill>
               </a:rPr>
-              <a:t>3</a:t>
+              <a:t>2</a:t>
             </a:r>
             <a:endParaRPr sz="6000">
               <a:solidFill>
@@ -12329,8 +12578,8 @@
           </a:p>
           <a:p>
             <a:r>
-              <a:rPr lang="en"/>
-              <a:t>Matplotlib</a:t>
+              <a:rPr lang="en-US" b="1"/>
+              <a:t>Pandas</a:t>
             </a:r>
             <a:endParaRPr/>
           </a:p>
@@ -12381,7 +12630,7 @@
     </p:spTree>
     <p:extLst>
       <p:ext uri="{BB962C8B-B14F-4D97-AF65-F5344CB8AC3E}">
-        <p14:creationId xmlns:p14="http://schemas.microsoft.com/office/powerpoint/2010/main" val="550571345"/>
+        <p14:creationId xmlns:p14="http://schemas.microsoft.com/office/powerpoint/2010/main" val="445305485"/>
       </p:ext>
     </p:extLst>
   </p:cSld>
@@ -12448,7 +12697,7 @@
                   <a:srgbClr val="E6E6E6"/>
                 </a:solidFill>
               </a:rPr>
-              <a:t>4</a:t>
+              <a:t>3</a:t>
             </a:r>
             <a:endParaRPr sz="6000">
               <a:solidFill>
@@ -12458,8 +12707,8 @@
           </a:p>
           <a:p>
             <a:r>
-              <a:rPr lang="en-US"/>
-              <a:t>Scikit-learn</a:t>
+              <a:rPr lang="en"/>
+              <a:t>Matplotlib</a:t>
             </a:r>
             <a:endParaRPr/>
           </a:p>
@@ -12510,6 +12759,135 @@
     </p:spTree>
     <p:extLst>
       <p:ext uri="{BB962C8B-B14F-4D97-AF65-F5344CB8AC3E}">
+        <p14:creationId xmlns:p14="http://schemas.microsoft.com/office/powerpoint/2010/main" val="550571345"/>
+      </p:ext>
+    </p:extLst>
+  </p:cSld>
+  <p:clrMapOvr>
+    <a:masterClrMapping/>
+  </p:clrMapOvr>
+</p:sld>
+</file>
+
+<file path=ppt/slides/slide16.xml><?xml version="1.0" encoding="utf-8"?>
+<p:sld xmlns:a="http://schemas.openxmlformats.org/drawingml/2006/main" xmlns:r="http://schemas.openxmlformats.org/officeDocument/2006/relationships" xmlns:p="http://schemas.openxmlformats.org/presentationml/2006/main">
+  <p:cSld>
+    <p:spTree>
+      <p:nvGrpSpPr>
+        <p:cNvPr id="1" name="Shape 96"/>
+        <p:cNvGrpSpPr/>
+        <p:nvPr/>
+      </p:nvGrpSpPr>
+      <p:grpSpPr>
+        <a:xfrm>
+          <a:off x="0" y="0"/>
+          <a:ext cx="0" cy="0"/>
+          <a:chOff x="0" y="0"/>
+          <a:chExt cx="0" cy="0"/>
+        </a:xfrm>
+      </p:grpSpPr>
+      <p:sp>
+        <p:nvSpPr>
+          <p:cNvPr id="97" name="Google Shape;97;p15"/>
+          <p:cNvSpPr txBox="1">
+            <a:spLocks noGrp="1"/>
+          </p:cNvSpPr>
+          <p:nvPr>
+            <p:ph type="ctrTitle"/>
+          </p:nvPr>
+        </p:nvSpPr>
+        <p:spPr>
+          <a:xfrm>
+            <a:off x="1655700" y="1991850"/>
+            <a:ext cx="5832600" cy="1159800"/>
+          </a:xfrm>
+          <a:prstGeom prst="rect">
+            <a:avLst/>
+          </a:prstGeom>
+        </p:spPr>
+        <p:txBody>
+          <a:bodyPr spcFirstLastPara="1" wrap="square" lIns="91425" tIns="91425" rIns="91425" bIns="91425" anchor="ctr" anchorCtr="0">
+            <a:noAutofit/>
+          </a:bodyPr>
+          <a:lstStyle/>
+          <a:p>
+            <a:pPr marL="0" lvl="0" indent="0" algn="ctr" rtl="0">
+              <a:spcBef>
+                <a:spcPts val="0"/>
+              </a:spcBef>
+              <a:spcAft>
+                <a:spcPts val="0"/>
+              </a:spcAft>
+              <a:buNone/>
+            </a:pPr>
+            <a:r>
+              <a:rPr lang="en-US" sz="6000">
+                <a:solidFill>
+                  <a:srgbClr val="E6E6E6"/>
+                </a:solidFill>
+              </a:rPr>
+              <a:t>4</a:t>
+            </a:r>
+            <a:endParaRPr sz="6000">
+              <a:solidFill>
+                <a:srgbClr val="E6E6E6"/>
+              </a:solidFill>
+            </a:endParaRPr>
+          </a:p>
+          <a:p>
+            <a:r>
+              <a:rPr lang="en-US"/>
+              <a:t>Scikit-learn</a:t>
+            </a:r>
+            <a:endParaRPr/>
+          </a:p>
+        </p:txBody>
+      </p:sp>
+      <p:sp>
+        <p:nvSpPr>
+          <p:cNvPr id="99" name="Google Shape;99;p15"/>
+          <p:cNvSpPr txBox="1">
+            <a:spLocks noGrp="1"/>
+          </p:cNvSpPr>
+          <p:nvPr>
+            <p:ph type="sldNum" idx="4294967295"/>
+          </p:nvPr>
+        </p:nvSpPr>
+        <p:spPr>
+          <a:xfrm>
+            <a:off x="8404384" y="4749851"/>
+            <a:ext cx="548700" cy="393600"/>
+          </a:xfrm>
+          <a:prstGeom prst="rect">
+            <a:avLst/>
+          </a:prstGeom>
+        </p:spPr>
+        <p:txBody>
+          <a:bodyPr spcFirstLastPara="1" wrap="square" lIns="91425" tIns="91425" rIns="91425" bIns="91425" anchor="t" anchorCtr="0">
+            <a:noAutofit/>
+          </a:bodyPr>
+          <a:lstStyle/>
+          <a:p>
+            <a:pPr marL="0" lvl="0" indent="0" algn="r" rtl="0">
+              <a:spcBef>
+                <a:spcPts val="0"/>
+              </a:spcBef>
+              <a:spcAft>
+                <a:spcPts val="0"/>
+              </a:spcAft>
+              <a:buNone/>
+            </a:pPr>
+            <a:fld id="{00000000-1234-1234-1234-123412341234}" type="slidenum">
+              <a:rPr lang="en"/>
+              <a:t>16</a:t>
+            </a:fld>
+            <a:endParaRPr/>
+          </a:p>
+        </p:txBody>
+      </p:sp>
+    </p:spTree>
+    <p:extLst>
+      <p:ext uri="{BB962C8B-B14F-4D97-AF65-F5344CB8AC3E}">
         <p14:creationId xmlns:p14="http://schemas.microsoft.com/office/powerpoint/2010/main" val="2239011547"/>
       </p:ext>
     </p:extLst>
@@ -12520,7 +12898,7 @@
 </p:sld>
 </file>
 
-<file path=ppt/slides/slide16.xml><?xml version="1.0" encoding="utf-8"?>
+<file path=ppt/slides/slide17.xml><?xml version="1.0" encoding="utf-8"?>
 <p:sld xmlns:a="http://schemas.openxmlformats.org/drawingml/2006/main" xmlns:r="http://schemas.openxmlformats.org/officeDocument/2006/relationships" xmlns:p="http://schemas.openxmlformats.org/presentationml/2006/main">
   <p:cSld>
     <p:spTree>
@@ -12773,7 +13151,7 @@
             </a:pPr>
             <a:fld id="{00000000-1234-1234-1234-123412341234}" type="slidenum">
               <a:rPr lang="en"/>
-              <a:t>16</a:t>
+              <a:t>17</a:t>
             </a:fld>
             <a:endParaRPr/>
           </a:p>

</xml_diff>

<commit_message>
add data science introduction
</commit_message>
<xml_diff>
--- a/2 Data Science.pptx
+++ b/2 Data Science.pptx
@@ -5,59 +5,60 @@
     <p:sldMasterId id="2147483658" r:id="rId1"/>
   </p:sldMasterIdLst>
   <p:notesMasterIdLst>
-    <p:notesMasterId r:id="rId20"/>
+    <p:notesMasterId r:id="rId21"/>
   </p:notesMasterIdLst>
   <p:handoutMasterIdLst>
-    <p:handoutMasterId r:id="rId21"/>
+    <p:handoutMasterId r:id="rId22"/>
   </p:handoutMasterIdLst>
   <p:sldIdLst>
     <p:sldId id="256" r:id="rId2"/>
     <p:sldId id="332" r:id="rId3"/>
-    <p:sldId id="341" r:id="rId4"/>
-    <p:sldId id="289" r:id="rId5"/>
-    <p:sldId id="337" r:id="rId6"/>
-    <p:sldId id="338" r:id="rId7"/>
-    <p:sldId id="339" r:id="rId8"/>
-    <p:sldId id="342" r:id="rId9"/>
-    <p:sldId id="343" r:id="rId10"/>
-    <p:sldId id="344" r:id="rId11"/>
-    <p:sldId id="345" r:id="rId12"/>
-    <p:sldId id="346" r:id="rId13"/>
-    <p:sldId id="347" r:id="rId14"/>
-    <p:sldId id="348" r:id="rId15"/>
-    <p:sldId id="334" r:id="rId16"/>
-    <p:sldId id="335" r:id="rId17"/>
-    <p:sldId id="340" r:id="rId18"/>
-    <p:sldId id="280" r:id="rId19"/>
+    <p:sldId id="349" r:id="rId4"/>
+    <p:sldId id="341" r:id="rId5"/>
+    <p:sldId id="289" r:id="rId6"/>
+    <p:sldId id="337" r:id="rId7"/>
+    <p:sldId id="338" r:id="rId8"/>
+    <p:sldId id="339" r:id="rId9"/>
+    <p:sldId id="342" r:id="rId10"/>
+    <p:sldId id="343" r:id="rId11"/>
+    <p:sldId id="344" r:id="rId12"/>
+    <p:sldId id="345" r:id="rId13"/>
+    <p:sldId id="346" r:id="rId14"/>
+    <p:sldId id="347" r:id="rId15"/>
+    <p:sldId id="348" r:id="rId16"/>
+    <p:sldId id="334" r:id="rId17"/>
+    <p:sldId id="335" r:id="rId18"/>
+    <p:sldId id="340" r:id="rId19"/>
+    <p:sldId id="280" r:id="rId20"/>
   </p:sldIdLst>
   <p:sldSz cx="9144000" cy="5143500" type="screen16x9"/>
   <p:notesSz cx="6858000" cy="9144000"/>
   <p:embeddedFontLst>
     <p:embeddedFont>
       <p:font typeface="Consolas" panose="020B0609020204030204" pitchFamily="49" charset="0"/>
-      <p:regular r:id="rId22"/>
-      <p:bold r:id="rId23"/>
-      <p:italic r:id="rId24"/>
-      <p:boldItalic r:id="rId25"/>
+      <p:regular r:id="rId23"/>
+      <p:bold r:id="rId24"/>
+      <p:italic r:id="rId25"/>
+      <p:boldItalic r:id="rId26"/>
     </p:embeddedFont>
     <p:embeddedFont>
       <p:font typeface="Roboto Slab" panose="020B0604020202020204" charset="0"/>
-      <p:regular r:id="rId26"/>
-      <p:bold r:id="rId27"/>
+      <p:regular r:id="rId27"/>
+      <p:bold r:id="rId28"/>
     </p:embeddedFont>
     <p:embeddedFont>
       <p:font typeface="Source Sans Pro" panose="020B0503030403020204" pitchFamily="34" charset="0"/>
-      <p:regular r:id="rId28"/>
-      <p:bold r:id="rId29"/>
-      <p:italic r:id="rId30"/>
-      <p:boldItalic r:id="rId31"/>
+      <p:regular r:id="rId29"/>
+      <p:bold r:id="rId30"/>
+      <p:italic r:id="rId31"/>
+      <p:boldItalic r:id="rId32"/>
     </p:embeddedFont>
     <p:embeddedFont>
       <p:font typeface="Trebuchet MS" panose="020B0603020202020204" pitchFamily="34" charset="0"/>
-      <p:regular r:id="rId32"/>
-      <p:bold r:id="rId33"/>
-      <p:italic r:id="rId34"/>
-      <p:boldItalic r:id="rId35"/>
+      <p:regular r:id="rId33"/>
+      <p:bold r:id="rId34"/>
+      <p:italic r:id="rId35"/>
+      <p:boldItalic r:id="rId36"/>
     </p:embeddedFont>
   </p:embeddedFontLst>
   <p:defaultTextStyle>
@@ -9419,7 +9420,7 @@
             <a:noAutofit/>
           </a:bodyPr>
           <a:lstStyle>
-            <a:lvl1pPr marL="457200" lvl="0" indent="-381000">
+            <a:lvl1pPr marL="76200" lvl="0" indent="0" algn="just">
               <a:spcBef>
                 <a:spcPts val="600"/>
               </a:spcBef>
@@ -9427,8 +9428,8 @@
                 <a:spcPts val="0"/>
               </a:spcAft>
               <a:buSzPts val="2400"/>
-              <a:buChar char="◎"/>
-              <a:defRPr sz="2000">
+              <a:buNone/>
+              <a:defRPr sz="1400">
                 <a:latin typeface="Trebuchet MS" panose="020B0603020202020204" pitchFamily="34" charset="0"/>
               </a:defRPr>
             </a:lvl1pPr>
@@ -11261,7 +11262,7 @@
           <a:p>
             <a:r>
               <a:rPr lang="en-US" sz="2400"/>
-              <a:t>Joins and Splits</a:t>
+              <a:t>Loops</a:t>
             </a:r>
             <a:endParaRPr lang="fa-IR"/>
           </a:p>
@@ -11298,7 +11299,7 @@
             </a:pPr>
             <a:r>
               <a:rPr lang="en-US" sz="1400"/>
-              <a:t>Joining arrays</a:t>
+              <a:t>Iterating arrays</a:t>
             </a:r>
           </a:p>
           <a:p>
@@ -11309,7 +11310,7 @@
               <a:rPr lang="en-US" sz="1100">
                 <a:latin typeface="Consolas" panose="020B0609020204030204" pitchFamily="49" charset="0"/>
               </a:rPr>
-              <a:t>arr1, arr2 = np.array([[1, 2], [3, 4]]), np.array([[5, 6], [7, 8]])</a:t>
+              <a:t>arr = np.array([[1, 2, 3, 4], [5, 6, 7, 8]])</a:t>
             </a:r>
           </a:p>
           <a:p>
@@ -11320,7 +11321,29 @@
               <a:rPr lang="en-US" sz="1100">
                 <a:latin typeface="Consolas" panose="020B0609020204030204" pitchFamily="49" charset="0"/>
               </a:rPr>
-              <a:t>print(np.</a:t>
+              <a:t>for x in arr:</a:t>
+            </a:r>
+          </a:p>
+          <a:p>
+            <a:pPr marL="76200" indent="0">
+              <a:buNone/>
+            </a:pPr>
+            <a:r>
+              <a:rPr lang="en-US" sz="1100">
+                <a:latin typeface="Consolas" panose="020B0609020204030204" pitchFamily="49" charset="0"/>
+              </a:rPr>
+              <a:t>    print(x)</a:t>
+            </a:r>
+          </a:p>
+          <a:p>
+            <a:pPr marL="76200" indent="0">
+              <a:buNone/>
+            </a:pPr>
+            <a:r>
+              <a:rPr lang="en-US" sz="1100">
+                <a:latin typeface="Consolas" panose="020B0609020204030204" pitchFamily="49" charset="0"/>
+              </a:rPr>
+              <a:t>for x in np.</a:t>
             </a:r>
             <a:r>
               <a:rPr lang="en-US" sz="1100">
@@ -11329,13 +11352,13 @@
                 </a:solidFill>
                 <a:latin typeface="Consolas" panose="020B0609020204030204" pitchFamily="49" charset="0"/>
               </a:rPr>
-              <a:t>concatenate(</a:t>
-            </a:r>
-            <a:r>
-              <a:rPr lang="en-US" sz="1100">
-                <a:latin typeface="Consolas" panose="020B0609020204030204" pitchFamily="49" charset="0"/>
-              </a:rPr>
-              <a:t>(arr1, arr2)</a:t>
+              <a:t>nditer(</a:t>
+            </a:r>
+            <a:r>
+              <a:rPr lang="en-US" sz="1100">
+                <a:latin typeface="Consolas" panose="020B0609020204030204" pitchFamily="49" charset="0"/>
+              </a:rPr>
+              <a:t>arr</a:t>
             </a:r>
             <a:r>
               <a:rPr lang="en-US" sz="1100">
@@ -11350,7 +11373,7 @@
               <a:rPr lang="en-US" sz="1100">
                 <a:latin typeface="Consolas" panose="020B0609020204030204" pitchFamily="49" charset="0"/>
               </a:rPr>
-              <a:t>)</a:t>
+              <a:t>:</a:t>
             </a:r>
           </a:p>
           <a:p>
@@ -11361,7 +11384,18 @@
               <a:rPr lang="en-US" sz="1100">
                 <a:latin typeface="Consolas" panose="020B0609020204030204" pitchFamily="49" charset="0"/>
               </a:rPr>
-              <a:t>print(np.concatenate((arr1, arr2), </a:t>
+              <a:t>    print(x) </a:t>
+            </a:r>
+          </a:p>
+          <a:p>
+            <a:pPr marL="76200" indent="0">
+              <a:buNone/>
+            </a:pPr>
+            <a:r>
+              <a:rPr lang="en-US" sz="1100">
+                <a:latin typeface="Consolas" panose="020B0609020204030204" pitchFamily="49" charset="0"/>
+              </a:rPr>
+              <a:t>for x in np.nditer(arr</a:t>
             </a:r>
             <a:r>
               <a:rPr lang="en-US" sz="1100">
@@ -11370,24 +11404,13 @@
                 </a:solidFill>
                 <a:latin typeface="Consolas" panose="020B0609020204030204" pitchFamily="49" charset="0"/>
               </a:rPr>
-              <a:t>axis =</a:t>
-            </a:r>
-            <a:r>
-              <a:rPr lang="en-US" sz="1100">
-                <a:latin typeface="Consolas" panose="020B0609020204030204" pitchFamily="49" charset="0"/>
-              </a:rPr>
-              <a:t> 1))</a:t>
-            </a:r>
-          </a:p>
-          <a:p>
-            <a:pPr marL="76200" indent="0">
-              <a:buNone/>
-            </a:pPr>
-            <a:r>
-              <a:rPr lang="en-US" sz="1100">
-                <a:latin typeface="Consolas" panose="020B0609020204030204" pitchFamily="49" charset="0"/>
-              </a:rPr>
-              <a:t>print(np.</a:t>
+              <a:t>[</a:t>
+            </a:r>
+            <a:r>
+              <a:rPr lang="en-US" sz="1100">
+                <a:latin typeface="Consolas" panose="020B0609020204030204" pitchFamily="49" charset="0"/>
+              </a:rPr>
+              <a:t>:</a:t>
             </a:r>
             <a:r>
               <a:rPr lang="en-US" sz="1100">
@@ -11396,13 +11419,13 @@
                 </a:solidFill>
                 <a:latin typeface="Consolas" panose="020B0609020204030204" pitchFamily="49" charset="0"/>
               </a:rPr>
-              <a:t>stack(</a:t>
-            </a:r>
-            <a:r>
-              <a:rPr lang="en-US" sz="1100">
-                <a:latin typeface="Consolas" panose="020B0609020204030204" pitchFamily="49" charset="0"/>
-              </a:rPr>
-              <a:t>(arr1, arr2), axis = 1</a:t>
+              <a:t>,</a:t>
+            </a:r>
+            <a:r>
+              <a:rPr lang="en-US" sz="1100">
+                <a:latin typeface="Consolas" panose="020B0609020204030204" pitchFamily="49" charset="0"/>
+              </a:rPr>
+              <a:t> ::2</a:t>
             </a:r>
             <a:r>
               <a:rPr lang="en-US" sz="1100">
@@ -11411,52 +11434,35 @@
                 </a:solidFill>
                 <a:latin typeface="Consolas" panose="020B0609020204030204" pitchFamily="49" charset="0"/>
               </a:rPr>
-              <a:t>)</a:t>
-            </a:r>
-            <a:r>
-              <a:rPr lang="en-US" sz="1100">
-                <a:latin typeface="Consolas" panose="020B0609020204030204" pitchFamily="49" charset="0"/>
-              </a:rPr>
-              <a:t>)</a:t>
+              <a:t>]</a:t>
+            </a:r>
+            <a:r>
+              <a:rPr lang="en-US" sz="1100">
+                <a:latin typeface="Consolas" panose="020B0609020204030204" pitchFamily="49" charset="0"/>
+              </a:rPr>
+              <a:t>):</a:t>
             </a:r>
           </a:p>
           <a:p>
             <a:pPr marL="76200" indent="0">
               <a:buNone/>
             </a:pPr>
-            <a:endParaRPr lang="en-US" sz="1100">
-              <a:latin typeface="Consolas" panose="020B0609020204030204" pitchFamily="49" charset="0"/>
-            </a:endParaRPr>
+            <a:r>
+              <a:rPr lang="en-US" sz="1100">
+                <a:latin typeface="Consolas" panose="020B0609020204030204" pitchFamily="49" charset="0"/>
+              </a:rPr>
+              <a:t>    print(x) </a:t>
+            </a:r>
           </a:p>
           <a:p>
             <a:pPr marL="76200" indent="0">
               <a:buNone/>
             </a:pPr>
             <a:r>
-              <a:rPr lang="en-US" sz="1400"/>
-              <a:t>Splitting arrays</a:t>
-            </a:r>
-          </a:p>
-          <a:p>
-            <a:pPr marL="76200" indent="0">
-              <a:buNone/>
-            </a:pPr>
-            <a:r>
-              <a:rPr lang="en-US" sz="1100">
-                <a:latin typeface="Consolas" panose="020B0609020204030204" pitchFamily="49" charset="0"/>
-              </a:rPr>
-              <a:t>arr = np.array([[1, 2, 3, 4], [5, 6, 7, 8], [9, 10, 11, 12], [13, 14, 15, 16]])</a:t>
-            </a:r>
-          </a:p>
-          <a:p>
-            <a:pPr marL="76200" indent="0">
-              <a:buNone/>
-            </a:pPr>
-            <a:r>
-              <a:rPr lang="en-US" sz="1100">
-                <a:latin typeface="Consolas" panose="020B0609020204030204" pitchFamily="49" charset="0"/>
-              </a:rPr>
-              <a:t>print(np.</a:t>
+              <a:rPr lang="en-US" sz="1100">
+                <a:latin typeface="Consolas" panose="020B0609020204030204" pitchFamily="49" charset="0"/>
+              </a:rPr>
+              <a:t>for x in np.</a:t>
             </a:r>
             <a:r>
               <a:rPr lang="en-US" sz="1100">
@@ -11465,13 +11471,13 @@
                 </a:solidFill>
                 <a:latin typeface="Consolas" panose="020B0609020204030204" pitchFamily="49" charset="0"/>
               </a:rPr>
-              <a:t>array_split(</a:t>
-            </a:r>
-            <a:r>
-              <a:rPr lang="en-US" sz="1100">
-                <a:latin typeface="Consolas" panose="020B0609020204030204" pitchFamily="49" charset="0"/>
-              </a:rPr>
-              <a:t>arr, 2</a:t>
+              <a:t>ndenumerate(</a:t>
+            </a:r>
+            <a:r>
+              <a:rPr lang="en-US" sz="1100">
+                <a:latin typeface="Consolas" panose="020B0609020204030204" pitchFamily="49" charset="0"/>
+              </a:rPr>
+              <a:t>arr</a:t>
             </a:r>
             <a:r>
               <a:rPr lang="en-US" sz="1100">
@@ -11486,7 +11492,7 @@
               <a:rPr lang="en-US" sz="1100">
                 <a:latin typeface="Consolas" panose="020B0609020204030204" pitchFamily="49" charset="0"/>
               </a:rPr>
-              <a:t>)</a:t>
+              <a:t>:</a:t>
             </a:r>
           </a:p>
           <a:p>
@@ -11497,59 +11503,7 @@
               <a:rPr lang="en-US" sz="1100">
                 <a:latin typeface="Consolas" panose="020B0609020204030204" pitchFamily="49" charset="0"/>
               </a:rPr>
-              <a:t>print(np.array_split(arr, 3))</a:t>
-            </a:r>
-          </a:p>
-          <a:p>
-            <a:pPr marL="76200" indent="0">
-              <a:buNone/>
-            </a:pPr>
-            <a:r>
-              <a:rPr lang="en-US" sz="1100">
-                <a:latin typeface="Consolas" panose="020B0609020204030204" pitchFamily="49" charset="0"/>
-              </a:rPr>
-              <a:t>print(np.array_split(arr, 6))</a:t>
-            </a:r>
-          </a:p>
-          <a:p>
-            <a:pPr marL="76200" indent="0">
-              <a:buNone/>
-            </a:pPr>
-            <a:r>
-              <a:rPr lang="en-US" sz="1100">
-                <a:latin typeface="Consolas" panose="020B0609020204030204" pitchFamily="49" charset="0"/>
-              </a:rPr>
-              <a:t>print(np.array_split(arr, 2, </a:t>
-            </a:r>
-            <a:r>
-              <a:rPr lang="en-US" sz="1100">
-                <a:solidFill>
-                  <a:schemeClr val="accent1"/>
-                </a:solidFill>
-                <a:latin typeface="Consolas" panose="020B0609020204030204" pitchFamily="49" charset="0"/>
-              </a:rPr>
-              <a:t>axis</a:t>
-            </a:r>
-            <a:r>
-              <a:rPr lang="en-US" sz="1100">
-                <a:latin typeface="Consolas" panose="020B0609020204030204" pitchFamily="49" charset="0"/>
-              </a:rPr>
-              <a:t> </a:t>
-            </a:r>
-            <a:r>
-              <a:rPr lang="en-US" sz="1100">
-                <a:solidFill>
-                  <a:schemeClr val="accent1"/>
-                </a:solidFill>
-                <a:latin typeface="Consolas" panose="020B0609020204030204" pitchFamily="49" charset="0"/>
-              </a:rPr>
-              <a:t>=</a:t>
-            </a:r>
-            <a:r>
-              <a:rPr lang="en-US" sz="1100">
-                <a:latin typeface="Consolas" panose="020B0609020204030204" pitchFamily="49" charset="0"/>
-              </a:rPr>
-              <a:t> 1))</a:t>
+              <a:t>    print(x)</a:t>
             </a:r>
           </a:p>
         </p:txBody>
@@ -11595,7 +11549,7 @@
     </p:spTree>
     <p:extLst>
       <p:ext uri="{BB962C8B-B14F-4D97-AF65-F5344CB8AC3E}">
-        <p14:creationId xmlns:p14="http://schemas.microsoft.com/office/powerpoint/2010/main" val="390768587"/>
+        <p14:creationId xmlns:p14="http://schemas.microsoft.com/office/powerpoint/2010/main" val="1384881879"/>
       </p:ext>
     </p:extLst>
   </p:cSld>
@@ -11645,7 +11599,7 @@
           <a:p>
             <a:r>
               <a:rPr lang="en-US" sz="2400"/>
-              <a:t>Search and Filter</a:t>
+              <a:t>Joins and Splits</a:t>
             </a:r>
             <a:endParaRPr lang="fa-IR"/>
           </a:p>
@@ -11682,7 +11636,7 @@
             </a:pPr>
             <a:r>
               <a:rPr lang="en-US" sz="1400"/>
-              <a:t>Searching arrays</a:t>
+              <a:t>Joining arrays</a:t>
             </a:r>
           </a:p>
           <a:p>
@@ -11693,7 +11647,7 @@
               <a:rPr lang="en-US" sz="1100">
                 <a:latin typeface="Consolas" panose="020B0609020204030204" pitchFamily="49" charset="0"/>
               </a:rPr>
-              <a:t>arr = np.array([[1, 3], [2, 4], [6, 4], [4, 0]])</a:t>
+              <a:t>arr1, arr2 = np.array([[1, 2], [3, 4]]), np.array([[5, 6], [7, 8]])</a:t>
             </a:r>
           </a:p>
           <a:p>
@@ -11713,13 +11667,13 @@
                 </a:solidFill>
                 <a:latin typeface="Consolas" panose="020B0609020204030204" pitchFamily="49" charset="0"/>
               </a:rPr>
-              <a:t>where(</a:t>
-            </a:r>
-            <a:r>
-              <a:rPr lang="en-US" sz="1100">
-                <a:latin typeface="Consolas" panose="020B0609020204030204" pitchFamily="49" charset="0"/>
-              </a:rPr>
-              <a:t>arr == 4</a:t>
+              <a:t>concatenate(</a:t>
+            </a:r>
+            <a:r>
+              <a:rPr lang="en-US" sz="1100">
+                <a:latin typeface="Consolas" panose="020B0609020204030204" pitchFamily="49" charset="0"/>
+              </a:rPr>
+              <a:t>(arr1, arr2)</a:t>
             </a:r>
             <a:r>
               <a:rPr lang="en-US" sz="1100">
@@ -11745,7 +11699,63 @@
               <a:rPr lang="en-US" sz="1100">
                 <a:latin typeface="Consolas" panose="020B0609020204030204" pitchFamily="49" charset="0"/>
               </a:rPr>
-              <a:t>print(np.where(arr % 2 == 0))</a:t>
+              <a:t>print(np.concatenate((arr1, arr2), </a:t>
+            </a:r>
+            <a:r>
+              <a:rPr lang="en-US" sz="1100">
+                <a:solidFill>
+                  <a:schemeClr val="accent1"/>
+                </a:solidFill>
+                <a:latin typeface="Consolas" panose="020B0609020204030204" pitchFamily="49" charset="0"/>
+              </a:rPr>
+              <a:t>axis =</a:t>
+            </a:r>
+            <a:r>
+              <a:rPr lang="en-US" sz="1100">
+                <a:latin typeface="Consolas" panose="020B0609020204030204" pitchFamily="49" charset="0"/>
+              </a:rPr>
+              <a:t> 1))</a:t>
+            </a:r>
+          </a:p>
+          <a:p>
+            <a:pPr marL="76200" indent="0">
+              <a:buNone/>
+            </a:pPr>
+            <a:r>
+              <a:rPr lang="en-US" sz="1100">
+                <a:latin typeface="Consolas" panose="020B0609020204030204" pitchFamily="49" charset="0"/>
+              </a:rPr>
+              <a:t>print(np.</a:t>
+            </a:r>
+            <a:r>
+              <a:rPr lang="en-US" sz="1100">
+                <a:solidFill>
+                  <a:schemeClr val="accent1"/>
+                </a:solidFill>
+                <a:latin typeface="Consolas" panose="020B0609020204030204" pitchFamily="49" charset="0"/>
+              </a:rPr>
+              <a:t>stack(</a:t>
+            </a:r>
+            <a:r>
+              <a:rPr lang="en-US" sz="1100">
+                <a:latin typeface="Consolas" panose="020B0609020204030204" pitchFamily="49" charset="0"/>
+              </a:rPr>
+              <a:t>(arr1, arr2), axis = 1</a:t>
+            </a:r>
+            <a:r>
+              <a:rPr lang="en-US" sz="1100">
+                <a:solidFill>
+                  <a:schemeClr val="accent1"/>
+                </a:solidFill>
+                <a:latin typeface="Consolas" panose="020B0609020204030204" pitchFamily="49" charset="0"/>
+              </a:rPr>
+              <a:t>)</a:t>
+            </a:r>
+            <a:r>
+              <a:rPr lang="en-US" sz="1100">
+                <a:latin typeface="Consolas" panose="020B0609020204030204" pitchFamily="49" charset="0"/>
+              </a:rPr>
+              <a:t>)</a:t>
             </a:r>
           </a:p>
           <a:p>
@@ -11762,7 +11772,7 @@
             </a:pPr>
             <a:r>
               <a:rPr lang="en-US" sz="1400"/>
-              <a:t>Filtering arrays</a:t>
+              <a:t>Splitting arrays</a:t>
             </a:r>
           </a:p>
           <a:p>
@@ -11773,7 +11783,7 @@
               <a:rPr lang="en-US" sz="1100">
                 <a:latin typeface="Consolas" panose="020B0609020204030204" pitchFamily="49" charset="0"/>
               </a:rPr>
-              <a:t>arr = np.array([1, 3, 2, 4, 6, 4, 4, 0])</a:t>
+              <a:t>arr = np.array([[1, 2, 3, 4], [5, 6, 7, 8], [9, 10, 11, 12], [13, 14, 15, 16]])</a:t>
             </a:r>
           </a:p>
           <a:p>
@@ -11784,7 +11794,7 @@
               <a:rPr lang="en-US" sz="1100">
                 <a:latin typeface="Consolas" panose="020B0609020204030204" pitchFamily="49" charset="0"/>
               </a:rPr>
-              <a:t>print(arr</a:t>
+              <a:t>print(np.</a:t>
             </a:r>
             <a:r>
               <a:rPr lang="en-US" sz="1100">
@@ -11793,13 +11803,13 @@
                 </a:solidFill>
                 <a:latin typeface="Consolas" panose="020B0609020204030204" pitchFamily="49" charset="0"/>
               </a:rPr>
-              <a:t>[</a:t>
-            </a:r>
-            <a:r>
-              <a:rPr lang="en-US" sz="1100">
-                <a:latin typeface="Consolas" panose="020B0609020204030204" pitchFamily="49" charset="0"/>
-              </a:rPr>
-              <a:t>arr % 2 == 0</a:t>
+              <a:t>array_split(</a:t>
+            </a:r>
+            <a:r>
+              <a:rPr lang="en-US" sz="1100">
+                <a:latin typeface="Consolas" panose="020B0609020204030204" pitchFamily="49" charset="0"/>
+              </a:rPr>
+              <a:t>arr, 2</a:t>
             </a:r>
             <a:r>
               <a:rPr lang="en-US" sz="1100">
@@ -11808,13 +11818,76 @@
                 </a:solidFill>
                 <a:latin typeface="Consolas" panose="020B0609020204030204" pitchFamily="49" charset="0"/>
               </a:rPr>
-              <a:t>]</a:t>
-            </a:r>
-            <a:r>
-              <a:rPr lang="en-US" sz="1100">
-                <a:latin typeface="Consolas" panose="020B0609020204030204" pitchFamily="49" charset="0"/>
-              </a:rPr>
               <a:t>)</a:t>
+            </a:r>
+            <a:r>
+              <a:rPr lang="en-US" sz="1100">
+                <a:latin typeface="Consolas" panose="020B0609020204030204" pitchFamily="49" charset="0"/>
+              </a:rPr>
+              <a:t>)</a:t>
+            </a:r>
+          </a:p>
+          <a:p>
+            <a:pPr marL="76200" indent="0">
+              <a:buNone/>
+            </a:pPr>
+            <a:r>
+              <a:rPr lang="en-US" sz="1100">
+                <a:latin typeface="Consolas" panose="020B0609020204030204" pitchFamily="49" charset="0"/>
+              </a:rPr>
+              <a:t>print(np.array_split(arr, 3))</a:t>
+            </a:r>
+          </a:p>
+          <a:p>
+            <a:pPr marL="76200" indent="0">
+              <a:buNone/>
+            </a:pPr>
+            <a:r>
+              <a:rPr lang="en-US" sz="1100">
+                <a:latin typeface="Consolas" panose="020B0609020204030204" pitchFamily="49" charset="0"/>
+              </a:rPr>
+              <a:t>print(np.array_split(arr, 6))</a:t>
+            </a:r>
+          </a:p>
+          <a:p>
+            <a:pPr marL="76200" indent="0">
+              <a:buNone/>
+            </a:pPr>
+            <a:r>
+              <a:rPr lang="en-US" sz="1100">
+                <a:latin typeface="Consolas" panose="020B0609020204030204" pitchFamily="49" charset="0"/>
+              </a:rPr>
+              <a:t>print(np.array_split(arr, 2, </a:t>
+            </a:r>
+            <a:r>
+              <a:rPr lang="en-US" sz="1100">
+                <a:solidFill>
+                  <a:schemeClr val="accent1"/>
+                </a:solidFill>
+                <a:latin typeface="Consolas" panose="020B0609020204030204" pitchFamily="49" charset="0"/>
+              </a:rPr>
+              <a:t>axis</a:t>
+            </a:r>
+            <a:r>
+              <a:rPr lang="en-US" sz="1100">
+                <a:latin typeface="Consolas" panose="020B0609020204030204" pitchFamily="49" charset="0"/>
+              </a:rPr>
+              <a:t> </a:t>
+            </a:r>
+            <a:r>
+              <a:rPr lang="en-US" sz="1100">
+                <a:solidFill>
+                  <a:schemeClr val="accent1"/>
+                </a:solidFill>
+                <a:latin typeface="Consolas" panose="020B0609020204030204" pitchFamily="49" charset="0"/>
+              </a:rPr>
+              <a:t>=</a:t>
+            </a:r>
+            <a:r>
+              <a:rPr lang="en-US" sz="1100">
+                <a:latin typeface="Consolas" panose="020B0609020204030204" pitchFamily="49" charset="0"/>
+              </a:rPr>
+              <a:t> 1))</a:t>
             </a:r>
           </a:p>
         </p:txBody>
@@ -11860,7 +11933,7 @@
     </p:spTree>
     <p:extLst>
       <p:ext uri="{BB962C8B-B14F-4D97-AF65-F5344CB8AC3E}">
-        <p14:creationId xmlns:p14="http://schemas.microsoft.com/office/powerpoint/2010/main" val="1557836894"/>
+        <p14:creationId xmlns:p14="http://schemas.microsoft.com/office/powerpoint/2010/main" val="390768587"/>
       </p:ext>
     </p:extLst>
   </p:cSld>
@@ -11910,7 +11983,7 @@
           <a:p>
             <a:r>
               <a:rPr lang="en-US" sz="2400"/>
-              <a:t>Sort</a:t>
+              <a:t>Search and Filter</a:t>
             </a:r>
             <a:endParaRPr lang="fa-IR"/>
           </a:p>
@@ -11947,7 +12020,7 @@
             </a:pPr>
             <a:r>
               <a:rPr lang="en-US" sz="1400"/>
-              <a:t>Sorting arrays</a:t>
+              <a:t>Searching arrays</a:t>
             </a:r>
           </a:p>
           <a:p>
@@ -11978,13 +12051,13 @@
                 </a:solidFill>
                 <a:latin typeface="Consolas" panose="020B0609020204030204" pitchFamily="49" charset="0"/>
               </a:rPr>
-              <a:t>sort(</a:t>
-            </a:r>
-            <a:r>
-              <a:rPr lang="en-US" sz="1100">
-                <a:latin typeface="Consolas" panose="020B0609020204030204" pitchFamily="49" charset="0"/>
-              </a:rPr>
-              <a:t>arr</a:t>
+              <a:t>where(</a:t>
+            </a:r>
+            <a:r>
+              <a:rPr lang="en-US" sz="1100">
+                <a:latin typeface="Consolas" panose="020B0609020204030204" pitchFamily="49" charset="0"/>
+              </a:rPr>
+              <a:t>arr == 4</a:t>
             </a:r>
             <a:r>
               <a:rPr lang="en-US" sz="1100">
@@ -12000,6 +12073,17 @@
                 <a:latin typeface="Consolas" panose="020B0609020204030204" pitchFamily="49" charset="0"/>
               </a:rPr>
               <a:t>)</a:t>
+            </a:r>
+          </a:p>
+          <a:p>
+            <a:pPr marL="76200" indent="0">
+              <a:buNone/>
+            </a:pPr>
+            <a:r>
+              <a:rPr lang="en-US" sz="1100">
+                <a:latin typeface="Consolas" panose="020B0609020204030204" pitchFamily="49" charset="0"/>
+              </a:rPr>
+              <a:t>print(np.where(arr % 2 == 0))</a:t>
             </a:r>
           </a:p>
           <a:p>
@@ -12016,7 +12100,7 @@
             </a:pPr>
             <a:r>
               <a:rPr lang="en-US" sz="1400"/>
-              <a:t>Search Sorted</a:t>
+              <a:t>Filtering arrays</a:t>
             </a:r>
           </a:p>
           <a:p>
@@ -12038,7 +12122,7 @@
               <a:rPr lang="en-US" sz="1100">
                 <a:latin typeface="Consolas" panose="020B0609020204030204" pitchFamily="49" charset="0"/>
               </a:rPr>
-              <a:t>print(np.</a:t>
+              <a:t>print(arr</a:t>
             </a:r>
             <a:r>
               <a:rPr lang="en-US" sz="1100">
@@ -12047,13 +12131,13 @@
                 </a:solidFill>
                 <a:latin typeface="Consolas" panose="020B0609020204030204" pitchFamily="49" charset="0"/>
               </a:rPr>
-              <a:t>searchsorted(</a:t>
-            </a:r>
-            <a:r>
-              <a:rPr lang="en-US" sz="1100">
-                <a:latin typeface="Consolas" panose="020B0609020204030204" pitchFamily="49" charset="0"/>
-              </a:rPr>
-              <a:t>arr, 3</a:t>
+              <a:t>[</a:t>
+            </a:r>
+            <a:r>
+              <a:rPr lang="en-US" sz="1100">
+                <a:latin typeface="Consolas" panose="020B0609020204030204" pitchFamily="49" charset="0"/>
+              </a:rPr>
+              <a:t>arr % 2 == 0</a:t>
             </a:r>
             <a:r>
               <a:rPr lang="en-US" sz="1100">
@@ -12062,24 +12146,13 @@
                 </a:solidFill>
                 <a:latin typeface="Consolas" panose="020B0609020204030204" pitchFamily="49" charset="0"/>
               </a:rPr>
+              <a:t>]</a:t>
+            </a:r>
+            <a:r>
+              <a:rPr lang="en-US" sz="1100">
+                <a:latin typeface="Consolas" panose="020B0609020204030204" pitchFamily="49" charset="0"/>
+              </a:rPr>
               <a:t>)</a:t>
-            </a:r>
-            <a:r>
-              <a:rPr lang="en-US" sz="1100">
-                <a:latin typeface="Consolas" panose="020B0609020204030204" pitchFamily="49" charset="0"/>
-              </a:rPr>
-              <a:t>)</a:t>
-            </a:r>
-          </a:p>
-          <a:p>
-            <a:pPr marL="76200" indent="0">
-              <a:buNone/>
-            </a:pPr>
-            <a:r>
-              <a:rPr lang="en-US" sz="1100">
-                <a:latin typeface="Consolas" panose="020B0609020204030204" pitchFamily="49" charset="0"/>
-              </a:rPr>
-              <a:t>print(np.searchsorted(arr, 5))</a:t>
             </a:r>
           </a:p>
         </p:txBody>
@@ -12125,7 +12198,7 @@
     </p:spTree>
     <p:extLst>
       <p:ext uri="{BB962C8B-B14F-4D97-AF65-F5344CB8AC3E}">
-        <p14:creationId xmlns:p14="http://schemas.microsoft.com/office/powerpoint/2010/main" val="133725986"/>
+        <p14:creationId xmlns:p14="http://schemas.microsoft.com/office/powerpoint/2010/main" val="1557836894"/>
       </p:ext>
     </p:extLst>
   </p:cSld>
@@ -12175,7 +12248,7 @@
           <a:p>
             <a:r>
               <a:rPr lang="en-US" sz="2400"/>
-              <a:t>Random Numbers</a:t>
+              <a:t>Sort</a:t>
             </a:r>
             <a:endParaRPr lang="fa-IR"/>
           </a:p>
@@ -12212,7 +12285,18 @@
             </a:pPr>
             <a:r>
               <a:rPr lang="en-US" sz="1400"/>
-              <a:t>Generate Random Number</a:t>
+              <a:t>Sorting arrays</a:t>
+            </a:r>
+          </a:p>
+          <a:p>
+            <a:pPr marL="76200" indent="0">
+              <a:buNone/>
+            </a:pPr>
+            <a:r>
+              <a:rPr lang="en-US" sz="1100">
+                <a:latin typeface="Consolas" panose="020B0609020204030204" pitchFamily="49" charset="0"/>
+              </a:rPr>
+              <a:t>arr = np.array([[1, 3], [2, 4], [6, 4], [4, 0]])</a:t>
             </a:r>
           </a:p>
           <a:p>
@@ -12232,35 +12316,13 @@
                 </a:solidFill>
                 <a:latin typeface="Consolas" panose="020B0609020204030204" pitchFamily="49" charset="0"/>
               </a:rPr>
-              <a:t>random.rand()</a:t>
-            </a:r>
-            <a:r>
-              <a:rPr lang="en-US" sz="1100">
-                <a:latin typeface="Consolas" panose="020B0609020204030204" pitchFamily="49" charset="0"/>
-              </a:rPr>
-              <a:t>)</a:t>
-            </a:r>
-          </a:p>
-          <a:p>
-            <a:pPr marL="76200" indent="0">
-              <a:buNone/>
-            </a:pPr>
-            <a:r>
-              <a:rPr lang="en-US" sz="1100">
-                <a:latin typeface="Consolas" panose="020B0609020204030204" pitchFamily="49" charset="0"/>
-              </a:rPr>
-              <a:t>print(np.random.rand(2, 3))</a:t>
-            </a:r>
-          </a:p>
-          <a:p>
-            <a:pPr marL="76200" indent="0">
-              <a:buNone/>
-            </a:pPr>
-            <a:r>
-              <a:rPr lang="en-US" sz="1100">
-                <a:latin typeface="Consolas" panose="020B0609020204030204" pitchFamily="49" charset="0"/>
-              </a:rPr>
-              <a:t>print(np.random</a:t>
+              <a:t>sort(</a:t>
+            </a:r>
+            <a:r>
+              <a:rPr lang="en-US" sz="1100">
+                <a:latin typeface="Consolas" panose="020B0609020204030204" pitchFamily="49" charset="0"/>
+              </a:rPr>
+              <a:t>arr</a:t>
             </a:r>
             <a:r>
               <a:rPr lang="en-US" sz="1100">
@@ -12269,21 +12331,6 @@
                 </a:solidFill>
                 <a:latin typeface="Consolas" panose="020B0609020204030204" pitchFamily="49" charset="0"/>
               </a:rPr>
-              <a:t>.randint(</a:t>
-            </a:r>
-            <a:r>
-              <a:rPr lang="en-US" sz="1100">
-                <a:latin typeface="Consolas" panose="020B0609020204030204" pitchFamily="49" charset="0"/>
-              </a:rPr>
-              <a:t>50, 100</a:t>
-            </a:r>
-            <a:r>
-              <a:rPr lang="en-US" sz="1100">
-                <a:solidFill>
-                  <a:schemeClr val="accent1"/>
-                </a:solidFill>
-                <a:latin typeface="Consolas" panose="020B0609020204030204" pitchFamily="49" charset="0"/>
-              </a:rPr>
               <a:t>)</a:t>
             </a:r>
             <a:r>
@@ -12291,47 +12338,6 @@
                 <a:latin typeface="Consolas" panose="020B0609020204030204" pitchFamily="49" charset="0"/>
               </a:rPr>
               <a:t>)</a:t>
-            </a:r>
-          </a:p>
-          <a:p>
-            <a:pPr marL="76200" indent="0">
-              <a:buNone/>
-            </a:pPr>
-            <a:r>
-              <a:rPr lang="en-US" sz="1100">
-                <a:latin typeface="Consolas" panose="020B0609020204030204" pitchFamily="49" charset="0"/>
-              </a:rPr>
-              <a:t>print(np.random.randint(50, 100, </a:t>
-            </a:r>
-            <a:r>
-              <a:rPr lang="en-US" sz="1100">
-                <a:solidFill>
-                  <a:schemeClr val="accent1"/>
-                </a:solidFill>
-                <a:latin typeface="Consolas" panose="020B0609020204030204" pitchFamily="49" charset="0"/>
-              </a:rPr>
-              <a:t>size</a:t>
-            </a:r>
-            <a:r>
-              <a:rPr lang="en-US" sz="1100">
-                <a:latin typeface="Consolas" panose="020B0609020204030204" pitchFamily="49" charset="0"/>
-              </a:rPr>
-              <a:t> </a:t>
-            </a:r>
-            <a:r>
-              <a:rPr lang="en-US" sz="1100">
-                <a:solidFill>
-                  <a:schemeClr val="accent1"/>
-                </a:solidFill>
-                <a:latin typeface="Consolas" panose="020B0609020204030204" pitchFamily="49" charset="0"/>
-              </a:rPr>
-              <a:t>=</a:t>
-            </a:r>
-            <a:r>
-              <a:rPr lang="en-US" sz="1100">
-                <a:latin typeface="Consolas" panose="020B0609020204030204" pitchFamily="49" charset="0"/>
-              </a:rPr>
-              <a:t> (2, 3)))</a:t>
             </a:r>
           </a:p>
           <a:p>
@@ -12348,7 +12354,7 @@
             </a:pPr>
             <a:r>
               <a:rPr lang="en-US" sz="1400"/>
-              <a:t>Generate Random Number From Array</a:t>
+              <a:t>Search Sorted</a:t>
             </a:r>
           </a:p>
           <a:p>
@@ -12359,7 +12365,18 @@
               <a:rPr lang="en-US" sz="1100">
                 <a:latin typeface="Consolas" panose="020B0609020204030204" pitchFamily="49" charset="0"/>
               </a:rPr>
-              <a:t>print(np.random.</a:t>
+              <a:t>arr = np.array([1, 3, 2, 4, 6, 4, 4, 0])</a:t>
+            </a:r>
+          </a:p>
+          <a:p>
+            <a:pPr marL="76200" indent="0">
+              <a:buNone/>
+            </a:pPr>
+            <a:r>
+              <a:rPr lang="en-US" sz="1100">
+                <a:latin typeface="Consolas" panose="020B0609020204030204" pitchFamily="49" charset="0"/>
+              </a:rPr>
+              <a:t>print(np.</a:t>
             </a:r>
             <a:r>
               <a:rPr lang="en-US" sz="1100">
@@ -12368,13 +12385,13 @@
                 </a:solidFill>
                 <a:latin typeface="Consolas" panose="020B0609020204030204" pitchFamily="49" charset="0"/>
               </a:rPr>
-              <a:t>choice(</a:t>
-            </a:r>
-            <a:r>
-              <a:rPr lang="en-US" sz="1100">
-                <a:latin typeface="Consolas" panose="020B0609020204030204" pitchFamily="49" charset="0"/>
-              </a:rPr>
-              <a:t>[3, 5, 7, 9]</a:t>
+              <a:t>searchsorted(</a:t>
+            </a:r>
+            <a:r>
+              <a:rPr lang="en-US" sz="1100">
+                <a:latin typeface="Consolas" panose="020B0609020204030204" pitchFamily="49" charset="0"/>
+              </a:rPr>
+              <a:t>arr, 3</a:t>
             </a:r>
             <a:r>
               <a:rPr lang="en-US" sz="1100">
@@ -12400,63 +12417,7 @@
               <a:rPr lang="en-US" sz="1100">
                 <a:latin typeface="Consolas" panose="020B0609020204030204" pitchFamily="49" charset="0"/>
               </a:rPr>
-              <a:t>print(np.random.choice([3, 5, 7, 9],</a:t>
-            </a:r>
-            <a:r>
-              <a:rPr lang="en-US" sz="1100">
-                <a:solidFill>
-                  <a:schemeClr val="accent1"/>
-                </a:solidFill>
-                <a:latin typeface="Consolas" panose="020B0609020204030204" pitchFamily="49" charset="0"/>
-              </a:rPr>
-              <a:t> size</a:t>
-            </a:r>
-            <a:r>
-              <a:rPr lang="en-US" sz="1100">
-                <a:latin typeface="Consolas" panose="020B0609020204030204" pitchFamily="49" charset="0"/>
-              </a:rPr>
-              <a:t> </a:t>
-            </a:r>
-            <a:r>
-              <a:rPr lang="en-US" sz="1100">
-                <a:solidFill>
-                  <a:schemeClr val="accent1"/>
-                </a:solidFill>
-                <a:latin typeface="Consolas" panose="020B0609020204030204" pitchFamily="49" charset="0"/>
-              </a:rPr>
-              <a:t>=</a:t>
-            </a:r>
-            <a:r>
-              <a:rPr lang="en-US" sz="1100">
-                <a:latin typeface="Consolas" panose="020B0609020204030204" pitchFamily="49" charset="0"/>
-              </a:rPr>
-              <a:t> (2, 3)))</a:t>
-            </a:r>
-          </a:p>
-          <a:p>
-            <a:pPr marL="76200" indent="0">
-              <a:buNone/>
-            </a:pPr>
-            <a:r>
-              <a:rPr lang="en-US" sz="1100">
-                <a:latin typeface="Consolas" panose="020B0609020204030204" pitchFamily="49" charset="0"/>
-              </a:rPr>
-              <a:t>print(np.random.choice([3, 5, 7, 9], </a:t>
-            </a:r>
-            <a:r>
-              <a:rPr lang="en-US" sz="1100">
-                <a:solidFill>
-                  <a:schemeClr val="accent1"/>
-                </a:solidFill>
-                <a:latin typeface="Consolas" panose="020B0609020204030204" pitchFamily="49" charset="0"/>
-              </a:rPr>
-              <a:t>p =</a:t>
-            </a:r>
-            <a:r>
-              <a:rPr lang="en-US" sz="1100">
-                <a:latin typeface="Consolas" panose="020B0609020204030204" pitchFamily="49" charset="0"/>
-              </a:rPr>
-              <a:t> [0.1, 0.3, 0.6, 0.0]))</a:t>
+              <a:t>print(np.searchsorted(arr, 5))</a:t>
             </a:r>
           </a:p>
         </p:txBody>
@@ -12502,7 +12463,7 @@
     </p:spTree>
     <p:extLst>
       <p:ext uri="{BB962C8B-B14F-4D97-AF65-F5344CB8AC3E}">
-        <p14:creationId xmlns:p14="http://schemas.microsoft.com/office/powerpoint/2010/main" val="3730435872"/>
+        <p14:creationId xmlns:p14="http://schemas.microsoft.com/office/powerpoint/2010/main" val="133725986"/>
       </p:ext>
     </p:extLst>
   </p:cSld>
@@ -12551,8 +12512,8 @@
           <a:lstStyle/>
           <a:p>
             <a:r>
-              <a:rPr lang="en-US"/>
-              <a:t>Universal Functions</a:t>
+              <a:rPr lang="en-US" sz="2400"/>
+              <a:t>Random Numbers</a:t>
             </a:r>
             <a:endParaRPr lang="fa-IR"/>
           </a:p>
@@ -12589,19 +12550,33 @@
             </a:pPr>
             <a:r>
               <a:rPr lang="en-US" sz="1400"/>
-              <a:t>Converting iterative statements into a vector based operation is called </a:t>
-            </a:r>
-            <a:r>
-              <a:rPr lang="en-US" sz="1400">
+              <a:t>Generate Random Number</a:t>
+            </a:r>
+          </a:p>
+          <a:p>
+            <a:pPr marL="76200" indent="0">
+              <a:buNone/>
+            </a:pPr>
+            <a:r>
+              <a:rPr lang="en-US" sz="1100">
+                <a:latin typeface="Consolas" panose="020B0609020204030204" pitchFamily="49" charset="0"/>
+              </a:rPr>
+              <a:t>print(np.</a:t>
+            </a:r>
+            <a:r>
+              <a:rPr lang="en-US" sz="1100">
                 <a:solidFill>
                   <a:schemeClr val="accent1"/>
                 </a:solidFill>
-              </a:rPr>
-              <a:t>vectorization</a:t>
-            </a:r>
-            <a:r>
-              <a:rPr lang="en-US" sz="1400"/>
-              <a:t>.</a:t>
+                <a:latin typeface="Consolas" panose="020B0609020204030204" pitchFamily="49" charset="0"/>
+              </a:rPr>
+              <a:t>random.rand()</a:t>
+            </a:r>
+            <a:r>
+              <a:rPr lang="en-US" sz="1100">
+                <a:latin typeface="Consolas" panose="020B0609020204030204" pitchFamily="49" charset="0"/>
+              </a:rPr>
+              <a:t>)</a:t>
             </a:r>
           </a:p>
           <a:p>
@@ -12609,8 +12584,10 @@
               <a:buNone/>
             </a:pPr>
             <a:r>
-              <a:rPr lang="en-US" sz="1400"/>
-              <a:t>It is faster as modern CPUs are optimized for such operations.</a:t>
+              <a:rPr lang="en-US" sz="1100">
+                <a:latin typeface="Consolas" panose="020B0609020204030204" pitchFamily="49" charset="0"/>
+              </a:rPr>
+              <a:t>print(np.random.rand(2, 3))</a:t>
             </a:r>
           </a:p>
           <a:p>
@@ -12618,38 +12595,25 @@
               <a:buNone/>
             </a:pPr>
             <a:r>
-              <a:rPr lang="en-US" sz="1400">
+              <a:rPr lang="en-US" sz="1100">
+                <a:latin typeface="Consolas" panose="020B0609020204030204" pitchFamily="49" charset="0"/>
+              </a:rPr>
+              <a:t>print(np.random</a:t>
+            </a:r>
+            <a:r>
+              <a:rPr lang="en-US" sz="1100">
                 <a:solidFill>
                   <a:schemeClr val="accent1"/>
                 </a:solidFill>
-              </a:rPr>
-              <a:t>ufuncs</a:t>
-            </a:r>
-            <a:r>
-              <a:rPr lang="en-US" sz="1400"/>
-              <a:t> are used to implement vectorization in NumPy.</a:t>
-            </a:r>
-          </a:p>
-          <a:p>
-            <a:pPr marL="76200" indent="0">
-              <a:buNone/>
-            </a:pPr>
-            <a:r>
-              <a:rPr lang="en-US" sz="1100">
-                <a:latin typeface="Consolas" panose="020B0609020204030204" pitchFamily="49" charset="0"/>
-              </a:rPr>
-              <a:t>x, y = [1, 2, 3, 4], [5, 6, 7, 8]</a:t>
-            </a:r>
-          </a:p>
-          <a:p>
-            <a:pPr marL="76200" indent="0">
-              <a:buNone/>
-            </a:pPr>
-            <a:r>
-              <a:rPr lang="en-US" sz="1100">
-                <a:latin typeface="Consolas" panose="020B0609020204030204" pitchFamily="49" charset="0"/>
-              </a:rPr>
-              <a:t>print(np.</a:t>
+                <a:latin typeface="Consolas" panose="020B0609020204030204" pitchFamily="49" charset="0"/>
+              </a:rPr>
+              <a:t>.randint(</a:t>
+            </a:r>
+            <a:r>
+              <a:rPr lang="en-US" sz="1100">
+                <a:latin typeface="Consolas" panose="020B0609020204030204" pitchFamily="49" charset="0"/>
+              </a:rPr>
+              <a:t>50, 100</a:t>
             </a:r>
             <a:r>
               <a:rPr lang="en-US" sz="1100">
@@ -12658,13 +12622,24 @@
                 </a:solidFill>
                 <a:latin typeface="Consolas" panose="020B0609020204030204" pitchFamily="49" charset="0"/>
               </a:rPr>
-              <a:t>add(</a:t>
-            </a:r>
-            <a:r>
-              <a:rPr lang="en-US" sz="1100">
-                <a:latin typeface="Consolas" panose="020B0609020204030204" pitchFamily="49" charset="0"/>
-              </a:rPr>
-              <a:t>x, y</a:t>
+              <a:t>)</a:t>
+            </a:r>
+            <a:r>
+              <a:rPr lang="en-US" sz="1100">
+                <a:latin typeface="Consolas" panose="020B0609020204030204" pitchFamily="49" charset="0"/>
+              </a:rPr>
+              <a:t>)</a:t>
+            </a:r>
+          </a:p>
+          <a:p>
+            <a:pPr marL="76200" indent="0">
+              <a:buNone/>
+            </a:pPr>
+            <a:r>
+              <a:rPr lang="en-US" sz="1100">
+                <a:latin typeface="Consolas" panose="020B0609020204030204" pitchFamily="49" charset="0"/>
+              </a:rPr>
+              <a:t>print(np.random.randint(50, 100, </a:t>
             </a:r>
             <a:r>
               <a:rPr lang="en-US" sz="1100">
@@ -12673,13 +12648,28 @@
                 </a:solidFill>
                 <a:latin typeface="Consolas" panose="020B0609020204030204" pitchFamily="49" charset="0"/>
               </a:rPr>
-              <a:t>)</a:t>
-            </a:r>
-            <a:r>
-              <a:rPr lang="en-US" sz="1100">
-                <a:latin typeface="Consolas" panose="020B0609020204030204" pitchFamily="49" charset="0"/>
-              </a:rPr>
-              <a:t>)</a:t>
+              <a:t>size</a:t>
+            </a:r>
+            <a:r>
+              <a:rPr lang="en-US" sz="1100">
+                <a:latin typeface="Consolas" panose="020B0609020204030204" pitchFamily="49" charset="0"/>
+              </a:rPr>
+              <a:t> </a:t>
+            </a:r>
+            <a:r>
+              <a:rPr lang="en-US" sz="1100">
+                <a:solidFill>
+                  <a:schemeClr val="accent1"/>
+                </a:solidFill>
+                <a:latin typeface="Consolas" panose="020B0609020204030204" pitchFamily="49" charset="0"/>
+              </a:rPr>
+              <a:t>=</a:t>
+            </a:r>
+            <a:r>
+              <a:rPr lang="en-US" sz="1100">
+                <a:latin typeface="Consolas" panose="020B0609020204030204" pitchFamily="49" charset="0"/>
+              </a:rPr>
+              <a:t> (2, 3)))</a:t>
             </a:r>
           </a:p>
           <a:p>
@@ -12696,7 +12686,7 @@
             </a:pPr>
             <a:r>
               <a:rPr lang="en-US" sz="1400"/>
-              <a:t>Some useful ufuncs</a:t>
+              <a:t>Generate Random Number From Array</a:t>
             </a:r>
           </a:p>
           <a:p>
@@ -12707,7 +12697,37 @@
               <a:rPr lang="en-US" sz="1100">
                 <a:latin typeface="Consolas" panose="020B0609020204030204" pitchFamily="49" charset="0"/>
               </a:rPr>
-              <a:t>add()  subtract()  multiply()  divide()  power()  mod()  abs()</a:t>
+              <a:t>print(np.random.</a:t>
+            </a:r>
+            <a:r>
+              <a:rPr lang="en-US" sz="1100">
+                <a:solidFill>
+                  <a:schemeClr val="accent1"/>
+                </a:solidFill>
+                <a:latin typeface="Consolas" panose="020B0609020204030204" pitchFamily="49" charset="0"/>
+              </a:rPr>
+              <a:t>choice(</a:t>
+            </a:r>
+            <a:r>
+              <a:rPr lang="en-US" sz="1100">
+                <a:latin typeface="Consolas" panose="020B0609020204030204" pitchFamily="49" charset="0"/>
+              </a:rPr>
+              <a:t>[3, 5, 7, 9]</a:t>
+            </a:r>
+            <a:r>
+              <a:rPr lang="en-US" sz="1100">
+                <a:solidFill>
+                  <a:schemeClr val="accent1"/>
+                </a:solidFill>
+                <a:latin typeface="Consolas" panose="020B0609020204030204" pitchFamily="49" charset="0"/>
+              </a:rPr>
+              <a:t>)</a:t>
+            </a:r>
+            <a:r>
+              <a:rPr lang="en-US" sz="1100">
+                <a:latin typeface="Consolas" panose="020B0609020204030204" pitchFamily="49" charset="0"/>
+              </a:rPr>
+              <a:t>)</a:t>
             </a:r>
           </a:p>
           <a:p>
@@ -12718,11 +12738,64 @@
               <a:rPr lang="en-US" sz="1100">
                 <a:latin typeface="Consolas" panose="020B0609020204030204" pitchFamily="49" charset="0"/>
               </a:rPr>
-              <a:t>sum()  cumsum()  prod()  cumprod()  diff()</a:t>
-            </a:r>
-            <a:endParaRPr lang="en-US" sz="1400">
-              <a:latin typeface="Consolas" panose="020B0609020204030204" pitchFamily="49" charset="0"/>
-            </a:endParaRPr>
+              <a:t>print(np.random.choice([3, 5, 7, 9],</a:t>
+            </a:r>
+            <a:r>
+              <a:rPr lang="en-US" sz="1100">
+                <a:solidFill>
+                  <a:schemeClr val="accent1"/>
+                </a:solidFill>
+                <a:latin typeface="Consolas" panose="020B0609020204030204" pitchFamily="49" charset="0"/>
+              </a:rPr>
+              <a:t> size</a:t>
+            </a:r>
+            <a:r>
+              <a:rPr lang="en-US" sz="1100">
+                <a:latin typeface="Consolas" panose="020B0609020204030204" pitchFamily="49" charset="0"/>
+              </a:rPr>
+              <a:t> </a:t>
+            </a:r>
+            <a:r>
+              <a:rPr lang="en-US" sz="1100">
+                <a:solidFill>
+                  <a:schemeClr val="accent1"/>
+                </a:solidFill>
+                <a:latin typeface="Consolas" panose="020B0609020204030204" pitchFamily="49" charset="0"/>
+              </a:rPr>
+              <a:t>=</a:t>
+            </a:r>
+            <a:r>
+              <a:rPr lang="en-US" sz="1100">
+                <a:latin typeface="Consolas" panose="020B0609020204030204" pitchFamily="49" charset="0"/>
+              </a:rPr>
+              <a:t> (2, 3)))</a:t>
+            </a:r>
+          </a:p>
+          <a:p>
+            <a:pPr marL="76200" indent="0">
+              <a:buNone/>
+            </a:pPr>
+            <a:r>
+              <a:rPr lang="en-US" sz="1100">
+                <a:latin typeface="Consolas" panose="020B0609020204030204" pitchFamily="49" charset="0"/>
+              </a:rPr>
+              <a:t>print(np.random.choice([3, 5, 7, 9], </a:t>
+            </a:r>
+            <a:r>
+              <a:rPr lang="en-US" sz="1100">
+                <a:solidFill>
+                  <a:schemeClr val="accent1"/>
+                </a:solidFill>
+                <a:latin typeface="Consolas" panose="020B0609020204030204" pitchFamily="49" charset="0"/>
+              </a:rPr>
+              <a:t>p =</a:t>
+            </a:r>
+            <a:r>
+              <a:rPr lang="en-US" sz="1100">
+                <a:latin typeface="Consolas" panose="020B0609020204030204" pitchFamily="49" charset="0"/>
+              </a:rPr>
+              <a:t> [0.1, 0.3, 0.6, 0.0]))</a:t>
+            </a:r>
           </a:p>
         </p:txBody>
       </p:sp>
@@ -12767,7 +12840,7 @@
     </p:spTree>
     <p:extLst>
       <p:ext uri="{BB962C8B-B14F-4D97-AF65-F5344CB8AC3E}">
-        <p14:creationId xmlns:p14="http://schemas.microsoft.com/office/powerpoint/2010/main" val="2941565387"/>
+        <p14:creationId xmlns:p14="http://schemas.microsoft.com/office/powerpoint/2010/main" val="3730435872"/>
       </p:ext>
     </p:extLst>
   </p:cSld>
@@ -12782,7 +12855,7 @@
   <p:cSld>
     <p:spTree>
       <p:nvGrpSpPr>
-        <p:cNvPr id="1" name="Shape 96"/>
+        <p:cNvPr id="1" name=""/>
         <p:cNvGrpSpPr/>
         <p:nvPr/>
       </p:nvGrpSpPr>
@@ -12796,84 +12869,220 @@
       </p:grpSpPr>
       <p:sp>
         <p:nvSpPr>
-          <p:cNvPr id="97" name="Google Shape;97;p15"/>
-          <p:cNvSpPr txBox="1">
+          <p:cNvPr id="2" name="Title 1">
+            <a:extLst>
+              <a:ext uri="{FF2B5EF4-FFF2-40B4-BE49-F238E27FC236}">
+                <a16:creationId xmlns:a16="http://schemas.microsoft.com/office/drawing/2014/main" id="{024AD384-5AD1-4435-A943-1241B2FACD62}"/>
+              </a:ext>
+            </a:extLst>
+          </p:cNvPr>
+          <p:cNvSpPr>
             <a:spLocks noGrp="1"/>
           </p:cNvSpPr>
           <p:nvPr>
-            <p:ph type="ctrTitle"/>
+            <p:ph type="title"/>
+          </p:nvPr>
+        </p:nvSpPr>
+        <p:spPr/>
+        <p:txBody>
+          <a:bodyPr/>
+          <a:lstStyle/>
+          <a:p>
+            <a:r>
+              <a:rPr lang="en-US"/>
+              <a:t>Universal Functions</a:t>
+            </a:r>
+            <a:endParaRPr lang="fa-IR"/>
+          </a:p>
+        </p:txBody>
+      </p:sp>
+      <p:sp>
+        <p:nvSpPr>
+          <p:cNvPr id="3" name="Text Placeholder 2">
+            <a:extLst>
+              <a:ext uri="{FF2B5EF4-FFF2-40B4-BE49-F238E27FC236}">
+                <a16:creationId xmlns:a16="http://schemas.microsoft.com/office/drawing/2014/main" id="{58BE3078-8B89-4550-B497-93E4DADBD57E}"/>
+              </a:ext>
+            </a:extLst>
+          </p:cNvPr>
+          <p:cNvSpPr>
+            <a:spLocks noGrp="1"/>
+          </p:cNvSpPr>
+          <p:nvPr>
+            <p:ph type="body" idx="1"/>
           </p:nvPr>
         </p:nvSpPr>
         <p:spPr>
           <a:xfrm>
-            <a:off x="1655700" y="1991850"/>
-            <a:ext cx="5832600" cy="1159800"/>
+            <a:off x="786150" y="1142608"/>
+            <a:ext cx="7571700" cy="3626431"/>
           </a:xfrm>
-          <a:prstGeom prst="rect">
-            <a:avLst/>
-          </a:prstGeom>
         </p:spPr>
         <p:txBody>
-          <a:bodyPr spcFirstLastPara="1" wrap="square" lIns="91425" tIns="91425" rIns="91425" bIns="91425" anchor="ctr" anchorCtr="0">
-            <a:noAutofit/>
-          </a:bodyPr>
+          <a:bodyPr/>
           <a:lstStyle/>
           <a:p>
-            <a:pPr marL="0" lvl="0" indent="0" algn="ctr" rtl="0">
-              <a:spcBef>
-                <a:spcPts val="0"/>
-              </a:spcBef>
-              <a:spcAft>
-                <a:spcPts val="0"/>
-              </a:spcAft>
+            <a:pPr marL="76200" indent="0">
               <a:buNone/>
             </a:pPr>
             <a:r>
-              <a:rPr lang="en-US" sz="6000">
+              <a:rPr lang="en-US" sz="1400"/>
+              <a:t>Converting iterative statements into a vector based operation is called </a:t>
+            </a:r>
+            <a:r>
+              <a:rPr lang="en-US" sz="1400">
                 <a:solidFill>
-                  <a:srgbClr val="E6E6E6"/>
+                  <a:schemeClr val="accent1"/>
                 </a:solidFill>
               </a:rPr>
-              <a:t>2</a:t>
-            </a:r>
-            <a:endParaRPr sz="6000">
-              <a:solidFill>
-                <a:srgbClr val="E6E6E6"/>
-              </a:solidFill>
+              <a:t>vectorization</a:t>
+            </a:r>
+            <a:r>
+              <a:rPr lang="en-US" sz="1400"/>
+              <a:t>.</a:t>
+            </a:r>
+          </a:p>
+          <a:p>
+            <a:pPr marL="76200" indent="0">
+              <a:buNone/>
+            </a:pPr>
+            <a:r>
+              <a:rPr lang="en-US" sz="1400"/>
+              <a:t>It is faster as modern CPUs are optimized for such operations.</a:t>
+            </a:r>
+          </a:p>
+          <a:p>
+            <a:pPr marL="76200" indent="0">
+              <a:buNone/>
+            </a:pPr>
+            <a:r>
+              <a:rPr lang="en-US" sz="1400">
+                <a:solidFill>
+                  <a:schemeClr val="accent1"/>
+                </a:solidFill>
+              </a:rPr>
+              <a:t>ufuncs</a:t>
+            </a:r>
+            <a:r>
+              <a:rPr lang="en-US" sz="1400"/>
+              <a:t> are used to implement vectorization in NumPy.</a:t>
+            </a:r>
+          </a:p>
+          <a:p>
+            <a:pPr marL="76200" indent="0">
+              <a:buNone/>
+            </a:pPr>
+            <a:r>
+              <a:rPr lang="en-US" sz="1100">
+                <a:latin typeface="Consolas" panose="020B0609020204030204" pitchFamily="49" charset="0"/>
+              </a:rPr>
+              <a:t>x, y = [1, 2, 3, 4], [5, 6, 7, 8]</a:t>
+            </a:r>
+          </a:p>
+          <a:p>
+            <a:pPr marL="76200" indent="0">
+              <a:buNone/>
+            </a:pPr>
+            <a:r>
+              <a:rPr lang="en-US" sz="1100">
+                <a:latin typeface="Consolas" panose="020B0609020204030204" pitchFamily="49" charset="0"/>
+              </a:rPr>
+              <a:t>print(np.</a:t>
+            </a:r>
+            <a:r>
+              <a:rPr lang="en-US" sz="1100">
+                <a:solidFill>
+                  <a:schemeClr val="accent1"/>
+                </a:solidFill>
+                <a:latin typeface="Consolas" panose="020B0609020204030204" pitchFamily="49" charset="0"/>
+              </a:rPr>
+              <a:t>add(</a:t>
+            </a:r>
+            <a:r>
+              <a:rPr lang="en-US" sz="1100">
+                <a:latin typeface="Consolas" panose="020B0609020204030204" pitchFamily="49" charset="0"/>
+              </a:rPr>
+              <a:t>x, y</a:t>
+            </a:r>
+            <a:r>
+              <a:rPr lang="en-US" sz="1100">
+                <a:solidFill>
+                  <a:schemeClr val="accent1"/>
+                </a:solidFill>
+                <a:latin typeface="Consolas" panose="020B0609020204030204" pitchFamily="49" charset="0"/>
+              </a:rPr>
+              <a:t>)</a:t>
+            </a:r>
+            <a:r>
+              <a:rPr lang="en-US" sz="1100">
+                <a:latin typeface="Consolas" panose="020B0609020204030204" pitchFamily="49" charset="0"/>
+              </a:rPr>
+              <a:t>)</a:t>
+            </a:r>
+          </a:p>
+          <a:p>
+            <a:pPr marL="76200" indent="0">
+              <a:buNone/>
+            </a:pPr>
+            <a:endParaRPr lang="en-US" sz="1100">
+              <a:latin typeface="Consolas" panose="020B0609020204030204" pitchFamily="49" charset="0"/>
             </a:endParaRPr>
           </a:p>
           <a:p>
-            <a:r>
-              <a:rPr lang="en-US" b="1"/>
-              <a:t>Pandas</a:t>
-            </a:r>
-            <a:endParaRPr/>
+            <a:pPr marL="76200" indent="0">
+              <a:buNone/>
+            </a:pPr>
+            <a:r>
+              <a:rPr lang="en-US" sz="1400"/>
+              <a:t>Some useful ufuncs</a:t>
+            </a:r>
+          </a:p>
+          <a:p>
+            <a:pPr marL="76200" indent="0">
+              <a:buNone/>
+            </a:pPr>
+            <a:r>
+              <a:rPr lang="en-US" sz="1100">
+                <a:latin typeface="Consolas" panose="020B0609020204030204" pitchFamily="49" charset="0"/>
+              </a:rPr>
+              <a:t>add()  subtract()  multiply()  divide()  power()  mod()  abs()</a:t>
+            </a:r>
+          </a:p>
+          <a:p>
+            <a:pPr marL="76200" indent="0">
+              <a:buNone/>
+            </a:pPr>
+            <a:r>
+              <a:rPr lang="en-US" sz="1100">
+                <a:latin typeface="Consolas" panose="020B0609020204030204" pitchFamily="49" charset="0"/>
+              </a:rPr>
+              <a:t>sum()  cumsum()  prod()  cumprod()  diff()</a:t>
+            </a:r>
+            <a:endParaRPr lang="en-US" sz="1400">
+              <a:latin typeface="Consolas" panose="020B0609020204030204" pitchFamily="49" charset="0"/>
+            </a:endParaRPr>
           </a:p>
         </p:txBody>
       </p:sp>
       <p:sp>
         <p:nvSpPr>
-          <p:cNvPr id="99" name="Google Shape;99;p15"/>
-          <p:cNvSpPr txBox="1">
+          <p:cNvPr id="4" name="Slide Number Placeholder 3">
+            <a:extLst>
+              <a:ext uri="{FF2B5EF4-FFF2-40B4-BE49-F238E27FC236}">
+                <a16:creationId xmlns:a16="http://schemas.microsoft.com/office/drawing/2014/main" id="{64987AE6-EC0E-43DD-9376-95A5602EE5E1}"/>
+              </a:ext>
+            </a:extLst>
+          </p:cNvPr>
+          <p:cNvSpPr>
             <a:spLocks noGrp="1"/>
           </p:cNvSpPr>
           <p:nvPr>
-            <p:ph type="sldNum" idx="4294967295"/>
+            <p:ph type="sldNum" idx="12"/>
           </p:nvPr>
         </p:nvSpPr>
-        <p:spPr>
-          <a:xfrm>
-            <a:off x="8404384" y="4749851"/>
-            <a:ext cx="548700" cy="393600"/>
-          </a:xfrm>
-          <a:prstGeom prst="rect">
-            <a:avLst/>
-          </a:prstGeom>
-        </p:spPr>
+        <p:spPr/>
         <p:txBody>
-          <a:bodyPr spcFirstLastPara="1" wrap="square" lIns="91425" tIns="91425" rIns="91425" bIns="91425" anchor="t" anchorCtr="0">
-            <a:noAutofit/>
-          </a:bodyPr>
+          <a:bodyPr/>
           <a:lstStyle/>
           <a:p>
             <a:pPr marL="0" lvl="0" indent="0" algn="r" rtl="0">
@@ -12886,17 +13095,17 @@
               <a:buNone/>
             </a:pPr>
             <a:fld id="{00000000-1234-1234-1234-123412341234}" type="slidenum">
-              <a:rPr lang="en"/>
+              <a:rPr lang="en" smtClean="0"/>
               <a:t>15</a:t>
             </a:fld>
-            <a:endParaRPr/>
+            <a:endParaRPr lang="en"/>
           </a:p>
         </p:txBody>
       </p:sp>
     </p:spTree>
     <p:extLst>
       <p:ext uri="{BB962C8B-B14F-4D97-AF65-F5344CB8AC3E}">
-        <p14:creationId xmlns:p14="http://schemas.microsoft.com/office/powerpoint/2010/main" val="445305485"/>
+        <p14:creationId xmlns:p14="http://schemas.microsoft.com/office/powerpoint/2010/main" val="2941565387"/>
       </p:ext>
     </p:extLst>
   </p:cSld>
@@ -12963,7 +13172,7 @@
                   <a:srgbClr val="E6E6E6"/>
                 </a:solidFill>
               </a:rPr>
-              <a:t>3</a:t>
+              <a:t>2</a:t>
             </a:r>
             <a:endParaRPr sz="6000">
               <a:solidFill>
@@ -12973,8 +13182,8 @@
           </a:p>
           <a:p>
             <a:r>
-              <a:rPr lang="en"/>
-              <a:t>Matplotlib</a:t>
+              <a:rPr lang="en-US" b="1"/>
+              <a:t>Pandas</a:t>
             </a:r>
             <a:endParaRPr/>
           </a:p>
@@ -13025,7 +13234,7 @@
     </p:spTree>
     <p:extLst>
       <p:ext uri="{BB962C8B-B14F-4D97-AF65-F5344CB8AC3E}">
-        <p14:creationId xmlns:p14="http://schemas.microsoft.com/office/powerpoint/2010/main" val="550571345"/>
+        <p14:creationId xmlns:p14="http://schemas.microsoft.com/office/powerpoint/2010/main" val="445305485"/>
       </p:ext>
     </p:extLst>
   </p:cSld>
@@ -13092,7 +13301,7 @@
                   <a:srgbClr val="E6E6E6"/>
                 </a:solidFill>
               </a:rPr>
-              <a:t>4</a:t>
+              <a:t>3</a:t>
             </a:r>
             <a:endParaRPr sz="6000">
               <a:solidFill>
@@ -13102,8 +13311,8 @@
           </a:p>
           <a:p>
             <a:r>
-              <a:rPr lang="en-US"/>
-              <a:t>Scikit-learn</a:t>
+              <a:rPr lang="en"/>
+              <a:t>Matplotlib</a:t>
             </a:r>
             <a:endParaRPr/>
           </a:p>
@@ -13154,6 +13363,135 @@
     </p:spTree>
     <p:extLst>
       <p:ext uri="{BB962C8B-B14F-4D97-AF65-F5344CB8AC3E}">
+        <p14:creationId xmlns:p14="http://schemas.microsoft.com/office/powerpoint/2010/main" val="550571345"/>
+      </p:ext>
+    </p:extLst>
+  </p:cSld>
+  <p:clrMapOvr>
+    <a:masterClrMapping/>
+  </p:clrMapOvr>
+</p:sld>
+</file>
+
+<file path=ppt/slides/slide18.xml><?xml version="1.0" encoding="utf-8"?>
+<p:sld xmlns:a="http://schemas.openxmlformats.org/drawingml/2006/main" xmlns:r="http://schemas.openxmlformats.org/officeDocument/2006/relationships" xmlns:p="http://schemas.openxmlformats.org/presentationml/2006/main">
+  <p:cSld>
+    <p:spTree>
+      <p:nvGrpSpPr>
+        <p:cNvPr id="1" name="Shape 96"/>
+        <p:cNvGrpSpPr/>
+        <p:nvPr/>
+      </p:nvGrpSpPr>
+      <p:grpSpPr>
+        <a:xfrm>
+          <a:off x="0" y="0"/>
+          <a:ext cx="0" cy="0"/>
+          <a:chOff x="0" y="0"/>
+          <a:chExt cx="0" cy="0"/>
+        </a:xfrm>
+      </p:grpSpPr>
+      <p:sp>
+        <p:nvSpPr>
+          <p:cNvPr id="97" name="Google Shape;97;p15"/>
+          <p:cNvSpPr txBox="1">
+            <a:spLocks noGrp="1"/>
+          </p:cNvSpPr>
+          <p:nvPr>
+            <p:ph type="ctrTitle"/>
+          </p:nvPr>
+        </p:nvSpPr>
+        <p:spPr>
+          <a:xfrm>
+            <a:off x="1655700" y="1991850"/>
+            <a:ext cx="5832600" cy="1159800"/>
+          </a:xfrm>
+          <a:prstGeom prst="rect">
+            <a:avLst/>
+          </a:prstGeom>
+        </p:spPr>
+        <p:txBody>
+          <a:bodyPr spcFirstLastPara="1" wrap="square" lIns="91425" tIns="91425" rIns="91425" bIns="91425" anchor="ctr" anchorCtr="0">
+            <a:noAutofit/>
+          </a:bodyPr>
+          <a:lstStyle/>
+          <a:p>
+            <a:pPr marL="0" lvl="0" indent="0" algn="ctr" rtl="0">
+              <a:spcBef>
+                <a:spcPts val="0"/>
+              </a:spcBef>
+              <a:spcAft>
+                <a:spcPts val="0"/>
+              </a:spcAft>
+              <a:buNone/>
+            </a:pPr>
+            <a:r>
+              <a:rPr lang="en-US" sz="6000">
+                <a:solidFill>
+                  <a:srgbClr val="E6E6E6"/>
+                </a:solidFill>
+              </a:rPr>
+              <a:t>4</a:t>
+            </a:r>
+            <a:endParaRPr sz="6000">
+              <a:solidFill>
+                <a:srgbClr val="E6E6E6"/>
+              </a:solidFill>
+            </a:endParaRPr>
+          </a:p>
+          <a:p>
+            <a:r>
+              <a:rPr lang="en-US"/>
+              <a:t>Scikit-learn</a:t>
+            </a:r>
+            <a:endParaRPr/>
+          </a:p>
+        </p:txBody>
+      </p:sp>
+      <p:sp>
+        <p:nvSpPr>
+          <p:cNvPr id="99" name="Google Shape;99;p15"/>
+          <p:cNvSpPr txBox="1">
+            <a:spLocks noGrp="1"/>
+          </p:cNvSpPr>
+          <p:nvPr>
+            <p:ph type="sldNum" idx="4294967295"/>
+          </p:nvPr>
+        </p:nvSpPr>
+        <p:spPr>
+          <a:xfrm>
+            <a:off x="8404384" y="4749851"/>
+            <a:ext cx="548700" cy="393600"/>
+          </a:xfrm>
+          <a:prstGeom prst="rect">
+            <a:avLst/>
+          </a:prstGeom>
+        </p:spPr>
+        <p:txBody>
+          <a:bodyPr spcFirstLastPara="1" wrap="square" lIns="91425" tIns="91425" rIns="91425" bIns="91425" anchor="t" anchorCtr="0">
+            <a:noAutofit/>
+          </a:bodyPr>
+          <a:lstStyle/>
+          <a:p>
+            <a:pPr marL="0" lvl="0" indent="0" algn="r" rtl="0">
+              <a:spcBef>
+                <a:spcPts val="0"/>
+              </a:spcBef>
+              <a:spcAft>
+                <a:spcPts val="0"/>
+              </a:spcAft>
+              <a:buNone/>
+            </a:pPr>
+            <a:fld id="{00000000-1234-1234-1234-123412341234}" type="slidenum">
+              <a:rPr lang="en"/>
+              <a:t>18</a:t>
+            </a:fld>
+            <a:endParaRPr/>
+          </a:p>
+        </p:txBody>
+      </p:sp>
+    </p:spTree>
+    <p:extLst>
+      <p:ext uri="{BB962C8B-B14F-4D97-AF65-F5344CB8AC3E}">
         <p14:creationId xmlns:p14="http://schemas.microsoft.com/office/powerpoint/2010/main" val="2239011547"/>
       </p:ext>
     </p:extLst>
@@ -13164,7 +13502,7 @@
 </p:sld>
 </file>
 
-<file path=ppt/slides/slide18.xml><?xml version="1.0" encoding="utf-8"?>
+<file path=ppt/slides/slide19.xml><?xml version="1.0" encoding="utf-8"?>
 <p:sld xmlns:a="http://schemas.openxmlformats.org/drawingml/2006/main" xmlns:r="http://schemas.openxmlformats.org/officeDocument/2006/relationships" xmlns:p="http://schemas.openxmlformats.org/presentationml/2006/main">
   <p:cSld>
     <p:spTree>
@@ -13417,7 +13755,7 @@
             </a:pPr>
             <a:fld id="{00000000-1234-1234-1234-123412341234}" type="slidenum">
               <a:rPr lang="en"/>
-              <a:t>18</a:t>
+              <a:t>19</a:t>
             </a:fld>
             <a:endParaRPr/>
           </a:p>
@@ -13565,6 +13903,186 @@
   <p:cSld>
     <p:spTree>
       <p:nvGrpSpPr>
+        <p:cNvPr id="1" name=""/>
+        <p:cNvGrpSpPr/>
+        <p:nvPr/>
+      </p:nvGrpSpPr>
+      <p:grpSpPr>
+        <a:xfrm>
+          <a:off x="0" y="0"/>
+          <a:ext cx="0" cy="0"/>
+          <a:chOff x="0" y="0"/>
+          <a:chExt cx="0" cy="0"/>
+        </a:xfrm>
+      </p:grpSpPr>
+      <p:sp>
+        <p:nvSpPr>
+          <p:cNvPr id="2" name="Title 1">
+            <a:extLst>
+              <a:ext uri="{FF2B5EF4-FFF2-40B4-BE49-F238E27FC236}">
+                <a16:creationId xmlns:a16="http://schemas.microsoft.com/office/drawing/2014/main" id="{024AD384-5AD1-4435-A943-1241B2FACD62}"/>
+              </a:ext>
+            </a:extLst>
+          </p:cNvPr>
+          <p:cNvSpPr>
+            <a:spLocks noGrp="1"/>
+          </p:cNvSpPr>
+          <p:nvPr>
+            <p:ph type="title"/>
+          </p:nvPr>
+        </p:nvSpPr>
+        <p:spPr/>
+        <p:txBody>
+          <a:bodyPr/>
+          <a:lstStyle/>
+          <a:p>
+            <a:r>
+              <a:rPr lang="en-US"/>
+              <a:t>Data Science</a:t>
+            </a:r>
+            <a:endParaRPr lang="fa-IR"/>
+          </a:p>
+        </p:txBody>
+      </p:sp>
+      <p:sp>
+        <p:nvSpPr>
+          <p:cNvPr id="3" name="Text Placeholder 2">
+            <a:extLst>
+              <a:ext uri="{FF2B5EF4-FFF2-40B4-BE49-F238E27FC236}">
+                <a16:creationId xmlns:a16="http://schemas.microsoft.com/office/drawing/2014/main" id="{58BE3078-8B89-4550-B497-93E4DADBD57E}"/>
+              </a:ext>
+            </a:extLst>
+          </p:cNvPr>
+          <p:cNvSpPr>
+            <a:spLocks noGrp="1"/>
+          </p:cNvSpPr>
+          <p:nvPr>
+            <p:ph type="body" idx="1"/>
+          </p:nvPr>
+        </p:nvSpPr>
+        <p:spPr>
+          <a:xfrm>
+            <a:off x="786150" y="1142608"/>
+            <a:ext cx="3785850" cy="3626431"/>
+          </a:xfrm>
+        </p:spPr>
+        <p:txBody>
+          <a:bodyPr/>
+          <a:lstStyle/>
+          <a:p>
+            <a:pPr marL="76200" indent="0" algn="just">
+              <a:buNone/>
+            </a:pPr>
+            <a:r>
+              <a:rPr lang="en-US" sz="1400"/>
+              <a:t>A Data Scientist helps companies with data-driven decisions, to make their business better.</a:t>
+            </a:r>
+          </a:p>
+          <a:p>
+            <a:pPr marL="76200" indent="0" algn="just">
+              <a:buNone/>
+            </a:pPr>
+            <a:r>
+              <a:rPr lang="en-US" sz="1400"/>
+              <a:t>Data Science is a combination of multiple disciplines that uses statistics, data analysis, and machine learning to analyze data and to extract knowledge and insights from it.</a:t>
+            </a:r>
+          </a:p>
+          <a:p>
+            <a:pPr marL="76200" indent="0" algn="just">
+              <a:buNone/>
+            </a:pPr>
+            <a:r>
+              <a:rPr lang="en-US" sz="1400"/>
+              <a:t>Data Science is about data gathering, finding patterns in data, data analysis, make future predictions and decision-making.</a:t>
+            </a:r>
+          </a:p>
+        </p:txBody>
+      </p:sp>
+      <p:sp>
+        <p:nvSpPr>
+          <p:cNvPr id="4" name="Slide Number Placeholder 3">
+            <a:extLst>
+              <a:ext uri="{FF2B5EF4-FFF2-40B4-BE49-F238E27FC236}">
+                <a16:creationId xmlns:a16="http://schemas.microsoft.com/office/drawing/2014/main" id="{64987AE6-EC0E-43DD-9376-95A5602EE5E1}"/>
+              </a:ext>
+            </a:extLst>
+          </p:cNvPr>
+          <p:cNvSpPr>
+            <a:spLocks noGrp="1"/>
+          </p:cNvSpPr>
+          <p:nvPr>
+            <p:ph type="sldNum" idx="12"/>
+          </p:nvPr>
+        </p:nvSpPr>
+        <p:spPr/>
+        <p:txBody>
+          <a:bodyPr/>
+          <a:lstStyle/>
+          <a:p>
+            <a:pPr marL="0" lvl="0" indent="0" algn="r" rtl="0">
+              <a:spcBef>
+                <a:spcPts val="0"/>
+              </a:spcBef>
+              <a:spcAft>
+                <a:spcPts val="0"/>
+              </a:spcAft>
+              <a:buNone/>
+            </a:pPr>
+            <a:fld id="{00000000-1234-1234-1234-123412341234}" type="slidenum">
+              <a:rPr lang="en" smtClean="0"/>
+              <a:t>3</a:t>
+            </a:fld>
+            <a:endParaRPr lang="en"/>
+          </a:p>
+        </p:txBody>
+      </p:sp>
+      <p:pic>
+        <p:nvPicPr>
+          <p:cNvPr id="6" name="Picture 5">
+            <a:extLst>
+              <a:ext uri="{FF2B5EF4-FFF2-40B4-BE49-F238E27FC236}">
+                <a16:creationId xmlns:a16="http://schemas.microsoft.com/office/drawing/2014/main" id="{6D0C871E-937D-487A-B5C4-609476DCC06C}"/>
+              </a:ext>
+            </a:extLst>
+          </p:cNvPr>
+          <p:cNvPicPr>
+            <a:picLocks noChangeAspect="1"/>
+          </p:cNvPicPr>
+          <p:nvPr/>
+        </p:nvPicPr>
+        <p:blipFill rotWithShape="1">
+          <a:blip r:embed="rId2"/>
+          <a:srcRect l="1116" t="4764" r="1319" b="10547"/>
+          <a:stretch/>
+        </p:blipFill>
+        <p:spPr>
+          <a:xfrm>
+            <a:off x="4963092" y="1783005"/>
+            <a:ext cx="3441292" cy="2345635"/>
+          </a:xfrm>
+          <a:prstGeom prst="rect">
+            <a:avLst/>
+          </a:prstGeom>
+        </p:spPr>
+      </p:pic>
+    </p:spTree>
+    <p:extLst>
+      <p:ext uri="{BB962C8B-B14F-4D97-AF65-F5344CB8AC3E}">
+        <p14:creationId xmlns:p14="http://schemas.microsoft.com/office/powerpoint/2010/main" val="2643503708"/>
+      </p:ext>
+    </p:extLst>
+  </p:cSld>
+  <p:clrMapOvr>
+    <a:masterClrMapping/>
+  </p:clrMapOvr>
+</p:sld>
+</file>
+
+<file path=ppt/slides/slide4.xml><?xml version="1.0" encoding="utf-8"?>
+<p:sld xmlns:a="http://schemas.openxmlformats.org/drawingml/2006/main" xmlns:r="http://schemas.openxmlformats.org/officeDocument/2006/relationships" xmlns:p="http://schemas.openxmlformats.org/presentationml/2006/main">
+  <p:cSld>
+    <p:spTree>
+      <p:nvGrpSpPr>
         <p:cNvPr id="1" name="Shape 96"/>
         <p:cNvGrpSpPr/>
         <p:nvPr/>
@@ -13670,7 +14188,7 @@
             </a:pPr>
             <a:fld id="{00000000-1234-1234-1234-123412341234}" type="slidenum">
               <a:rPr lang="en"/>
-              <a:t>3</a:t>
+              <a:t>4</a:t>
             </a:fld>
             <a:endParaRPr/>
           </a:p>
@@ -13680,260 +14198,6 @@
     <p:extLst>
       <p:ext uri="{BB962C8B-B14F-4D97-AF65-F5344CB8AC3E}">
         <p14:creationId xmlns:p14="http://schemas.microsoft.com/office/powerpoint/2010/main" val="2573329746"/>
-      </p:ext>
-    </p:extLst>
-  </p:cSld>
-  <p:clrMapOvr>
-    <a:masterClrMapping/>
-  </p:clrMapOvr>
-</p:sld>
-</file>
-
-<file path=ppt/slides/slide4.xml><?xml version="1.0" encoding="utf-8"?>
-<p:sld xmlns:a="http://schemas.openxmlformats.org/drawingml/2006/main" xmlns:r="http://schemas.openxmlformats.org/officeDocument/2006/relationships" xmlns:p="http://schemas.openxmlformats.org/presentationml/2006/main">
-  <p:cSld>
-    <p:spTree>
-      <p:nvGrpSpPr>
-        <p:cNvPr id="1" name=""/>
-        <p:cNvGrpSpPr/>
-        <p:nvPr/>
-      </p:nvGrpSpPr>
-      <p:grpSpPr>
-        <a:xfrm>
-          <a:off x="0" y="0"/>
-          <a:ext cx="0" cy="0"/>
-          <a:chOff x="0" y="0"/>
-          <a:chExt cx="0" cy="0"/>
-        </a:xfrm>
-      </p:grpSpPr>
-      <p:sp>
-        <p:nvSpPr>
-          <p:cNvPr id="2" name="Title 1">
-            <a:extLst>
-              <a:ext uri="{FF2B5EF4-FFF2-40B4-BE49-F238E27FC236}">
-                <a16:creationId xmlns:a16="http://schemas.microsoft.com/office/drawing/2014/main" id="{024AD384-5AD1-4435-A943-1241B2FACD62}"/>
-              </a:ext>
-            </a:extLst>
-          </p:cNvPr>
-          <p:cNvSpPr>
-            <a:spLocks noGrp="1"/>
-          </p:cNvSpPr>
-          <p:nvPr>
-            <p:ph type="title"/>
-          </p:nvPr>
-        </p:nvSpPr>
-        <p:spPr/>
-        <p:txBody>
-          <a:bodyPr/>
-          <a:lstStyle/>
-          <a:p>
-            <a:r>
-              <a:rPr lang="en-US"/>
-              <a:t>Introduction</a:t>
-            </a:r>
-            <a:endParaRPr lang="fa-IR"/>
-          </a:p>
-        </p:txBody>
-      </p:sp>
-      <p:sp>
-        <p:nvSpPr>
-          <p:cNvPr id="3" name="Text Placeholder 2">
-            <a:extLst>
-              <a:ext uri="{FF2B5EF4-FFF2-40B4-BE49-F238E27FC236}">
-                <a16:creationId xmlns:a16="http://schemas.microsoft.com/office/drawing/2014/main" id="{58BE3078-8B89-4550-B497-93E4DADBD57E}"/>
-              </a:ext>
-            </a:extLst>
-          </p:cNvPr>
-          <p:cNvSpPr>
-            <a:spLocks noGrp="1"/>
-          </p:cNvSpPr>
-          <p:nvPr>
-            <p:ph type="body" idx="1"/>
-          </p:nvPr>
-        </p:nvSpPr>
-        <p:spPr>
-          <a:xfrm>
-            <a:off x="786150" y="1142608"/>
-            <a:ext cx="7571700" cy="3626431"/>
-          </a:xfrm>
-        </p:spPr>
-        <p:txBody>
-          <a:bodyPr/>
-          <a:lstStyle/>
-          <a:p>
-            <a:pPr marL="76200" indent="0">
-              <a:buNone/>
-            </a:pPr>
-            <a:r>
-              <a:rPr lang="en-US" sz="1400">
-                <a:solidFill>
-                  <a:schemeClr val="accent1"/>
-                </a:solidFill>
-              </a:rPr>
-              <a:t>NumPy</a:t>
-            </a:r>
-            <a:r>
-              <a:rPr lang="en-US" sz="1400"/>
-              <a:t> stands for </a:t>
-            </a:r>
-            <a:r>
-              <a:rPr lang="en-US" sz="1400">
-                <a:solidFill>
-                  <a:schemeClr val="accent1"/>
-                </a:solidFill>
-              </a:rPr>
-              <a:t>Numerical Python</a:t>
-            </a:r>
-            <a:r>
-              <a:rPr lang="en-US" sz="1400"/>
-              <a:t>.</a:t>
-            </a:r>
-          </a:p>
-          <a:p>
-            <a:pPr marL="76200" indent="0">
-              <a:buNone/>
-            </a:pPr>
-            <a:r>
-              <a:rPr lang="en-US" sz="1400"/>
-              <a:t>NumPy is a Python library used for working with arrays. It also has functions for working in domain of linear algebra, fourier transform, and matrices.</a:t>
-            </a:r>
-          </a:p>
-          <a:p>
-            <a:pPr marL="76200" indent="0">
-              <a:buNone/>
-            </a:pPr>
-            <a:r>
-              <a:rPr lang="en-US" sz="1400"/>
-              <a:t>NumPy aims to provide an array object that is up to 50x faster than lists. Arrays are very frequently used in data science. The array object in NumPy is called </a:t>
-            </a:r>
-            <a:r>
-              <a:rPr lang="en-US" sz="1400">
-                <a:solidFill>
-                  <a:schemeClr val="accent1"/>
-                </a:solidFill>
-              </a:rPr>
-              <a:t>ndarray</a:t>
-            </a:r>
-            <a:r>
-              <a:rPr lang="en-US" sz="1400"/>
-              <a:t>.</a:t>
-            </a:r>
-          </a:p>
-          <a:p>
-            <a:pPr marL="76200" indent="0">
-              <a:buNone/>
-            </a:pPr>
-            <a:r>
-              <a:rPr lang="en-US" sz="1400"/>
-              <a:t>Numpy documentation: </a:t>
-            </a:r>
-            <a:r>
-              <a:rPr lang="en-US" sz="1100">
-                <a:latin typeface="Consolas" panose="020B0609020204030204" pitchFamily="49" charset="0"/>
-                <a:hlinkClick r:id="rId2"/>
-              </a:rPr>
-              <a:t>https://numpy.org/doc/</a:t>
-            </a:r>
-            <a:endParaRPr lang="en-US" sz="1100">
-              <a:latin typeface="Consolas" panose="020B0609020204030204" pitchFamily="49" charset="0"/>
-            </a:endParaRPr>
-          </a:p>
-          <a:p>
-            <a:pPr marL="76200" indent="0">
-              <a:buNone/>
-            </a:pPr>
-            <a:endParaRPr lang="en-US" sz="1100">
-              <a:latin typeface="Consolas" panose="020B0609020204030204" pitchFamily="49" charset="0"/>
-            </a:endParaRPr>
-          </a:p>
-          <a:p>
-            <a:pPr marL="76200" indent="0">
-              <a:buNone/>
-            </a:pPr>
-            <a:r>
-              <a:rPr lang="en-US" sz="1400"/>
-              <a:t>Import</a:t>
-            </a:r>
-          </a:p>
-          <a:p>
-            <a:pPr marL="76200" indent="0">
-              <a:buNone/>
-            </a:pPr>
-            <a:r>
-              <a:rPr lang="en-US" sz="1100">
-                <a:latin typeface="Consolas" panose="020B0609020204030204" pitchFamily="49" charset="0"/>
-              </a:rPr>
-              <a:t>import </a:t>
-            </a:r>
-            <a:r>
-              <a:rPr lang="en-US" sz="1100">
-                <a:solidFill>
-                  <a:schemeClr val="accent1"/>
-                </a:solidFill>
-                <a:latin typeface="Consolas" panose="020B0609020204030204" pitchFamily="49" charset="0"/>
-              </a:rPr>
-              <a:t>numpy</a:t>
-            </a:r>
-            <a:r>
-              <a:rPr lang="en-US" sz="1100">
-                <a:latin typeface="Consolas" panose="020B0609020204030204" pitchFamily="49" charset="0"/>
-              </a:rPr>
-              <a:t> as </a:t>
-            </a:r>
-            <a:r>
-              <a:rPr lang="en-US" sz="1100">
-                <a:solidFill>
-                  <a:schemeClr val="accent1"/>
-                </a:solidFill>
-                <a:latin typeface="Consolas" panose="020B0609020204030204" pitchFamily="49" charset="0"/>
-              </a:rPr>
-              <a:t>np</a:t>
-            </a:r>
-          </a:p>
-        </p:txBody>
-      </p:sp>
-      <p:sp>
-        <p:nvSpPr>
-          <p:cNvPr id="4" name="Slide Number Placeholder 3">
-            <a:extLst>
-              <a:ext uri="{FF2B5EF4-FFF2-40B4-BE49-F238E27FC236}">
-                <a16:creationId xmlns:a16="http://schemas.microsoft.com/office/drawing/2014/main" id="{64987AE6-EC0E-43DD-9376-95A5602EE5E1}"/>
-              </a:ext>
-            </a:extLst>
-          </p:cNvPr>
-          <p:cNvSpPr>
-            <a:spLocks noGrp="1"/>
-          </p:cNvSpPr>
-          <p:nvPr>
-            <p:ph type="sldNum" idx="12"/>
-          </p:nvPr>
-        </p:nvSpPr>
-        <p:spPr/>
-        <p:txBody>
-          <a:bodyPr/>
-          <a:lstStyle/>
-          <a:p>
-            <a:pPr marL="0" lvl="0" indent="0" algn="r" rtl="0">
-              <a:spcBef>
-                <a:spcPts val="0"/>
-              </a:spcBef>
-              <a:spcAft>
-                <a:spcPts val="0"/>
-              </a:spcAft>
-              <a:buNone/>
-            </a:pPr>
-            <a:fld id="{00000000-1234-1234-1234-123412341234}" type="slidenum">
-              <a:rPr lang="en" smtClean="0"/>
-              <a:t>4</a:t>
-            </a:fld>
-            <a:endParaRPr lang="en"/>
-          </a:p>
-        </p:txBody>
-      </p:sp>
-    </p:spTree>
-    <p:extLst>
-      <p:ext uri="{BB962C8B-B14F-4D97-AF65-F5344CB8AC3E}">
-        <p14:creationId xmlns:p14="http://schemas.microsoft.com/office/powerpoint/2010/main" val="4156460407"/>
       </p:ext>
     </p:extLst>
   </p:cSld>
@@ -13982,8 +14246,8 @@
           <a:lstStyle/>
           <a:p>
             <a:r>
-              <a:rPr lang="en-US" sz="2400"/>
-              <a:t>Arrays</a:t>
+              <a:rPr lang="en-US"/>
+              <a:t>Introduction</a:t>
             </a:r>
             <a:endParaRPr lang="fa-IR"/>
           </a:p>
@@ -14015,116 +14279,85 @@
           <a:bodyPr/>
           <a:lstStyle/>
           <a:p>
-            <a:pPr marL="76200" indent="0">
+            <a:pPr marL="76200" indent="0" algn="just">
               <a:buNone/>
             </a:pPr>
             <a:r>
-              <a:rPr lang="en-US" sz="1400"/>
-              <a:t>Create</a:t>
-            </a:r>
-          </a:p>
-          <a:p>
-            <a:pPr marL="76200" indent="0">
-              <a:buNone/>
-            </a:pPr>
-            <a:r>
-              <a:rPr lang="en-US" sz="1100">
-                <a:latin typeface="Consolas" panose="020B0609020204030204" pitchFamily="49" charset="0"/>
-              </a:rPr>
-              <a:t>arr0 = np.</a:t>
-            </a:r>
-            <a:r>
-              <a:rPr lang="en-US" sz="1100">
+              <a:rPr lang="en-US" sz="1400">
                 <a:solidFill>
                   <a:schemeClr val="accent1"/>
                 </a:solidFill>
-                <a:latin typeface="Consolas" panose="020B0609020204030204" pitchFamily="49" charset="0"/>
-              </a:rPr>
-              <a:t>array(</a:t>
-            </a:r>
-            <a:r>
-              <a:rPr lang="en-US" sz="1100">
-                <a:latin typeface="Consolas" panose="020B0609020204030204" pitchFamily="49" charset="0"/>
-              </a:rPr>
-              <a:t>1</a:t>
-            </a:r>
-            <a:r>
-              <a:rPr lang="en-US" sz="1100">
+              </a:rPr>
+              <a:t>NumPy</a:t>
+            </a:r>
+            <a:r>
+              <a:rPr lang="en-US" sz="1400"/>
+              <a:t> stands for </a:t>
+            </a:r>
+            <a:r>
+              <a:rPr lang="en-US" sz="1400">
                 <a:solidFill>
                   <a:schemeClr val="accent1"/>
                 </a:solidFill>
-                <a:latin typeface="Consolas" panose="020B0609020204030204" pitchFamily="49" charset="0"/>
-              </a:rPr>
-              <a:t>)</a:t>
-            </a:r>
-            <a:r>
-              <a:rPr lang="en-US" sz="1100">
-                <a:latin typeface="Consolas" panose="020B0609020204030204" pitchFamily="49" charset="0"/>
-              </a:rPr>
-              <a:t> </a:t>
-            </a:r>
-          </a:p>
-          <a:p>
-            <a:pPr marL="76200" indent="0">
+              </a:rPr>
+              <a:t>Numerical Python</a:t>
+            </a:r>
+            <a:r>
+              <a:rPr lang="en-US" sz="1400"/>
+              <a:t>.</a:t>
+            </a:r>
+          </a:p>
+          <a:p>
+            <a:pPr marL="76200" indent="0" algn="just">
               <a:buNone/>
             </a:pPr>
             <a:r>
-              <a:rPr lang="en-US" sz="1100">
-                <a:latin typeface="Consolas" panose="020B0609020204030204" pitchFamily="49" charset="0"/>
-              </a:rPr>
-              <a:t>arr1 = np.array([1, 2, 3])</a:t>
-            </a:r>
-          </a:p>
-          <a:p>
-            <a:pPr marL="76200" indent="0">
+              <a:rPr lang="en-US" sz="1400"/>
+              <a:t>NumPy is a Python library used for working with arrays. It also has functions for working in domain of linear algebra, fourier transform, and matrices.</a:t>
+            </a:r>
+          </a:p>
+          <a:p>
+            <a:pPr marL="76200" indent="0" algn="just">
               <a:buNone/>
             </a:pPr>
             <a:r>
-              <a:rPr lang="en-US" sz="1100">
-                <a:latin typeface="Consolas" panose="020B0609020204030204" pitchFamily="49" charset="0"/>
-              </a:rPr>
-              <a:t>arr2 = np.array([[1, 2, 3], [2, 3, 4]])</a:t>
-            </a:r>
-          </a:p>
-          <a:p>
-            <a:pPr marL="76200" indent="0">
-              <a:buNone/>
-            </a:pPr>
-            <a:r>
-              <a:rPr lang="en-US" sz="1100">
-                <a:latin typeface="Consolas" panose="020B0609020204030204" pitchFamily="49" charset="0"/>
-              </a:rPr>
-              <a:t>arr3 = np.array([[[1, 2, 3], [2, 3, 4]], [[3, 4, 5], [4, 5, 6]]])</a:t>
-            </a:r>
-          </a:p>
-          <a:p>
-            <a:pPr marL="76200" indent="0">
-              <a:buNone/>
-            </a:pPr>
-            <a:r>
-              <a:rPr lang="en-US" sz="1100">
-                <a:latin typeface="Consolas" panose="020B0609020204030204" pitchFamily="49" charset="0"/>
-              </a:rPr>
-              <a:t>print(arr2</a:t>
-            </a:r>
-            <a:r>
-              <a:rPr lang="en-US" sz="1100">
+              <a:rPr lang="en-US" sz="1400"/>
+              <a:t>NumPy aims to provide an array object that is up to 50x faster than lists. Arrays are very frequently used in data science. The array object in NumPy is called </a:t>
+            </a:r>
+            <a:r>
+              <a:rPr lang="en-US" sz="1400">
                 <a:solidFill>
                   <a:schemeClr val="accent1"/>
                 </a:solidFill>
-                <a:latin typeface="Consolas" panose="020B0609020204030204" pitchFamily="49" charset="0"/>
-              </a:rPr>
-              <a:t>.ndim</a:t>
-            </a:r>
-            <a:r>
-              <a:rPr lang="en-US" sz="1100">
-                <a:latin typeface="Consolas" panose="020B0609020204030204" pitchFamily="49" charset="0"/>
-              </a:rPr>
-              <a:t>)</a:t>
-            </a:r>
-          </a:p>
-          <a:p>
-            <a:pPr marL="76200" indent="0">
+              </a:rPr>
+              <a:t>ndarray</a:t>
+            </a:r>
+            <a:r>
+              <a:rPr lang="en-US" sz="1400"/>
+              <a:t>.</a:t>
+            </a:r>
+          </a:p>
+          <a:p>
+            <a:pPr marL="76200" indent="0" algn="just">
+              <a:buNone/>
+            </a:pPr>
+            <a:r>
+              <a:rPr lang="en-US" sz="1400"/>
+              <a:t>Numpy documentation: </a:t>
+            </a:r>
+            <a:r>
+              <a:rPr lang="en-US" sz="1100">
+                <a:latin typeface="Consolas" panose="020B0609020204030204" pitchFamily="49" charset="0"/>
+                <a:hlinkClick r:id="rId2"/>
+              </a:rPr>
+              <a:t>https://numpy.org/doc/</a:t>
+            </a:r>
+            <a:endParaRPr lang="en-US" sz="1100">
+              <a:latin typeface="Consolas" panose="020B0609020204030204" pitchFamily="49" charset="0"/>
+            </a:endParaRPr>
+          </a:p>
+          <a:p>
+            <a:pPr marL="76200" indent="0" algn="just">
               <a:buNone/>
             </a:pPr>
             <a:endParaRPr lang="en-US" sz="1100">
@@ -14132,34 +14365,23 @@
             </a:endParaRPr>
           </a:p>
           <a:p>
-            <a:pPr marL="76200" indent="0">
+            <a:pPr marL="76200" indent="0" algn="just">
               <a:buNone/>
             </a:pPr>
             <a:r>
               <a:rPr lang="en-US" sz="1400"/>
-              <a:t>Slice</a:t>
-            </a:r>
-          </a:p>
-          <a:p>
-            <a:pPr marL="76200" indent="0">
+              <a:t>Import</a:t>
+            </a:r>
+          </a:p>
+          <a:p>
+            <a:pPr marL="76200" indent="0" algn="just">
               <a:buNone/>
             </a:pPr>
             <a:r>
               <a:rPr lang="en-US" sz="1100">
                 <a:latin typeface="Consolas" panose="020B0609020204030204" pitchFamily="49" charset="0"/>
               </a:rPr>
-              <a:t>arr = np.array([[1, 2, 3, 4, 5], [6, 7, 8, 9, 10]])</a:t>
-            </a:r>
-          </a:p>
-          <a:p>
-            <a:pPr marL="76200" indent="0">
-              <a:buNone/>
-            </a:pPr>
-            <a:r>
-              <a:rPr lang="en-US" sz="1100">
-                <a:latin typeface="Consolas" panose="020B0609020204030204" pitchFamily="49" charset="0"/>
-              </a:rPr>
-              <a:t>print(arr</a:t>
+              <a:t>import </a:t>
             </a:r>
             <a:r>
               <a:rPr lang="en-US" sz="1100">
@@ -14168,13 +14390,13 @@
                 </a:solidFill>
                 <a:latin typeface="Consolas" panose="020B0609020204030204" pitchFamily="49" charset="0"/>
               </a:rPr>
-              <a:t>[</a:t>
-            </a:r>
-            <a:r>
-              <a:rPr lang="en-US" sz="1100">
-                <a:latin typeface="Consolas" panose="020B0609020204030204" pitchFamily="49" charset="0"/>
-              </a:rPr>
-              <a:t>1</a:t>
+              <a:t>numpy</a:t>
+            </a:r>
+            <a:r>
+              <a:rPr lang="en-US" sz="1100">
+                <a:latin typeface="Consolas" panose="020B0609020204030204" pitchFamily="49" charset="0"/>
+              </a:rPr>
+              <a:t> as </a:t>
             </a:r>
             <a:r>
               <a:rPr lang="en-US" sz="1100">
@@ -14183,43 +14405,7 @@
                 </a:solidFill>
                 <a:latin typeface="Consolas" panose="020B0609020204030204" pitchFamily="49" charset="0"/>
               </a:rPr>
-              <a:t>,</a:t>
-            </a:r>
-            <a:r>
-              <a:rPr lang="en-US" sz="1100">
-                <a:latin typeface="Consolas" panose="020B0609020204030204" pitchFamily="49" charset="0"/>
-              </a:rPr>
-              <a:t> 5</a:t>
-            </a:r>
-            <a:r>
-              <a:rPr lang="en-US" sz="1100">
-                <a:solidFill>
-                  <a:schemeClr val="accent1"/>
-                </a:solidFill>
-                <a:latin typeface="Consolas" panose="020B0609020204030204" pitchFamily="49" charset="0"/>
-              </a:rPr>
-              <a:t>]</a:t>
-            </a:r>
-            <a:r>
-              <a:rPr lang="en-US" sz="1100">
-                <a:latin typeface="Consolas" panose="020B0609020204030204" pitchFamily="49" charset="0"/>
-              </a:rPr>
-              <a:t>, arr[1, 1</a:t>
-            </a:r>
-            <a:r>
-              <a:rPr lang="en-US" sz="1100">
-                <a:solidFill>
-                  <a:schemeClr val="accent1"/>
-                </a:solidFill>
-                <a:latin typeface="Consolas" panose="020B0609020204030204" pitchFamily="49" charset="0"/>
-              </a:rPr>
-              <a:t>:</a:t>
-            </a:r>
-            <a:r>
-              <a:rPr lang="en-US" sz="1100">
-                <a:latin typeface="Consolas" panose="020B0609020204030204" pitchFamily="49" charset="0"/>
-              </a:rPr>
-              <a:t>4], arr[0:2, 1:4])</a:t>
+              <a:t>np</a:t>
             </a:r>
           </a:p>
         </p:txBody>
@@ -14265,7 +14451,7 @@
     </p:spTree>
     <p:extLst>
       <p:ext uri="{BB962C8B-B14F-4D97-AF65-F5344CB8AC3E}">
-        <p14:creationId xmlns:p14="http://schemas.microsoft.com/office/powerpoint/2010/main" val="3904564301"/>
+        <p14:creationId xmlns:p14="http://schemas.microsoft.com/office/powerpoint/2010/main" val="4156460407"/>
       </p:ext>
     </p:extLst>
   </p:cSld>
@@ -14315,7 +14501,7 @@
           <a:p>
             <a:r>
               <a:rPr lang="en-US" sz="2400"/>
-              <a:t>Data Types</a:t>
+              <a:t>Arrays</a:t>
             </a:r>
             <a:endParaRPr lang="fa-IR"/>
           </a:p>
@@ -14339,42 +14525,31 @@
         </p:nvSpPr>
         <p:spPr>
           <a:xfrm>
-            <a:off x="786149" y="1142608"/>
-            <a:ext cx="7571699" cy="3626431"/>
+            <a:off x="786150" y="1142608"/>
+            <a:ext cx="7571700" cy="3626431"/>
           </a:xfrm>
         </p:spPr>
         <p:txBody>
           <a:bodyPr/>
           <a:lstStyle/>
           <a:p>
-            <a:pPr marL="76200" indent="0">
+            <a:pPr marL="76200" indent="0" algn="just">
               <a:buNone/>
             </a:pPr>
             <a:r>
               <a:rPr lang="en-US" sz="1400"/>
-              <a:t>Check</a:t>
-            </a:r>
-          </a:p>
-          <a:p>
-            <a:pPr marL="76200" indent="0">
+              <a:t>Create</a:t>
+            </a:r>
+          </a:p>
+          <a:p>
+            <a:pPr marL="76200" indent="0" algn="just">
               <a:buNone/>
             </a:pPr>
             <a:r>
               <a:rPr lang="en-US" sz="1100">
                 <a:latin typeface="Consolas" panose="020B0609020204030204" pitchFamily="49" charset="0"/>
               </a:rPr>
-              <a:t>arr = np.array([1, 2, 3, 4])</a:t>
-            </a:r>
-          </a:p>
-          <a:p>
-            <a:pPr marL="76200" indent="0">
-              <a:buNone/>
-            </a:pPr>
-            <a:r>
-              <a:rPr lang="en-US" sz="1100">
-                <a:latin typeface="Consolas" panose="020B0609020204030204" pitchFamily="49" charset="0"/>
-              </a:rPr>
-              <a:t>print(arr.</a:t>
+              <a:t>arr0 = np.</a:t>
             </a:r>
             <a:r>
               <a:rPr lang="en-US" sz="1100">
@@ -14383,17 +14558,91 @@
                 </a:solidFill>
                 <a:latin typeface="Consolas" panose="020B0609020204030204" pitchFamily="49" charset="0"/>
               </a:rPr>
-              <a:t>dtype</a:t>
-            </a:r>
-            <a:r>
-              <a:rPr lang="en-US" sz="1100">
-                <a:latin typeface="Consolas" panose="020B0609020204030204" pitchFamily="49" charset="0"/>
-              </a:rPr>
-              <a:t>) </a:t>
-            </a:r>
-          </a:p>
-          <a:p>
-            <a:pPr marL="76200" indent="0">
+              <a:t>array(</a:t>
+            </a:r>
+            <a:r>
+              <a:rPr lang="en-US" sz="1100">
+                <a:latin typeface="Consolas" panose="020B0609020204030204" pitchFamily="49" charset="0"/>
+              </a:rPr>
+              <a:t>1</a:t>
+            </a:r>
+            <a:r>
+              <a:rPr lang="en-US" sz="1100">
+                <a:solidFill>
+                  <a:schemeClr val="accent1"/>
+                </a:solidFill>
+                <a:latin typeface="Consolas" panose="020B0609020204030204" pitchFamily="49" charset="0"/>
+              </a:rPr>
+              <a:t>)</a:t>
+            </a:r>
+            <a:r>
+              <a:rPr lang="en-US" sz="1100">
+                <a:latin typeface="Consolas" panose="020B0609020204030204" pitchFamily="49" charset="0"/>
+              </a:rPr>
+              <a:t> </a:t>
+            </a:r>
+          </a:p>
+          <a:p>
+            <a:pPr marL="76200" indent="0" algn="just">
+              <a:buNone/>
+            </a:pPr>
+            <a:r>
+              <a:rPr lang="en-US" sz="1100">
+                <a:latin typeface="Consolas" panose="020B0609020204030204" pitchFamily="49" charset="0"/>
+              </a:rPr>
+              <a:t>arr1 = np.array([1, 2, 3])</a:t>
+            </a:r>
+          </a:p>
+          <a:p>
+            <a:pPr marL="76200" indent="0" algn="just">
+              <a:buNone/>
+            </a:pPr>
+            <a:r>
+              <a:rPr lang="en-US" sz="1100">
+                <a:latin typeface="Consolas" panose="020B0609020204030204" pitchFamily="49" charset="0"/>
+              </a:rPr>
+              <a:t>arr2 = np.array([[1, 2, 3], [2, 3, 4]])</a:t>
+            </a:r>
+          </a:p>
+          <a:p>
+            <a:pPr marL="76200" indent="0" algn="just">
+              <a:buNone/>
+            </a:pPr>
+            <a:r>
+              <a:rPr lang="en-US" sz="1100">
+                <a:latin typeface="Consolas" panose="020B0609020204030204" pitchFamily="49" charset="0"/>
+              </a:rPr>
+              <a:t>arr3 = np.array([[[1, 2, 3], [2, 3, 4]], [[3, 4, 5], [4, 5, 6]]])</a:t>
+            </a:r>
+          </a:p>
+          <a:p>
+            <a:pPr marL="76200" indent="0" algn="just">
+              <a:buNone/>
+            </a:pPr>
+            <a:r>
+              <a:rPr lang="en-US" sz="1100">
+                <a:latin typeface="Consolas" panose="020B0609020204030204" pitchFamily="49" charset="0"/>
+              </a:rPr>
+              <a:t>print(arr2</a:t>
+            </a:r>
+            <a:r>
+              <a:rPr lang="en-US" sz="1100">
+                <a:solidFill>
+                  <a:schemeClr val="accent1"/>
+                </a:solidFill>
+                <a:latin typeface="Consolas" panose="020B0609020204030204" pitchFamily="49" charset="0"/>
+              </a:rPr>
+              <a:t>.ndim</a:t>
+            </a:r>
+            <a:r>
+              <a:rPr lang="en-US" sz="1100">
+                <a:latin typeface="Consolas" panose="020B0609020204030204" pitchFamily="49" charset="0"/>
+              </a:rPr>
+              <a:t>)</a:t>
+            </a:r>
+          </a:p>
+          <a:p>
+            <a:pPr marL="76200" indent="0" algn="just">
               <a:buNone/>
             </a:pPr>
             <a:endParaRPr lang="en-US" sz="1100">
@@ -14401,23 +14650,34 @@
             </a:endParaRPr>
           </a:p>
           <a:p>
-            <a:pPr marL="76200" indent="0">
+            <a:pPr marL="76200" indent="0" algn="just">
               <a:buNone/>
             </a:pPr>
             <a:r>
               <a:rPr lang="en-US" sz="1400"/>
-              <a:t>Define</a:t>
-            </a:r>
-          </a:p>
-          <a:p>
-            <a:pPr marL="76200" indent="0">
+              <a:t>Slice</a:t>
+            </a:r>
+          </a:p>
+          <a:p>
+            <a:pPr marL="76200" indent="0" algn="just">
               <a:buNone/>
             </a:pPr>
             <a:r>
               <a:rPr lang="en-US" sz="1100">
                 <a:latin typeface="Consolas" panose="020B0609020204030204" pitchFamily="49" charset="0"/>
               </a:rPr>
-              <a:t>arr = np.array([1, 2, 3, 4], </a:t>
+              <a:t>arr = np.array([[1, 2, 3, 4, 5], [6, 7, 8, 9, 10]])</a:t>
+            </a:r>
+          </a:p>
+          <a:p>
+            <a:pPr marL="76200" indent="0" algn="just">
+              <a:buNone/>
+            </a:pPr>
+            <a:r>
+              <a:rPr lang="en-US" sz="1100">
+                <a:latin typeface="Consolas" panose="020B0609020204030204" pitchFamily="49" charset="0"/>
+              </a:rPr>
+              <a:t>print(arr</a:t>
             </a:r>
             <a:r>
               <a:rPr lang="en-US" sz="1100">
@@ -14426,63 +14686,13 @@
                 </a:solidFill>
                 <a:latin typeface="Consolas" panose="020B0609020204030204" pitchFamily="49" charset="0"/>
               </a:rPr>
-              <a:t>dtype =</a:t>
-            </a:r>
-            <a:r>
-              <a:rPr lang="en-US" sz="1100">
-                <a:latin typeface="Consolas" panose="020B0609020204030204" pitchFamily="49" charset="0"/>
-              </a:rPr>
-              <a:t> 'S')</a:t>
-            </a:r>
-          </a:p>
-          <a:p>
-            <a:pPr marL="76200" indent="0">
-              <a:buNone/>
-            </a:pPr>
-            <a:r>
-              <a:rPr lang="en-US" sz="1100">
-                <a:latin typeface="Consolas" panose="020B0609020204030204" pitchFamily="49" charset="0"/>
-              </a:rPr>
-              <a:t>print(arr.dtype) </a:t>
-            </a:r>
-          </a:p>
-          <a:p>
-            <a:pPr marL="76200" indent="0">
-              <a:buNone/>
-            </a:pPr>
-            <a:endParaRPr lang="en-US" sz="1100">
-              <a:latin typeface="Consolas" panose="020B0609020204030204" pitchFamily="49" charset="0"/>
-            </a:endParaRPr>
-          </a:p>
-          <a:p>
-            <a:pPr marL="76200" indent="0">
-              <a:buNone/>
-            </a:pPr>
-            <a:r>
-              <a:rPr lang="en-US" sz="1400"/>
-              <a:t>Convert</a:t>
-            </a:r>
-          </a:p>
-          <a:p>
-            <a:pPr marL="76200" indent="0">
-              <a:buNone/>
-            </a:pPr>
-            <a:r>
-              <a:rPr lang="en-US" sz="1100">
-                <a:latin typeface="Consolas" panose="020B0609020204030204" pitchFamily="49" charset="0"/>
-              </a:rPr>
-              <a:t>arr = np.array([1, 2, 3, 4])</a:t>
-            </a:r>
-          </a:p>
-          <a:p>
-            <a:pPr marL="76200" indent="0">
-              <a:buNone/>
-            </a:pPr>
-            <a:r>
-              <a:rPr lang="en-US" sz="1100">
-                <a:latin typeface="Consolas" panose="020B0609020204030204" pitchFamily="49" charset="0"/>
-              </a:rPr>
-              <a:t>newArr = arr.</a:t>
+              <a:t>[</a:t>
+            </a:r>
+            <a:r>
+              <a:rPr lang="en-US" sz="1100">
+                <a:latin typeface="Consolas" panose="020B0609020204030204" pitchFamily="49" charset="0"/>
+              </a:rPr>
+              <a:t>1</a:t>
             </a:r>
             <a:r>
               <a:rPr lang="en-US" sz="1100">
@@ -14491,13 +14701,13 @@
                 </a:solidFill>
                 <a:latin typeface="Consolas" panose="020B0609020204030204" pitchFamily="49" charset="0"/>
               </a:rPr>
-              <a:t>astype(</a:t>
-            </a:r>
-            <a:r>
-              <a:rPr lang="en-US" sz="1100">
-                <a:latin typeface="Consolas" panose="020B0609020204030204" pitchFamily="49" charset="0"/>
-              </a:rPr>
-              <a:t>'S'</a:t>
+              <a:t>,</a:t>
+            </a:r>
+            <a:r>
+              <a:rPr lang="en-US" sz="1100">
+                <a:latin typeface="Consolas" panose="020B0609020204030204" pitchFamily="49" charset="0"/>
+              </a:rPr>
+              <a:t> 5</a:t>
             </a:r>
             <a:r>
               <a:rPr lang="en-US" sz="1100">
@@ -14506,18 +14716,28 @@
                 </a:solidFill>
                 <a:latin typeface="Consolas" panose="020B0609020204030204" pitchFamily="49" charset="0"/>
               </a:rPr>
-              <a:t>)</a:t>
-            </a:r>
-          </a:p>
-          <a:p>
-            <a:pPr marL="76200" indent="0">
-              <a:buNone/>
-            </a:pPr>
-            <a:r>
-              <a:rPr lang="en-US" sz="1100">
-                <a:latin typeface="Consolas" panose="020B0609020204030204" pitchFamily="49" charset="0"/>
-              </a:rPr>
-              <a:t>print(arr.dtype, newArr.dtype)</a:t>
+              <a:t>]</a:t>
+            </a:r>
+            <a:r>
+              <a:rPr lang="en-US" sz="1100">
+                <a:latin typeface="Consolas" panose="020B0609020204030204" pitchFamily="49" charset="0"/>
+              </a:rPr>
+              <a:t>, arr[1, 1</a:t>
+            </a:r>
+            <a:r>
+              <a:rPr lang="en-US" sz="1100">
+                <a:solidFill>
+                  <a:schemeClr val="accent1"/>
+                </a:solidFill>
+                <a:latin typeface="Consolas" panose="020B0609020204030204" pitchFamily="49" charset="0"/>
+              </a:rPr>
+              <a:t>:</a:t>
+            </a:r>
+            <a:r>
+              <a:rPr lang="en-US" sz="1100">
+                <a:latin typeface="Consolas" panose="020B0609020204030204" pitchFamily="49" charset="0"/>
+              </a:rPr>
+              <a:t>4], arr[0:2, 1:4])</a:t>
             </a:r>
           </a:p>
         </p:txBody>
@@ -14560,38 +14780,10 @@
           </a:p>
         </p:txBody>
       </p:sp>
-      <p:graphicFrame>
-        <p:nvGraphicFramePr>
-          <p:cNvPr id="7" name="Diagram 6">
-            <a:extLst>
-              <a:ext uri="{FF2B5EF4-FFF2-40B4-BE49-F238E27FC236}">
-                <a16:creationId xmlns:a16="http://schemas.microsoft.com/office/drawing/2014/main" id="{C34AFF02-5127-48DD-81A7-8FCF3BEEC3C6}"/>
-              </a:ext>
-            </a:extLst>
-          </p:cNvPr>
-          <p:cNvGraphicFramePr/>
-          <p:nvPr>
-            <p:extLst>
-              <p:ext uri="{D42A27DB-BD31-4B8C-83A1-F6EECF244321}">
-                <p14:modId xmlns:p14="http://schemas.microsoft.com/office/powerpoint/2010/main" val="3147884932"/>
-              </p:ext>
-            </p:extLst>
-          </p:nvPr>
-        </p:nvGraphicFramePr>
-        <p:xfrm>
-          <a:off x="5562269" y="1142608"/>
-          <a:ext cx="3116465" cy="3626431"/>
-        </p:xfrm>
-        <a:graphic>
-          <a:graphicData uri="http://schemas.openxmlformats.org/drawingml/2006/diagram">
-            <dgm:relIds xmlns:dgm="http://schemas.openxmlformats.org/drawingml/2006/diagram" xmlns:r="http://schemas.openxmlformats.org/officeDocument/2006/relationships" r:dm="rId2" r:lo="rId3" r:qs="rId4" r:cs="rId5"/>
-          </a:graphicData>
-        </a:graphic>
-      </p:graphicFrame>
     </p:spTree>
     <p:extLst>
       <p:ext uri="{BB962C8B-B14F-4D97-AF65-F5344CB8AC3E}">
-        <p14:creationId xmlns:p14="http://schemas.microsoft.com/office/powerpoint/2010/main" val="3558681173"/>
+        <p14:creationId xmlns:p14="http://schemas.microsoft.com/office/powerpoint/2010/main" val="3904564301"/>
       </p:ext>
     </p:extLst>
   </p:cSld>
@@ -14641,7 +14833,7 @@
           <a:p>
             <a:r>
               <a:rPr lang="en-US" sz="2400"/>
-              <a:t>Copy and View</a:t>
+              <a:t>Data Types</a:t>
             </a:r>
             <a:endParaRPr lang="fa-IR"/>
           </a:p>
@@ -14665,42 +14857,42 @@
         </p:nvSpPr>
         <p:spPr>
           <a:xfrm>
-            <a:off x="786150" y="1142608"/>
-            <a:ext cx="7571700" cy="3626431"/>
+            <a:off x="786149" y="1142608"/>
+            <a:ext cx="7571699" cy="3626431"/>
           </a:xfrm>
         </p:spPr>
         <p:txBody>
           <a:bodyPr/>
           <a:lstStyle/>
           <a:p>
-            <a:pPr marL="76200" indent="0">
+            <a:pPr marL="76200" indent="0" algn="just">
               <a:buNone/>
             </a:pPr>
             <a:r>
               <a:rPr lang="en-US" sz="1400"/>
-              <a:t>Copy is a new array, and view is just a view of the original array.</a:t>
-            </a:r>
-          </a:p>
-          <a:p>
-            <a:pPr marL="76200" indent="0">
+              <a:t>Check</a:t>
+            </a:r>
+          </a:p>
+          <a:p>
+            <a:pPr marL="76200" indent="0" algn="just">
               <a:buNone/>
             </a:pPr>
             <a:r>
               <a:rPr lang="en-US" sz="1100">
                 <a:latin typeface="Consolas" panose="020B0609020204030204" pitchFamily="49" charset="0"/>
               </a:rPr>
-              <a:t>arr = np.array([1, 2, 3, 4, 5])</a:t>
-            </a:r>
-          </a:p>
-          <a:p>
-            <a:pPr marL="76200" indent="0">
+              <a:t>arr = np.array([1, 2, 3, 4])</a:t>
+            </a:r>
+          </a:p>
+          <a:p>
+            <a:pPr marL="76200" indent="0" algn="just">
               <a:buNone/>
             </a:pPr>
             <a:r>
               <a:rPr lang="en-US" sz="1100">
                 <a:latin typeface="Consolas" panose="020B0609020204030204" pitchFamily="49" charset="0"/>
               </a:rPr>
-              <a:t>viewArr = arr</a:t>
+              <a:t>print(arr.</a:t>
             </a:r>
             <a:r>
               <a:rPr lang="en-US" sz="1100">
@@ -14709,18 +14901,41 @@
                 </a:solidFill>
                 <a:latin typeface="Consolas" panose="020B0609020204030204" pitchFamily="49" charset="0"/>
               </a:rPr>
-              <a:t>.view()</a:t>
-            </a:r>
-          </a:p>
-          <a:p>
-            <a:pPr marL="76200" indent="0">
+              <a:t>dtype</a:t>
+            </a:r>
+            <a:r>
+              <a:rPr lang="en-US" sz="1100">
+                <a:latin typeface="Consolas" panose="020B0609020204030204" pitchFamily="49" charset="0"/>
+              </a:rPr>
+              <a:t>) </a:t>
+            </a:r>
+          </a:p>
+          <a:p>
+            <a:pPr marL="76200" indent="0" algn="just">
               <a:buNone/>
             </a:pPr>
-            <a:r>
-              <a:rPr lang="en-US" sz="1100">
-                <a:latin typeface="Consolas" panose="020B0609020204030204" pitchFamily="49" charset="0"/>
-              </a:rPr>
-              <a:t>copyArr = arr</a:t>
+            <a:endParaRPr lang="en-US" sz="1100">
+              <a:latin typeface="Consolas" panose="020B0609020204030204" pitchFamily="49" charset="0"/>
+            </a:endParaRPr>
+          </a:p>
+          <a:p>
+            <a:pPr marL="76200" indent="0" algn="just">
+              <a:buNone/>
+            </a:pPr>
+            <a:r>
+              <a:rPr lang="en-US" sz="1400"/>
+              <a:t>Define</a:t>
+            </a:r>
+          </a:p>
+          <a:p>
+            <a:pPr marL="76200" indent="0" algn="just">
+              <a:buNone/>
+            </a:pPr>
+            <a:r>
+              <a:rPr lang="en-US" sz="1100">
+                <a:latin typeface="Consolas" panose="020B0609020204030204" pitchFamily="49" charset="0"/>
+              </a:rPr>
+              <a:t>arr = np.array([1, 2, 3, 4], </a:t>
             </a:r>
             <a:r>
               <a:rPr lang="en-US" sz="1100">
@@ -14729,40 +14944,63 @@
                 </a:solidFill>
                 <a:latin typeface="Consolas" panose="020B0609020204030204" pitchFamily="49" charset="0"/>
               </a:rPr>
-              <a:t>.copy()</a:t>
-            </a:r>
-          </a:p>
-          <a:p>
-            <a:pPr marL="76200" indent="0">
+              <a:t>dtype =</a:t>
+            </a:r>
+            <a:r>
+              <a:rPr lang="en-US" sz="1100">
+                <a:latin typeface="Consolas" panose="020B0609020204030204" pitchFamily="49" charset="0"/>
+              </a:rPr>
+              <a:t> 'S')</a:t>
+            </a:r>
+          </a:p>
+          <a:p>
+            <a:pPr marL="76200" indent="0" algn="just">
               <a:buNone/>
             </a:pPr>
             <a:r>
               <a:rPr lang="en-US" sz="1100">
                 <a:latin typeface="Consolas" panose="020B0609020204030204" pitchFamily="49" charset="0"/>
               </a:rPr>
-              <a:t>arr[0] = 10</a:t>
-            </a:r>
-          </a:p>
-          <a:p>
-            <a:pPr marL="76200" indent="0">
+              <a:t>print(arr.dtype) </a:t>
+            </a:r>
+          </a:p>
+          <a:p>
+            <a:pPr marL="76200" indent="0" algn="just">
               <a:buNone/>
             </a:pPr>
-            <a:r>
-              <a:rPr lang="en-US" sz="1100">
-                <a:latin typeface="Consolas" panose="020B0609020204030204" pitchFamily="49" charset="0"/>
-              </a:rPr>
-              <a:t>print(viewArr, copyArr)</a:t>
-            </a:r>
-          </a:p>
-          <a:p>
-            <a:pPr marL="76200" indent="0">
+            <a:endParaRPr lang="en-US" sz="1100">
+              <a:latin typeface="Consolas" panose="020B0609020204030204" pitchFamily="49" charset="0"/>
+            </a:endParaRPr>
+          </a:p>
+          <a:p>
+            <a:pPr marL="76200" indent="0" algn="just">
               <a:buNone/>
             </a:pPr>
             <a:r>
-              <a:rPr lang="en-US" sz="1100">
-                <a:latin typeface="Consolas" panose="020B0609020204030204" pitchFamily="49" charset="0"/>
-              </a:rPr>
-              <a:t>print(viewArr</a:t>
+              <a:rPr lang="en-US" sz="1400"/>
+              <a:t>Convert</a:t>
+            </a:r>
+          </a:p>
+          <a:p>
+            <a:pPr marL="76200" indent="0" algn="just">
+              <a:buNone/>
+            </a:pPr>
+            <a:r>
+              <a:rPr lang="en-US" sz="1100">
+                <a:latin typeface="Consolas" panose="020B0609020204030204" pitchFamily="49" charset="0"/>
+              </a:rPr>
+              <a:t>arr = np.array([1, 2, 3, 4])</a:t>
+            </a:r>
+          </a:p>
+          <a:p>
+            <a:pPr marL="76200" indent="0" algn="just">
+              <a:buNone/>
+            </a:pPr>
+            <a:r>
+              <a:rPr lang="en-US" sz="1100">
+                <a:latin typeface="Consolas" panose="020B0609020204030204" pitchFamily="49" charset="0"/>
+              </a:rPr>
+              <a:t>newArr = arr.</a:t>
             </a:r>
             <a:r>
               <a:rPr lang="en-US" sz="1100">
@@ -14771,13 +15009,33 @@
                 </a:solidFill>
                 <a:latin typeface="Consolas" panose="020B0609020204030204" pitchFamily="49" charset="0"/>
               </a:rPr>
-              <a:t>.base</a:t>
-            </a:r>
-            <a:r>
-              <a:rPr lang="en-US" sz="1100">
-                <a:latin typeface="Consolas" panose="020B0609020204030204" pitchFamily="49" charset="0"/>
-              </a:rPr>
-              <a:t>, copyArr.base)</a:t>
+              <a:t>astype(</a:t>
+            </a:r>
+            <a:r>
+              <a:rPr lang="en-US" sz="1100">
+                <a:latin typeface="Consolas" panose="020B0609020204030204" pitchFamily="49" charset="0"/>
+              </a:rPr>
+              <a:t>'S'</a:t>
+            </a:r>
+            <a:r>
+              <a:rPr lang="en-US" sz="1100">
+                <a:solidFill>
+                  <a:schemeClr val="accent1"/>
+                </a:solidFill>
+                <a:latin typeface="Consolas" panose="020B0609020204030204" pitchFamily="49" charset="0"/>
+              </a:rPr>
+              <a:t>)</a:t>
+            </a:r>
+          </a:p>
+          <a:p>
+            <a:pPr marL="76200" indent="0" algn="just">
+              <a:buNone/>
+            </a:pPr>
+            <a:r>
+              <a:rPr lang="en-US" sz="1100">
+                <a:latin typeface="Consolas" panose="020B0609020204030204" pitchFamily="49" charset="0"/>
+              </a:rPr>
+              <a:t>print(arr.dtype, newArr.dtype)</a:t>
             </a:r>
           </a:p>
         </p:txBody>
@@ -14820,10 +15078,38 @@
           </a:p>
         </p:txBody>
       </p:sp>
+      <p:graphicFrame>
+        <p:nvGraphicFramePr>
+          <p:cNvPr id="7" name="Diagram 6">
+            <a:extLst>
+              <a:ext uri="{FF2B5EF4-FFF2-40B4-BE49-F238E27FC236}">
+                <a16:creationId xmlns:a16="http://schemas.microsoft.com/office/drawing/2014/main" id="{C34AFF02-5127-48DD-81A7-8FCF3BEEC3C6}"/>
+              </a:ext>
+            </a:extLst>
+          </p:cNvPr>
+          <p:cNvGraphicFramePr/>
+          <p:nvPr>
+            <p:extLst>
+              <p:ext uri="{D42A27DB-BD31-4B8C-83A1-F6EECF244321}">
+                <p14:modId xmlns:p14="http://schemas.microsoft.com/office/powerpoint/2010/main" val="3147884932"/>
+              </p:ext>
+            </p:extLst>
+          </p:nvPr>
+        </p:nvGraphicFramePr>
+        <p:xfrm>
+          <a:off x="5562269" y="1142608"/>
+          <a:ext cx="3116465" cy="3626431"/>
+        </p:xfrm>
+        <a:graphic>
+          <a:graphicData uri="http://schemas.openxmlformats.org/drawingml/2006/diagram">
+            <dgm:relIds xmlns:dgm="http://schemas.openxmlformats.org/drawingml/2006/diagram" xmlns:r="http://schemas.openxmlformats.org/officeDocument/2006/relationships" r:dm="rId2" r:lo="rId3" r:qs="rId4" r:cs="rId5"/>
+          </a:graphicData>
+        </a:graphic>
+      </p:graphicFrame>
     </p:spTree>
     <p:extLst>
       <p:ext uri="{BB962C8B-B14F-4D97-AF65-F5344CB8AC3E}">
-        <p14:creationId xmlns:p14="http://schemas.microsoft.com/office/powerpoint/2010/main" val="3800470615"/>
+        <p14:creationId xmlns:p14="http://schemas.microsoft.com/office/powerpoint/2010/main" val="3558681173"/>
       </p:ext>
     </p:extLst>
   </p:cSld>
@@ -14873,7 +15159,7 @@
           <a:p>
             <a:r>
               <a:rPr lang="en-US" sz="2400"/>
-              <a:t>Shape</a:t>
+              <a:t>Copy and View</a:t>
             </a:r>
             <a:endParaRPr lang="fa-IR"/>
           </a:p>
@@ -14910,7 +15196,7 @@
             </a:pPr>
             <a:r>
               <a:rPr lang="en-US" sz="1400"/>
-              <a:t>Shape</a:t>
+              <a:t>Copy is a new array, and view is just a view of the original array.</a:t>
             </a:r>
           </a:p>
           <a:p>
@@ -14921,7 +15207,7 @@
               <a:rPr lang="en-US" sz="1100">
                 <a:latin typeface="Consolas" panose="020B0609020204030204" pitchFamily="49" charset="0"/>
               </a:rPr>
-              <a:t>arr = np.array([[1, 2, 3, 4], [5, 6, 7, 8]])</a:t>
+              <a:t>arr = np.array([1, 2, 3, 4, 5])</a:t>
             </a:r>
           </a:p>
           <a:p>
@@ -14932,7 +15218,7 @@
               <a:rPr lang="en-US" sz="1100">
                 <a:latin typeface="Consolas" panose="020B0609020204030204" pitchFamily="49" charset="0"/>
               </a:rPr>
-              <a:t>print(arr</a:t>
+              <a:t>viewArr = arr</a:t>
             </a:r>
             <a:r>
               <a:rPr lang="en-US" sz="1100">
@@ -14941,52 +15227,18 @@
                 </a:solidFill>
                 <a:latin typeface="Consolas" panose="020B0609020204030204" pitchFamily="49" charset="0"/>
               </a:rPr>
-              <a:t>.shape</a:t>
-            </a:r>
-            <a:r>
-              <a:rPr lang="en-US" sz="1100">
-                <a:latin typeface="Consolas" panose="020B0609020204030204" pitchFamily="49" charset="0"/>
-              </a:rPr>
-              <a:t>)</a:t>
+              <a:t>.view()</a:t>
             </a:r>
           </a:p>
           <a:p>
             <a:pPr marL="76200" indent="0">
               <a:buNone/>
             </a:pPr>
-            <a:endParaRPr lang="en-US" sz="1100">
-              <a:latin typeface="Consolas" panose="020B0609020204030204" pitchFamily="49" charset="0"/>
-            </a:endParaRPr>
-          </a:p>
-          <a:p>
-            <a:pPr marL="76200" indent="0">
-              <a:buNone/>
-            </a:pPr>
-            <a:r>
-              <a:rPr lang="en-US" sz="1400"/>
-              <a:t>Reshape</a:t>
-            </a:r>
-          </a:p>
-          <a:p>
-            <a:pPr marL="76200" indent="0">
-              <a:buNone/>
-            </a:pPr>
-            <a:r>
-              <a:rPr lang="en-US" sz="1100">
-                <a:latin typeface="Consolas" panose="020B0609020204030204" pitchFamily="49" charset="0"/>
-              </a:rPr>
-              <a:t>arr = np.array([1, 2, 3, 4, 5, 6, 7, 8])</a:t>
-            </a:r>
-          </a:p>
-          <a:p>
-            <a:pPr marL="76200" indent="0">
-              <a:buNone/>
-            </a:pPr>
-            <a:r>
-              <a:rPr lang="en-US" sz="1100">
-                <a:latin typeface="Consolas" panose="020B0609020204030204" pitchFamily="49" charset="0"/>
-              </a:rPr>
-              <a:t>print(arr</a:t>
+            <a:r>
+              <a:rPr lang="en-US" sz="1100">
+                <a:latin typeface="Consolas" panose="020B0609020204030204" pitchFamily="49" charset="0"/>
+              </a:rPr>
+              <a:t>copyArr = arr</a:t>
             </a:r>
             <a:r>
               <a:rPr lang="en-US" sz="1100">
@@ -14995,13 +15247,40 @@
                 </a:solidFill>
                 <a:latin typeface="Consolas" panose="020B0609020204030204" pitchFamily="49" charset="0"/>
               </a:rPr>
-              <a:t>.reshape(</a:t>
-            </a:r>
-            <a:r>
-              <a:rPr lang="en-US" sz="1100">
-                <a:latin typeface="Consolas" panose="020B0609020204030204" pitchFamily="49" charset="0"/>
-              </a:rPr>
-              <a:t>2, 4</a:t>
+              <a:t>.copy()</a:t>
+            </a:r>
+          </a:p>
+          <a:p>
+            <a:pPr marL="76200" indent="0">
+              <a:buNone/>
+            </a:pPr>
+            <a:r>
+              <a:rPr lang="en-US" sz="1100">
+                <a:latin typeface="Consolas" panose="020B0609020204030204" pitchFamily="49" charset="0"/>
+              </a:rPr>
+              <a:t>arr[0] = 10</a:t>
+            </a:r>
+          </a:p>
+          <a:p>
+            <a:pPr marL="76200" indent="0">
+              <a:buNone/>
+            </a:pPr>
+            <a:r>
+              <a:rPr lang="en-US" sz="1100">
+                <a:latin typeface="Consolas" panose="020B0609020204030204" pitchFamily="49" charset="0"/>
+              </a:rPr>
+              <a:t>print(viewArr, copyArr)</a:t>
+            </a:r>
+          </a:p>
+          <a:p>
+            <a:pPr marL="76200" indent="0">
+              <a:buNone/>
+            </a:pPr>
+            <a:r>
+              <a:rPr lang="en-US" sz="1100">
+                <a:latin typeface="Consolas" panose="020B0609020204030204" pitchFamily="49" charset="0"/>
+              </a:rPr>
+              <a:t>print(viewArr</a:t>
             </a:r>
             <a:r>
               <a:rPr lang="en-US" sz="1100">
@@ -15010,100 +15289,14 @@
                 </a:solidFill>
                 <a:latin typeface="Consolas" panose="020B0609020204030204" pitchFamily="49" charset="0"/>
               </a:rPr>
-              <a:t>)</a:t>
-            </a:r>
-            <a:r>
-              <a:rPr lang="en-US" sz="1100">
-                <a:latin typeface="Consolas" panose="020B0609020204030204" pitchFamily="49" charset="0"/>
-              </a:rPr>
-              <a:t>)</a:t>
-            </a:r>
-          </a:p>
-          <a:p>
-            <a:pPr marL="76200" indent="0">
-              <a:buNone/>
-            </a:pPr>
-            <a:r>
-              <a:rPr lang="en-US" sz="1100">
-                <a:latin typeface="Consolas" panose="020B0609020204030204" pitchFamily="49" charset="0"/>
-              </a:rPr>
-              <a:t>print(arr.reshape(2, 2, </a:t>
-            </a:r>
-            <a:r>
-              <a:rPr lang="en-US" sz="1100">
-                <a:solidFill>
-                  <a:schemeClr val="accent1"/>
-                </a:solidFill>
-                <a:latin typeface="Consolas" panose="020B0609020204030204" pitchFamily="49" charset="0"/>
-              </a:rPr>
-              <a:t>-1</a:t>
-            </a:r>
-            <a:r>
-              <a:rPr lang="en-US" sz="1100">
-                <a:latin typeface="Consolas" panose="020B0609020204030204" pitchFamily="49" charset="0"/>
-              </a:rPr>
-              <a:t>))</a:t>
-            </a:r>
-          </a:p>
-          <a:p>
-            <a:pPr marL="76200" indent="0">
-              <a:buNone/>
-            </a:pPr>
-            <a:endParaRPr lang="en-US" sz="1100">
-              <a:latin typeface="Consolas" panose="020B0609020204030204" pitchFamily="49" charset="0"/>
-            </a:endParaRPr>
-          </a:p>
-          <a:p>
-            <a:pPr marL="76200" indent="0">
-              <a:buNone/>
-            </a:pPr>
-            <a:r>
-              <a:rPr lang="en-US" sz="1400"/>
-              <a:t>Flatten</a:t>
-            </a:r>
-          </a:p>
-          <a:p>
-            <a:pPr marL="76200" indent="0">
-              <a:buNone/>
-            </a:pPr>
-            <a:r>
-              <a:rPr lang="en-US" sz="1100">
-                <a:latin typeface="Consolas" panose="020B0609020204030204" pitchFamily="49" charset="0"/>
-              </a:rPr>
-              <a:t>arr = np.array([[1, 2, 3, 4], [5, 6, 7, 8]])</a:t>
-            </a:r>
-          </a:p>
-          <a:p>
-            <a:pPr marL="76200" indent="0">
-              <a:buNone/>
-            </a:pPr>
-            <a:r>
-              <a:rPr lang="en-US" sz="1100">
-                <a:latin typeface="Consolas" panose="020B0609020204030204" pitchFamily="49" charset="0"/>
-              </a:rPr>
-              <a:t>print(arr.reshape(</a:t>
-            </a:r>
-            <a:r>
-              <a:rPr lang="en-US" sz="1100">
-                <a:solidFill>
-                  <a:schemeClr val="accent1"/>
-                </a:solidFill>
-                <a:latin typeface="Consolas" panose="020B0609020204030204" pitchFamily="49" charset="0"/>
-              </a:rPr>
-              <a:t>-1</a:t>
-            </a:r>
-            <a:r>
-              <a:rPr lang="en-US" sz="1100">
-                <a:latin typeface="Consolas" panose="020B0609020204030204" pitchFamily="49" charset="0"/>
-              </a:rPr>
-              <a:t>))</a:t>
-            </a:r>
-            <a:endParaRPr lang="en-US" sz="1100">
-              <a:solidFill>
-                <a:schemeClr val="accent1"/>
-              </a:solidFill>
-              <a:latin typeface="Consolas" panose="020B0609020204030204" pitchFamily="49" charset="0"/>
-            </a:endParaRPr>
+              <a:t>.base</a:t>
+            </a:r>
+            <a:r>
+              <a:rPr lang="en-US" sz="1100">
+                <a:latin typeface="Consolas" panose="020B0609020204030204" pitchFamily="49" charset="0"/>
+              </a:rPr>
+              <a:t>, copyArr.base)</a:t>
+            </a:r>
           </a:p>
         </p:txBody>
       </p:sp>
@@ -15148,7 +15341,7 @@
     </p:spTree>
     <p:extLst>
       <p:ext uri="{BB962C8B-B14F-4D97-AF65-F5344CB8AC3E}">
-        <p14:creationId xmlns:p14="http://schemas.microsoft.com/office/powerpoint/2010/main" val="1703438368"/>
+        <p14:creationId xmlns:p14="http://schemas.microsoft.com/office/powerpoint/2010/main" val="3800470615"/>
       </p:ext>
     </p:extLst>
   </p:cSld>
@@ -15198,7 +15391,7 @@
           <a:p>
             <a:r>
               <a:rPr lang="en-US" sz="2400"/>
-              <a:t>Loops</a:t>
+              <a:t>Shape</a:t>
             </a:r>
             <a:endParaRPr lang="fa-IR"/>
           </a:p>
@@ -15235,7 +15428,7 @@
             </a:pPr>
             <a:r>
               <a:rPr lang="en-US" sz="1400"/>
-              <a:t>Iterating arrays</a:t>
+              <a:t>Shape</a:t>
             </a:r>
           </a:p>
           <a:p>
@@ -15257,29 +15450,7 @@
               <a:rPr lang="en-US" sz="1100">
                 <a:latin typeface="Consolas" panose="020B0609020204030204" pitchFamily="49" charset="0"/>
               </a:rPr>
-              <a:t>for x in arr:</a:t>
-            </a:r>
-          </a:p>
-          <a:p>
-            <a:pPr marL="76200" indent="0">
-              <a:buNone/>
-            </a:pPr>
-            <a:r>
-              <a:rPr lang="en-US" sz="1100">
-                <a:latin typeface="Consolas" panose="020B0609020204030204" pitchFamily="49" charset="0"/>
-              </a:rPr>
-              <a:t>    print(x)</a:t>
-            </a:r>
-          </a:p>
-          <a:p>
-            <a:pPr marL="76200" indent="0">
-              <a:buNone/>
-            </a:pPr>
-            <a:r>
-              <a:rPr lang="en-US" sz="1100">
-                <a:latin typeface="Consolas" panose="020B0609020204030204" pitchFamily="49" charset="0"/>
-              </a:rPr>
-              <a:t>for x in np.</a:t>
+              <a:t>print(arr</a:t>
             </a:r>
             <a:r>
               <a:rPr lang="en-US" sz="1100">
@@ -15288,13 +15459,52 @@
                 </a:solidFill>
                 <a:latin typeface="Consolas" panose="020B0609020204030204" pitchFamily="49" charset="0"/>
               </a:rPr>
-              <a:t>nditer(</a:t>
-            </a:r>
-            <a:r>
-              <a:rPr lang="en-US" sz="1100">
-                <a:latin typeface="Consolas" panose="020B0609020204030204" pitchFamily="49" charset="0"/>
-              </a:rPr>
-              <a:t>arr</a:t>
+              <a:t>.shape</a:t>
+            </a:r>
+            <a:r>
+              <a:rPr lang="en-US" sz="1100">
+                <a:latin typeface="Consolas" panose="020B0609020204030204" pitchFamily="49" charset="0"/>
+              </a:rPr>
+              <a:t>)</a:t>
+            </a:r>
+          </a:p>
+          <a:p>
+            <a:pPr marL="76200" indent="0">
+              <a:buNone/>
+            </a:pPr>
+            <a:endParaRPr lang="en-US" sz="1100">
+              <a:latin typeface="Consolas" panose="020B0609020204030204" pitchFamily="49" charset="0"/>
+            </a:endParaRPr>
+          </a:p>
+          <a:p>
+            <a:pPr marL="76200" indent="0">
+              <a:buNone/>
+            </a:pPr>
+            <a:r>
+              <a:rPr lang="en-US" sz="1400"/>
+              <a:t>Reshape</a:t>
+            </a:r>
+          </a:p>
+          <a:p>
+            <a:pPr marL="76200" indent="0">
+              <a:buNone/>
+            </a:pPr>
+            <a:r>
+              <a:rPr lang="en-US" sz="1100">
+                <a:latin typeface="Consolas" panose="020B0609020204030204" pitchFamily="49" charset="0"/>
+              </a:rPr>
+              <a:t>arr = np.array([1, 2, 3, 4, 5, 6, 7, 8])</a:t>
+            </a:r>
+          </a:p>
+          <a:p>
+            <a:pPr marL="76200" indent="0">
+              <a:buNone/>
+            </a:pPr>
+            <a:r>
+              <a:rPr lang="en-US" sz="1100">
+                <a:latin typeface="Consolas" panose="020B0609020204030204" pitchFamily="49" charset="0"/>
+              </a:rPr>
+              <a:t>print(arr</a:t>
             </a:r>
             <a:r>
               <a:rPr lang="en-US" sz="1100">
@@ -15303,35 +15513,13 @@
                 </a:solidFill>
                 <a:latin typeface="Consolas" panose="020B0609020204030204" pitchFamily="49" charset="0"/>
               </a:rPr>
-              <a:t>)</a:t>
-            </a:r>
-            <a:r>
-              <a:rPr lang="en-US" sz="1100">
-                <a:latin typeface="Consolas" panose="020B0609020204030204" pitchFamily="49" charset="0"/>
-              </a:rPr>
-              <a:t>:</a:t>
-            </a:r>
-          </a:p>
-          <a:p>
-            <a:pPr marL="76200" indent="0">
-              <a:buNone/>
-            </a:pPr>
-            <a:r>
-              <a:rPr lang="en-US" sz="1100">
-                <a:latin typeface="Consolas" panose="020B0609020204030204" pitchFamily="49" charset="0"/>
-              </a:rPr>
-              <a:t>    print(x) </a:t>
-            </a:r>
-          </a:p>
-          <a:p>
-            <a:pPr marL="76200" indent="0">
-              <a:buNone/>
-            </a:pPr>
-            <a:r>
-              <a:rPr lang="en-US" sz="1100">
-                <a:latin typeface="Consolas" panose="020B0609020204030204" pitchFamily="49" charset="0"/>
-              </a:rPr>
-              <a:t>for x in np.nditer(arr</a:t>
+              <a:t>.reshape(</a:t>
+            </a:r>
+            <a:r>
+              <a:rPr lang="en-US" sz="1100">
+                <a:latin typeface="Consolas" panose="020B0609020204030204" pitchFamily="49" charset="0"/>
+              </a:rPr>
+              <a:t>2, 4</a:t>
             </a:r>
             <a:r>
               <a:rPr lang="en-US" sz="1100">
@@ -15340,13 +15528,24 @@
                 </a:solidFill>
                 <a:latin typeface="Consolas" panose="020B0609020204030204" pitchFamily="49" charset="0"/>
               </a:rPr>
-              <a:t>[</a:t>
-            </a:r>
-            <a:r>
-              <a:rPr lang="en-US" sz="1100">
-                <a:latin typeface="Consolas" panose="020B0609020204030204" pitchFamily="49" charset="0"/>
-              </a:rPr>
-              <a:t>:</a:t>
+              <a:t>)</a:t>
+            </a:r>
+            <a:r>
+              <a:rPr lang="en-US" sz="1100">
+                <a:latin typeface="Consolas" panose="020B0609020204030204" pitchFamily="49" charset="0"/>
+              </a:rPr>
+              <a:t>)</a:t>
+            </a:r>
+          </a:p>
+          <a:p>
+            <a:pPr marL="76200" indent="0">
+              <a:buNone/>
+            </a:pPr>
+            <a:r>
+              <a:rPr lang="en-US" sz="1100">
+                <a:latin typeface="Consolas" panose="020B0609020204030204" pitchFamily="49" charset="0"/>
+              </a:rPr>
+              <a:t>print(arr.reshape(2, 2, </a:t>
             </a:r>
             <a:r>
               <a:rPr lang="en-US" sz="1100">
@@ -15355,13 +15554,52 @@
                 </a:solidFill>
                 <a:latin typeface="Consolas" panose="020B0609020204030204" pitchFamily="49" charset="0"/>
               </a:rPr>
-              <a:t>,</a:t>
-            </a:r>
-            <a:r>
-              <a:rPr lang="en-US" sz="1100">
-                <a:latin typeface="Consolas" panose="020B0609020204030204" pitchFamily="49" charset="0"/>
-              </a:rPr>
-              <a:t> ::2</a:t>
+              <a:t>-1</a:t>
+            </a:r>
+            <a:r>
+              <a:rPr lang="en-US" sz="1100">
+                <a:latin typeface="Consolas" panose="020B0609020204030204" pitchFamily="49" charset="0"/>
+              </a:rPr>
+              <a:t>))</a:t>
+            </a:r>
+          </a:p>
+          <a:p>
+            <a:pPr marL="76200" indent="0">
+              <a:buNone/>
+            </a:pPr>
+            <a:endParaRPr lang="en-US" sz="1100">
+              <a:latin typeface="Consolas" panose="020B0609020204030204" pitchFamily="49" charset="0"/>
+            </a:endParaRPr>
+          </a:p>
+          <a:p>
+            <a:pPr marL="76200" indent="0">
+              <a:buNone/>
+            </a:pPr>
+            <a:r>
+              <a:rPr lang="en-US" sz="1400"/>
+              <a:t>Flatten</a:t>
+            </a:r>
+          </a:p>
+          <a:p>
+            <a:pPr marL="76200" indent="0">
+              <a:buNone/>
+            </a:pPr>
+            <a:r>
+              <a:rPr lang="en-US" sz="1100">
+                <a:latin typeface="Consolas" panose="020B0609020204030204" pitchFamily="49" charset="0"/>
+              </a:rPr>
+              <a:t>arr = np.array([[1, 2, 3, 4], [5, 6, 7, 8]])</a:t>
+            </a:r>
+          </a:p>
+          <a:p>
+            <a:pPr marL="76200" indent="0">
+              <a:buNone/>
+            </a:pPr>
+            <a:r>
+              <a:rPr lang="en-US" sz="1100">
+                <a:latin typeface="Consolas" panose="020B0609020204030204" pitchFamily="49" charset="0"/>
+              </a:rPr>
+              <a:t>print(arr.reshape(</a:t>
             </a:r>
             <a:r>
               <a:rPr lang="en-US" sz="1100">
@@ -15370,77 +15608,20 @@
                 </a:solidFill>
                 <a:latin typeface="Consolas" panose="020B0609020204030204" pitchFamily="49" charset="0"/>
               </a:rPr>
-              <a:t>]</a:t>
-            </a:r>
-            <a:r>
-              <a:rPr lang="en-US" sz="1100">
-                <a:latin typeface="Consolas" panose="020B0609020204030204" pitchFamily="49" charset="0"/>
-              </a:rPr>
-              <a:t>):</a:t>
-            </a:r>
-          </a:p>
-          <a:p>
-            <a:pPr marL="76200" indent="0">
-              <a:buNone/>
-            </a:pPr>
-            <a:r>
-              <a:rPr lang="en-US" sz="1100">
-                <a:latin typeface="Consolas" panose="020B0609020204030204" pitchFamily="49" charset="0"/>
-              </a:rPr>
-              <a:t>    print(x) </a:t>
-            </a:r>
-          </a:p>
-          <a:p>
-            <a:pPr marL="76200" indent="0">
-              <a:buNone/>
-            </a:pPr>
-            <a:r>
-              <a:rPr lang="en-US" sz="1100">
-                <a:latin typeface="Consolas" panose="020B0609020204030204" pitchFamily="49" charset="0"/>
-              </a:rPr>
-              <a:t>for x in np.</a:t>
-            </a:r>
-            <a:r>
-              <a:rPr lang="en-US" sz="1100">
-                <a:solidFill>
-                  <a:schemeClr val="accent1"/>
-                </a:solidFill>
-                <a:latin typeface="Consolas" panose="020B0609020204030204" pitchFamily="49" charset="0"/>
-              </a:rPr>
-              <a:t>ndenumerate(</a:t>
-            </a:r>
-            <a:r>
-              <a:rPr lang="en-US" sz="1100">
-                <a:latin typeface="Consolas" panose="020B0609020204030204" pitchFamily="49" charset="0"/>
-              </a:rPr>
-              <a:t>arr</a:t>
-            </a:r>
-            <a:r>
-              <a:rPr lang="en-US" sz="1100">
-                <a:solidFill>
-                  <a:schemeClr val="accent1"/>
-                </a:solidFill>
-                <a:latin typeface="Consolas" panose="020B0609020204030204" pitchFamily="49" charset="0"/>
-              </a:rPr>
-              <a:t>)</a:t>
-            </a:r>
-            <a:r>
-              <a:rPr lang="en-US" sz="1100">
-                <a:latin typeface="Consolas" panose="020B0609020204030204" pitchFamily="49" charset="0"/>
-              </a:rPr>
-              <a:t>:</a:t>
-            </a:r>
-          </a:p>
-          <a:p>
-            <a:pPr marL="76200" indent="0">
-              <a:buNone/>
-            </a:pPr>
-            <a:r>
-              <a:rPr lang="en-US" sz="1100">
-                <a:latin typeface="Consolas" panose="020B0609020204030204" pitchFamily="49" charset="0"/>
-              </a:rPr>
-              <a:t>    print(x)</a:t>
-            </a:r>
+              <a:t>-1</a:t>
+            </a:r>
+            <a:r>
+              <a:rPr lang="en-US" sz="1100">
+                <a:latin typeface="Consolas" panose="020B0609020204030204" pitchFamily="49" charset="0"/>
+              </a:rPr>
+              <a:t>))</a:t>
+            </a:r>
+            <a:endParaRPr lang="en-US" sz="1100">
+              <a:solidFill>
+                <a:schemeClr val="accent1"/>
+              </a:solidFill>
+              <a:latin typeface="Consolas" panose="020B0609020204030204" pitchFamily="49" charset="0"/>
+            </a:endParaRPr>
           </a:p>
         </p:txBody>
       </p:sp>
@@ -15485,7 +15666,7 @@
     </p:spTree>
     <p:extLst>
       <p:ext uri="{BB962C8B-B14F-4D97-AF65-F5344CB8AC3E}">
-        <p14:creationId xmlns:p14="http://schemas.microsoft.com/office/powerpoint/2010/main" val="1384881879"/>
+        <p14:creationId xmlns:p14="http://schemas.microsoft.com/office/powerpoint/2010/main" val="1703438368"/>
       </p:ext>
     </p:extLst>
   </p:cSld>

</xml_diff>

<commit_message>
add pd dataframes and series
</commit_message>
<xml_diff>
--- a/2 Data Science.pptx
+++ b/2 Data Science.pptx
@@ -6751,7 +6751,7 @@
           <a:p>
             <a:fld id="{7CEEE0ED-A0F5-4442-9C94-5288E26FF1D3}" type="datetimeFigureOut">
               <a:rPr lang="fa-IR" smtClean="0"/>
-              <a:t>15/09/1444</a:t>
+              <a:t>18/09/1444</a:t>
             </a:fld>
             <a:endParaRPr lang="fa-IR"/>
           </a:p>
@@ -7719,11 +7719,11 @@
 </file>
 
 <file path=ppt/notesSlides/notesSlide5.xml><?xml version="1.0" encoding="utf-8"?>
-<p:notes xmlns:a="http://schemas.openxmlformats.org/drawingml/2006/main" xmlns:r="http://schemas.openxmlformats.org/officeDocument/2006/relationships" xmlns:p="http://schemas.openxmlformats.org/presentationml/2006/main" showMasterSp="0" showMasterPhAnim="0">
+<p:notes xmlns:a="http://schemas.openxmlformats.org/drawingml/2006/main" xmlns:r="http://schemas.openxmlformats.org/officeDocument/2006/relationships" xmlns:p="http://schemas.openxmlformats.org/presentationml/2006/main">
   <p:cSld>
     <p:spTree>
       <p:nvGrpSpPr>
-        <p:cNvPr id="1" name="Shape 93"/>
+        <p:cNvPr id="1" name=""/>
         <p:cNvGrpSpPr/>
         <p:nvPr/>
       </p:nvGrpSpPr>
@@ -7737,12 +7737,12 @@
       </p:grpSpPr>
       <p:sp>
         <p:nvSpPr>
-          <p:cNvPr id="94" name="Google Shape;94;g35f391192_029:notes"/>
+          <p:cNvPr id="2" name="Slide Image Placeholder 1"/>
           <p:cNvSpPr>
             <a:spLocks noGrp="1" noRot="1" noChangeAspect="1"/>
           </p:cNvSpPr>
           <p:nvPr>
-            <p:ph type="sldImg" idx="2"/>
+            <p:ph type="sldImg"/>
           </p:nvPr>
         </p:nvSpPr>
         <p:spPr>
@@ -7750,74 +7750,31 @@
             <a:off x="381000" y="685800"/>
             <a:ext cx="6096000" cy="3429000"/>
           </a:xfrm>
-          <a:custGeom>
-            <a:avLst/>
-            <a:gdLst/>
-            <a:ahLst/>
-            <a:cxnLst/>
-            <a:rect l="l" t="t" r="r" b="b"/>
-            <a:pathLst>
-              <a:path w="120000" h="120000" extrusionOk="0">
-                <a:moveTo>
-                  <a:pt x="0" y="0"/>
-                </a:moveTo>
-                <a:lnTo>
-                  <a:pt x="120000" y="0"/>
-                </a:lnTo>
-                <a:lnTo>
-                  <a:pt x="120000" y="120000"/>
-                </a:lnTo>
-                <a:lnTo>
-                  <a:pt x="0" y="120000"/>
-                </a:lnTo>
-                <a:close/>
-              </a:path>
-            </a:pathLst>
-          </a:custGeom>
         </p:spPr>
       </p:sp>
       <p:sp>
         <p:nvSpPr>
-          <p:cNvPr id="95" name="Google Shape;95;g35f391192_029:notes"/>
-          <p:cNvSpPr txBox="1">
+          <p:cNvPr id="3" name="Notes Placeholder 2"/>
+          <p:cNvSpPr>
             <a:spLocks noGrp="1"/>
           </p:cNvSpPr>
           <p:nvPr>
             <p:ph type="body" idx="1"/>
           </p:nvPr>
         </p:nvSpPr>
-        <p:spPr>
-          <a:xfrm>
-            <a:off x="685800" y="4343400"/>
-            <a:ext cx="5486400" cy="4114800"/>
-          </a:xfrm>
-          <a:prstGeom prst="rect">
-            <a:avLst/>
-          </a:prstGeom>
-        </p:spPr>
+        <p:spPr/>
         <p:txBody>
-          <a:bodyPr spcFirstLastPara="1" wrap="square" lIns="91425" tIns="91425" rIns="91425" bIns="91425" anchor="t" anchorCtr="0">
-            <a:noAutofit/>
-          </a:bodyPr>
+          <a:bodyPr/>
           <a:lstStyle/>
           <a:p>
-            <a:pPr marL="0" lvl="0" indent="0" algn="l" rtl="0">
-              <a:spcBef>
-                <a:spcPts val="0"/>
-              </a:spcBef>
-              <a:spcAft>
-                <a:spcPts val="0"/>
-              </a:spcAft>
-              <a:buNone/>
-            </a:pPr>
-            <a:endParaRPr/>
+            <a:endParaRPr lang="en-US"/>
           </a:p>
         </p:txBody>
       </p:sp>
     </p:spTree>
     <p:extLst>
       <p:ext uri="{BB962C8B-B14F-4D97-AF65-F5344CB8AC3E}">
-        <p14:creationId xmlns:p14="http://schemas.microsoft.com/office/powerpoint/2010/main" val="3390362646"/>
+        <p14:creationId xmlns:p14="http://schemas.microsoft.com/office/powerpoint/2010/main" val="3586518736"/>
       </p:ext>
     </p:extLst>
   </p:cSld>
@@ -7926,6 +7883,115 @@
     </p:spTree>
     <p:extLst>
       <p:ext uri="{BB962C8B-B14F-4D97-AF65-F5344CB8AC3E}">
+        <p14:creationId xmlns:p14="http://schemas.microsoft.com/office/powerpoint/2010/main" val="3390362646"/>
+      </p:ext>
+    </p:extLst>
+  </p:cSld>
+  <p:clrMapOvr>
+    <a:masterClrMapping/>
+  </p:clrMapOvr>
+</p:notes>
+</file>
+
+<file path=ppt/notesSlides/notesSlide7.xml><?xml version="1.0" encoding="utf-8"?>
+<p:notes xmlns:a="http://schemas.openxmlformats.org/drawingml/2006/main" xmlns:r="http://schemas.openxmlformats.org/officeDocument/2006/relationships" xmlns:p="http://schemas.openxmlformats.org/presentationml/2006/main" showMasterSp="0" showMasterPhAnim="0">
+  <p:cSld>
+    <p:spTree>
+      <p:nvGrpSpPr>
+        <p:cNvPr id="1" name="Shape 93"/>
+        <p:cNvGrpSpPr/>
+        <p:nvPr/>
+      </p:nvGrpSpPr>
+      <p:grpSpPr>
+        <a:xfrm>
+          <a:off x="0" y="0"/>
+          <a:ext cx="0" cy="0"/>
+          <a:chOff x="0" y="0"/>
+          <a:chExt cx="0" cy="0"/>
+        </a:xfrm>
+      </p:grpSpPr>
+      <p:sp>
+        <p:nvSpPr>
+          <p:cNvPr id="94" name="Google Shape;94;g35f391192_029:notes"/>
+          <p:cNvSpPr>
+            <a:spLocks noGrp="1" noRot="1" noChangeAspect="1"/>
+          </p:cNvSpPr>
+          <p:nvPr>
+            <p:ph type="sldImg" idx="2"/>
+          </p:nvPr>
+        </p:nvSpPr>
+        <p:spPr>
+          <a:xfrm>
+            <a:off x="381000" y="685800"/>
+            <a:ext cx="6096000" cy="3429000"/>
+          </a:xfrm>
+          <a:custGeom>
+            <a:avLst/>
+            <a:gdLst/>
+            <a:ahLst/>
+            <a:cxnLst/>
+            <a:rect l="l" t="t" r="r" b="b"/>
+            <a:pathLst>
+              <a:path w="120000" h="120000" extrusionOk="0">
+                <a:moveTo>
+                  <a:pt x="0" y="0"/>
+                </a:moveTo>
+                <a:lnTo>
+                  <a:pt x="120000" y="0"/>
+                </a:lnTo>
+                <a:lnTo>
+                  <a:pt x="120000" y="120000"/>
+                </a:lnTo>
+                <a:lnTo>
+                  <a:pt x="0" y="120000"/>
+                </a:lnTo>
+                <a:close/>
+              </a:path>
+            </a:pathLst>
+          </a:custGeom>
+        </p:spPr>
+      </p:sp>
+      <p:sp>
+        <p:nvSpPr>
+          <p:cNvPr id="95" name="Google Shape;95;g35f391192_029:notes"/>
+          <p:cNvSpPr txBox="1">
+            <a:spLocks noGrp="1"/>
+          </p:cNvSpPr>
+          <p:nvPr>
+            <p:ph type="body" idx="1"/>
+          </p:nvPr>
+        </p:nvSpPr>
+        <p:spPr>
+          <a:xfrm>
+            <a:off x="685800" y="4343400"/>
+            <a:ext cx="5486400" cy="4114800"/>
+          </a:xfrm>
+          <a:prstGeom prst="rect">
+            <a:avLst/>
+          </a:prstGeom>
+        </p:spPr>
+        <p:txBody>
+          <a:bodyPr spcFirstLastPara="1" wrap="square" lIns="91425" tIns="91425" rIns="91425" bIns="91425" anchor="t" anchorCtr="0">
+            <a:noAutofit/>
+          </a:bodyPr>
+          <a:lstStyle/>
+          <a:p>
+            <a:pPr marL="0" lvl="0" indent="0" algn="l" rtl="0">
+              <a:spcBef>
+                <a:spcPts val="0"/>
+              </a:spcBef>
+              <a:spcAft>
+                <a:spcPts val="0"/>
+              </a:spcAft>
+              <a:buNone/>
+            </a:pPr>
+            <a:endParaRPr/>
+          </a:p>
+        </p:txBody>
+      </p:sp>
+    </p:spTree>
+    <p:extLst>
+      <p:ext uri="{BB962C8B-B14F-4D97-AF65-F5344CB8AC3E}">
         <p14:creationId xmlns:p14="http://schemas.microsoft.com/office/powerpoint/2010/main" val="1150731996"/>
       </p:ext>
     </p:extLst>
@@ -7936,7 +8002,7 @@
 </p:notes>
 </file>
 
-<file path=ppt/notesSlides/notesSlide7.xml><?xml version="1.0" encoding="utf-8"?>
+<file path=ppt/notesSlides/notesSlide8.xml><?xml version="1.0" encoding="utf-8"?>
 <p:notes xmlns:a="http://schemas.openxmlformats.org/drawingml/2006/main" xmlns:r="http://schemas.openxmlformats.org/officeDocument/2006/relationships" xmlns:p="http://schemas.openxmlformats.org/presentationml/2006/main" showMasterSp="0" showMasterPhAnim="0">
   <p:cSld>
     <p:spTree>
@@ -13597,7 +13663,7 @@
               <a:rPr lang="en-US" sz="1100">
                 <a:latin typeface="Consolas" panose="020B0609020204030204" pitchFamily="49" charset="0"/>
               </a:rPr>
-              <a:t>  'calories': [420, 380, 390],</a:t>
+              <a:t>    'calories': [420, 380, 390],</a:t>
             </a:r>
           </a:p>
           <a:p>
@@ -13608,7 +13674,7 @@
               <a:rPr lang="en-US" sz="1100">
                 <a:latin typeface="Consolas" panose="020B0609020204030204" pitchFamily="49" charset="0"/>
               </a:rPr>
-              <a:t>  'duration': [50, 40, 45]</a:t>
+              <a:t>    'duration': [50, 40, 45]</a:t>
             </a:r>
           </a:p>
           <a:p>
@@ -13630,7 +13696,31 @@
               <a:rPr lang="en-US" sz="1100">
                 <a:latin typeface="Consolas" panose="020B0609020204030204" pitchFamily="49" charset="0"/>
               </a:rPr>
-              <a:t>df = pd.DataFrame(data)</a:t>
+              <a:t>df = pd.</a:t>
+            </a:r>
+            <a:r>
+              <a:rPr lang="en-US" sz="1100">
+                <a:solidFill>
+                  <a:schemeClr val="accent1"/>
+                </a:solidFill>
+                <a:latin typeface="Consolas" panose="020B0609020204030204" pitchFamily="49" charset="0"/>
+              </a:rPr>
+              <a:t>DataFrame(</a:t>
+            </a:r>
+            <a:r>
+              <a:rPr lang="en-US" sz="1100">
+                <a:latin typeface="Consolas" panose="020B0609020204030204" pitchFamily="49" charset="0"/>
+              </a:rPr>
+              <a:t>data</a:t>
+            </a:r>
+            <a:r>
+              <a:rPr lang="en-US" sz="1100">
+                <a:solidFill>
+                  <a:schemeClr val="accent1"/>
+                </a:solidFill>
+                <a:latin typeface="Consolas" panose="020B0609020204030204" pitchFamily="49" charset="0"/>
+              </a:rPr>
+              <a:t>)</a:t>
             </a:r>
           </a:p>
           <a:p>
@@ -13652,7 +13742,37 @@
               <a:rPr lang="en-US" sz="1100">
                 <a:latin typeface="Consolas" panose="020B0609020204030204" pitchFamily="49" charset="0"/>
               </a:rPr>
-              <a:t>print(df.loc[0])</a:t>
+              <a:t>print(df</a:t>
+            </a:r>
+            <a:r>
+              <a:rPr lang="en-US" sz="1100">
+                <a:solidFill>
+                  <a:schemeClr val="accent1"/>
+                </a:solidFill>
+                <a:latin typeface="Consolas" panose="020B0609020204030204" pitchFamily="49" charset="0"/>
+              </a:rPr>
+              <a:t>.loc[</a:t>
+            </a:r>
+            <a:r>
+              <a:rPr lang="en-US" sz="1100">
+                <a:latin typeface="Consolas" panose="020B0609020204030204" pitchFamily="49" charset="0"/>
+              </a:rPr>
+              <a:t>0</a:t>
+            </a:r>
+            <a:r>
+              <a:rPr lang="en-US" sz="1100">
+                <a:solidFill>
+                  <a:schemeClr val="accent1"/>
+                </a:solidFill>
+                <a:latin typeface="Consolas" panose="020B0609020204030204" pitchFamily="49" charset="0"/>
+              </a:rPr>
+              <a:t>]</a:t>
+            </a:r>
+            <a:r>
+              <a:rPr lang="en-US" sz="1100">
+                <a:latin typeface="Consolas" panose="020B0609020204030204" pitchFamily="49" charset="0"/>
+              </a:rPr>
+              <a:t>)</a:t>
             </a:r>
           </a:p>
           <a:p>
@@ -13663,7 +13783,121 @@
               <a:rPr lang="en-US" sz="1100">
                 <a:latin typeface="Consolas" panose="020B0609020204030204" pitchFamily="49" charset="0"/>
               </a:rPr>
-              <a:t>print(df.loc[[0, 1]])</a:t>
+              <a:t>print(df.loc</a:t>
+            </a:r>
+            <a:r>
+              <a:rPr lang="en-US" sz="1100">
+                <a:solidFill>
+                  <a:schemeClr val="accent1"/>
+                </a:solidFill>
+                <a:latin typeface="Consolas" panose="020B0609020204030204" pitchFamily="49" charset="0"/>
+              </a:rPr>
+              <a:t>[[</a:t>
+            </a:r>
+            <a:r>
+              <a:rPr lang="en-US" sz="1100">
+                <a:latin typeface="Consolas" panose="020B0609020204030204" pitchFamily="49" charset="0"/>
+              </a:rPr>
+              <a:t>0</a:t>
+            </a:r>
+            <a:r>
+              <a:rPr lang="en-US" sz="1100">
+                <a:solidFill>
+                  <a:schemeClr val="accent1"/>
+                </a:solidFill>
+                <a:latin typeface="Consolas" panose="020B0609020204030204" pitchFamily="49" charset="0"/>
+              </a:rPr>
+              <a:t>,</a:t>
+            </a:r>
+            <a:r>
+              <a:rPr lang="en-US" sz="1100">
+                <a:latin typeface="Consolas" panose="020B0609020204030204" pitchFamily="49" charset="0"/>
+              </a:rPr>
+              <a:t> 1</a:t>
+            </a:r>
+            <a:r>
+              <a:rPr lang="en-US" sz="1100">
+                <a:solidFill>
+                  <a:schemeClr val="accent1"/>
+                </a:solidFill>
+                <a:latin typeface="Consolas" panose="020B0609020204030204" pitchFamily="49" charset="0"/>
+              </a:rPr>
+              <a:t>]]</a:t>
+            </a:r>
+            <a:r>
+              <a:rPr lang="en-US" sz="1100">
+                <a:latin typeface="Consolas" panose="020B0609020204030204" pitchFamily="49" charset="0"/>
+              </a:rPr>
+              <a:t>)</a:t>
+            </a:r>
+          </a:p>
+          <a:p>
+            <a:r>
+              <a:rPr lang="en-US" sz="1100">
+                <a:latin typeface="Consolas" panose="020B0609020204030204" pitchFamily="49" charset="0"/>
+              </a:rPr>
+              <a:t>df = pd.DataFrame(data, </a:t>
+            </a:r>
+            <a:r>
+              <a:rPr lang="en-US" sz="1100">
+                <a:solidFill>
+                  <a:schemeClr val="accent1"/>
+                </a:solidFill>
+                <a:latin typeface="Consolas" panose="020B0609020204030204" pitchFamily="49" charset="0"/>
+              </a:rPr>
+              <a:t>index</a:t>
+            </a:r>
+            <a:r>
+              <a:rPr lang="en-US" sz="1100">
+                <a:latin typeface="Consolas" panose="020B0609020204030204" pitchFamily="49" charset="0"/>
+              </a:rPr>
+              <a:t> = ['day1', 'day2', 'day3'])</a:t>
+            </a:r>
+          </a:p>
+          <a:p>
+            <a:r>
+              <a:rPr lang="en-US" sz="1100">
+                <a:latin typeface="Consolas" panose="020B0609020204030204" pitchFamily="49" charset="0"/>
+              </a:rPr>
+              <a:t>print(df.loc['day2'])</a:t>
+            </a:r>
+          </a:p>
+          <a:p>
+            <a:r>
+              <a:rPr lang="en-US" sz="1100">
+                <a:latin typeface="Consolas" panose="020B0609020204030204" pitchFamily="49" charset="0"/>
+              </a:rPr>
+              <a:t>print(df</a:t>
+            </a:r>
+            <a:r>
+              <a:rPr lang="en-US" sz="1100">
+                <a:solidFill>
+                  <a:schemeClr val="accent1"/>
+                </a:solidFill>
+                <a:latin typeface="Consolas" panose="020B0609020204030204" pitchFamily="49" charset="0"/>
+              </a:rPr>
+              <a:t>.iloc[</a:t>
+            </a:r>
+            <a:r>
+              <a:rPr lang="en-US" sz="1100">
+                <a:latin typeface="Consolas" panose="020B0609020204030204" pitchFamily="49" charset="0"/>
+              </a:rPr>
+              <a:t>1</a:t>
+            </a:r>
+            <a:r>
+              <a:rPr lang="en-US" sz="1100">
+                <a:solidFill>
+                  <a:schemeClr val="accent1"/>
+                </a:solidFill>
+                <a:latin typeface="Consolas" panose="020B0609020204030204" pitchFamily="49" charset="0"/>
+              </a:rPr>
+              <a:t>]</a:t>
+            </a:r>
+            <a:r>
+              <a:rPr lang="en-US" sz="1100">
+                <a:latin typeface="Consolas" panose="020B0609020204030204" pitchFamily="49" charset="0"/>
+              </a:rPr>
+              <a:t>)</a:t>
             </a:r>
           </a:p>
         </p:txBody>
@@ -13807,7 +14041,7 @@
               <a:rPr lang="en-US" sz="1100">
                 <a:latin typeface="Consolas" panose="020B0609020204030204" pitchFamily="49" charset="0"/>
               </a:rPr>
-              <a:t>a = [1, 7, 2]</a:t>
+              <a:t>calories = [420, 380, 390]</a:t>
             </a:r>
           </a:p>
           <a:p>
@@ -13818,7 +14052,31 @@
               <a:rPr lang="en-US" sz="1100">
                 <a:latin typeface="Consolas" panose="020B0609020204030204" pitchFamily="49" charset="0"/>
               </a:rPr>
-              <a:t>myvar = pd.Series(a)</a:t>
+              <a:t>s = pd.</a:t>
+            </a:r>
+            <a:r>
+              <a:rPr lang="en-US" sz="1100">
+                <a:solidFill>
+                  <a:schemeClr val="accent1"/>
+                </a:solidFill>
+                <a:latin typeface="Consolas" panose="020B0609020204030204" pitchFamily="49" charset="0"/>
+              </a:rPr>
+              <a:t>Series(</a:t>
+            </a:r>
+            <a:r>
+              <a:rPr lang="en-US" sz="1100">
+                <a:latin typeface="Consolas" panose="020B0609020204030204" pitchFamily="49" charset="0"/>
+              </a:rPr>
+              <a:t>numbers</a:t>
+            </a:r>
+            <a:r>
+              <a:rPr lang="en-US" sz="1100">
+                <a:solidFill>
+                  <a:schemeClr val="accent1"/>
+                </a:solidFill>
+                <a:latin typeface="Consolas" panose="020B0609020204030204" pitchFamily="49" charset="0"/>
+              </a:rPr>
+              <a:t>)</a:t>
             </a:r>
           </a:p>
           <a:p>
@@ -13829,14 +14087,65 @@
               <a:rPr lang="en-US" sz="1100">
                 <a:latin typeface="Consolas" panose="020B0609020204030204" pitchFamily="49" charset="0"/>
               </a:rPr>
-              <a:t>print(myvar)</a:t>
-            </a:r>
-            <a:endParaRPr lang="en-US" sz="1100">
-              <a:solidFill>
-                <a:schemeClr val="accent1"/>
-              </a:solidFill>
-              <a:latin typeface="Consolas" panose="020B0609020204030204" pitchFamily="49" charset="0"/>
-            </a:endParaRPr>
+              <a:t>print(s)</a:t>
+            </a:r>
+          </a:p>
+          <a:p>
+            <a:pPr marL="76200" indent="0" algn="just">
+              <a:buNone/>
+            </a:pPr>
+            <a:r>
+              <a:rPr lang="en-US" sz="1100">
+                <a:latin typeface="Consolas" panose="020B0609020204030204" pitchFamily="49" charset="0"/>
+              </a:rPr>
+              <a:t>print(s</a:t>
+            </a:r>
+            <a:r>
+              <a:rPr lang="en-US" sz="1100">
+                <a:solidFill>
+                  <a:schemeClr val="accent1"/>
+                </a:solidFill>
+                <a:latin typeface="Consolas" panose="020B0609020204030204" pitchFamily="49" charset="0"/>
+              </a:rPr>
+              <a:t>[</a:t>
+            </a:r>
+            <a:r>
+              <a:rPr lang="en-US" sz="1100">
+                <a:latin typeface="Consolas" panose="020B0609020204030204" pitchFamily="49" charset="0"/>
+              </a:rPr>
+              <a:t>0</a:t>
+            </a:r>
+            <a:r>
+              <a:rPr lang="en-US" sz="1100">
+                <a:solidFill>
+                  <a:schemeClr val="accent1"/>
+                </a:solidFill>
+                <a:latin typeface="Consolas" panose="020B0609020204030204" pitchFamily="49" charset="0"/>
+              </a:rPr>
+              <a:t>]</a:t>
+            </a:r>
+            <a:r>
+              <a:rPr lang="en-US" sz="1100">
+                <a:latin typeface="Consolas" panose="020B0609020204030204" pitchFamily="49" charset="0"/>
+              </a:rPr>
+              <a:t>)</a:t>
+            </a:r>
+          </a:p>
+          <a:p>
+            <a:r>
+              <a:rPr lang="en-US" sz="1100">
+                <a:latin typeface="Consolas" panose="020B0609020204030204" pitchFamily="49" charset="0"/>
+              </a:rPr>
+              <a:t>calories = {'day1': 420, 'day2': 380, 'day3': 390}</a:t>
+            </a:r>
+          </a:p>
+          <a:p>
+            <a:r>
+              <a:rPr lang="en-US" sz="1100">
+                <a:latin typeface="Consolas" panose="020B0609020204030204" pitchFamily="49" charset="0"/>
+              </a:rPr>
+              <a:t>print(s['day2'])</a:t>
+            </a:r>
           </a:p>
         </p:txBody>
       </p:sp>

</xml_diff>

<commit_message>
add pd read and view
</commit_message>
<xml_diff>
--- a/2 Data Science.pptx
+++ b/2 Data Science.pptx
@@ -5,10 +5,10 @@
     <p:sldMasterId id="2147483658" r:id="rId1"/>
   </p:sldMasterIdLst>
   <p:notesMasterIdLst>
-    <p:notesMasterId r:id="rId24"/>
+    <p:notesMasterId r:id="rId25"/>
   </p:notesMasterIdLst>
   <p:handoutMasterIdLst>
-    <p:handoutMasterId r:id="rId25"/>
+    <p:handoutMasterId r:id="rId26"/>
   </p:handoutMasterIdLst>
   <p:sldIdLst>
     <p:sldId id="256" r:id="rId2"/>
@@ -30,38 +30,39 @@
     <p:sldId id="350" r:id="rId18"/>
     <p:sldId id="352" r:id="rId19"/>
     <p:sldId id="351" r:id="rId20"/>
-    <p:sldId id="335" r:id="rId21"/>
-    <p:sldId id="340" r:id="rId22"/>
-    <p:sldId id="280" r:id="rId23"/>
+    <p:sldId id="353" r:id="rId21"/>
+    <p:sldId id="335" r:id="rId22"/>
+    <p:sldId id="340" r:id="rId23"/>
+    <p:sldId id="280" r:id="rId24"/>
   </p:sldIdLst>
   <p:sldSz cx="9144000" cy="5143500" type="screen16x9"/>
   <p:notesSz cx="6858000" cy="9144000"/>
   <p:embeddedFontLst>
     <p:embeddedFont>
       <p:font typeface="Consolas" panose="020B0609020204030204" pitchFamily="49" charset="0"/>
-      <p:regular r:id="rId26"/>
-      <p:bold r:id="rId27"/>
-      <p:italic r:id="rId28"/>
-      <p:boldItalic r:id="rId29"/>
+      <p:regular r:id="rId27"/>
+      <p:bold r:id="rId28"/>
+      <p:italic r:id="rId29"/>
+      <p:boldItalic r:id="rId30"/>
     </p:embeddedFont>
     <p:embeddedFont>
       <p:font typeface="Roboto Slab" panose="020B0604020202020204" charset="0"/>
-      <p:regular r:id="rId30"/>
-      <p:bold r:id="rId31"/>
+      <p:regular r:id="rId31"/>
+      <p:bold r:id="rId32"/>
     </p:embeddedFont>
     <p:embeddedFont>
       <p:font typeface="Source Sans Pro" panose="020B0503030403020204" pitchFamily="34" charset="0"/>
-      <p:regular r:id="rId32"/>
-      <p:bold r:id="rId33"/>
-      <p:italic r:id="rId34"/>
-      <p:boldItalic r:id="rId35"/>
+      <p:regular r:id="rId33"/>
+      <p:bold r:id="rId34"/>
+      <p:italic r:id="rId35"/>
+      <p:boldItalic r:id="rId36"/>
     </p:embeddedFont>
     <p:embeddedFont>
       <p:font typeface="Trebuchet MS" panose="020B0603020202020204" pitchFamily="34" charset="0"/>
-      <p:regular r:id="rId36"/>
-      <p:bold r:id="rId37"/>
-      <p:italic r:id="rId38"/>
-      <p:boldItalic r:id="rId39"/>
+      <p:regular r:id="rId37"/>
+      <p:bold r:id="rId38"/>
+      <p:italic r:id="rId39"/>
+      <p:boldItalic r:id="rId40"/>
     </p:embeddedFont>
   </p:embeddedFontLst>
   <p:defaultTextStyle>
@@ -7785,11 +7786,11 @@
 </file>
 
 <file path=ppt/notesSlides/notesSlide6.xml><?xml version="1.0" encoding="utf-8"?>
-<p:notes xmlns:a="http://schemas.openxmlformats.org/drawingml/2006/main" xmlns:r="http://schemas.openxmlformats.org/officeDocument/2006/relationships" xmlns:p="http://schemas.openxmlformats.org/presentationml/2006/main" showMasterSp="0" showMasterPhAnim="0">
+<p:notes xmlns:a="http://schemas.openxmlformats.org/drawingml/2006/main" xmlns:r="http://schemas.openxmlformats.org/officeDocument/2006/relationships" xmlns:p="http://schemas.openxmlformats.org/presentationml/2006/main">
   <p:cSld>
     <p:spTree>
       <p:nvGrpSpPr>
-        <p:cNvPr id="1" name="Shape 93"/>
+        <p:cNvPr id="1" name=""/>
         <p:cNvGrpSpPr/>
         <p:nvPr/>
       </p:nvGrpSpPr>
@@ -7803,12 +7804,12 @@
       </p:grpSpPr>
       <p:sp>
         <p:nvSpPr>
-          <p:cNvPr id="94" name="Google Shape;94;g35f391192_029:notes"/>
+          <p:cNvPr id="2" name="Slide Image Placeholder 1"/>
           <p:cNvSpPr>
             <a:spLocks noGrp="1" noRot="1" noChangeAspect="1"/>
           </p:cNvSpPr>
           <p:nvPr>
-            <p:ph type="sldImg" idx="2"/>
+            <p:ph type="sldImg"/>
           </p:nvPr>
         </p:nvSpPr>
         <p:spPr>
@@ -7816,74 +7817,31 @@
             <a:off x="381000" y="685800"/>
             <a:ext cx="6096000" cy="3429000"/>
           </a:xfrm>
-          <a:custGeom>
-            <a:avLst/>
-            <a:gdLst/>
-            <a:ahLst/>
-            <a:cxnLst/>
-            <a:rect l="l" t="t" r="r" b="b"/>
-            <a:pathLst>
-              <a:path w="120000" h="120000" extrusionOk="0">
-                <a:moveTo>
-                  <a:pt x="0" y="0"/>
-                </a:moveTo>
-                <a:lnTo>
-                  <a:pt x="120000" y="0"/>
-                </a:lnTo>
-                <a:lnTo>
-                  <a:pt x="120000" y="120000"/>
-                </a:lnTo>
-                <a:lnTo>
-                  <a:pt x="0" y="120000"/>
-                </a:lnTo>
-                <a:close/>
-              </a:path>
-            </a:pathLst>
-          </a:custGeom>
         </p:spPr>
       </p:sp>
       <p:sp>
         <p:nvSpPr>
-          <p:cNvPr id="95" name="Google Shape;95;g35f391192_029:notes"/>
-          <p:cNvSpPr txBox="1">
+          <p:cNvPr id="3" name="Notes Placeholder 2"/>
+          <p:cNvSpPr>
             <a:spLocks noGrp="1"/>
           </p:cNvSpPr>
           <p:nvPr>
             <p:ph type="body" idx="1"/>
           </p:nvPr>
         </p:nvSpPr>
-        <p:spPr>
-          <a:xfrm>
-            <a:off x="685800" y="4343400"/>
-            <a:ext cx="5486400" cy="4114800"/>
-          </a:xfrm>
-          <a:prstGeom prst="rect">
-            <a:avLst/>
-          </a:prstGeom>
-        </p:spPr>
+        <p:spPr/>
         <p:txBody>
-          <a:bodyPr spcFirstLastPara="1" wrap="square" lIns="91425" tIns="91425" rIns="91425" bIns="91425" anchor="t" anchorCtr="0">
-            <a:noAutofit/>
-          </a:bodyPr>
+          <a:bodyPr/>
           <a:lstStyle/>
           <a:p>
-            <a:pPr marL="0" lvl="0" indent="0" algn="l" rtl="0">
-              <a:spcBef>
-                <a:spcPts val="0"/>
-              </a:spcBef>
-              <a:spcAft>
-                <a:spcPts val="0"/>
-              </a:spcAft>
-              <a:buNone/>
-            </a:pPr>
-            <a:endParaRPr/>
+            <a:endParaRPr lang="en-US"/>
           </a:p>
         </p:txBody>
       </p:sp>
     </p:spTree>
     <p:extLst>
       <p:ext uri="{BB962C8B-B14F-4D97-AF65-F5344CB8AC3E}">
-        <p14:creationId xmlns:p14="http://schemas.microsoft.com/office/powerpoint/2010/main" val="3390362646"/>
+        <p14:creationId xmlns:p14="http://schemas.microsoft.com/office/powerpoint/2010/main" val="1245101495"/>
       </p:ext>
     </p:extLst>
   </p:cSld>
@@ -7992,6 +7950,115 @@
     </p:spTree>
     <p:extLst>
       <p:ext uri="{BB962C8B-B14F-4D97-AF65-F5344CB8AC3E}">
+        <p14:creationId xmlns:p14="http://schemas.microsoft.com/office/powerpoint/2010/main" val="3390362646"/>
+      </p:ext>
+    </p:extLst>
+  </p:cSld>
+  <p:clrMapOvr>
+    <a:masterClrMapping/>
+  </p:clrMapOvr>
+</p:notes>
+</file>
+
+<file path=ppt/notesSlides/notesSlide8.xml><?xml version="1.0" encoding="utf-8"?>
+<p:notes xmlns:a="http://schemas.openxmlformats.org/drawingml/2006/main" xmlns:r="http://schemas.openxmlformats.org/officeDocument/2006/relationships" xmlns:p="http://schemas.openxmlformats.org/presentationml/2006/main" showMasterSp="0" showMasterPhAnim="0">
+  <p:cSld>
+    <p:spTree>
+      <p:nvGrpSpPr>
+        <p:cNvPr id="1" name="Shape 93"/>
+        <p:cNvGrpSpPr/>
+        <p:nvPr/>
+      </p:nvGrpSpPr>
+      <p:grpSpPr>
+        <a:xfrm>
+          <a:off x="0" y="0"/>
+          <a:ext cx="0" cy="0"/>
+          <a:chOff x="0" y="0"/>
+          <a:chExt cx="0" cy="0"/>
+        </a:xfrm>
+      </p:grpSpPr>
+      <p:sp>
+        <p:nvSpPr>
+          <p:cNvPr id="94" name="Google Shape;94;g35f391192_029:notes"/>
+          <p:cNvSpPr>
+            <a:spLocks noGrp="1" noRot="1" noChangeAspect="1"/>
+          </p:cNvSpPr>
+          <p:nvPr>
+            <p:ph type="sldImg" idx="2"/>
+          </p:nvPr>
+        </p:nvSpPr>
+        <p:spPr>
+          <a:xfrm>
+            <a:off x="381000" y="685800"/>
+            <a:ext cx="6096000" cy="3429000"/>
+          </a:xfrm>
+          <a:custGeom>
+            <a:avLst/>
+            <a:gdLst/>
+            <a:ahLst/>
+            <a:cxnLst/>
+            <a:rect l="l" t="t" r="r" b="b"/>
+            <a:pathLst>
+              <a:path w="120000" h="120000" extrusionOk="0">
+                <a:moveTo>
+                  <a:pt x="0" y="0"/>
+                </a:moveTo>
+                <a:lnTo>
+                  <a:pt x="120000" y="0"/>
+                </a:lnTo>
+                <a:lnTo>
+                  <a:pt x="120000" y="120000"/>
+                </a:lnTo>
+                <a:lnTo>
+                  <a:pt x="0" y="120000"/>
+                </a:lnTo>
+                <a:close/>
+              </a:path>
+            </a:pathLst>
+          </a:custGeom>
+        </p:spPr>
+      </p:sp>
+      <p:sp>
+        <p:nvSpPr>
+          <p:cNvPr id="95" name="Google Shape;95;g35f391192_029:notes"/>
+          <p:cNvSpPr txBox="1">
+            <a:spLocks noGrp="1"/>
+          </p:cNvSpPr>
+          <p:nvPr>
+            <p:ph type="body" idx="1"/>
+          </p:nvPr>
+        </p:nvSpPr>
+        <p:spPr>
+          <a:xfrm>
+            <a:off x="685800" y="4343400"/>
+            <a:ext cx="5486400" cy="4114800"/>
+          </a:xfrm>
+          <a:prstGeom prst="rect">
+            <a:avLst/>
+          </a:prstGeom>
+        </p:spPr>
+        <p:txBody>
+          <a:bodyPr spcFirstLastPara="1" wrap="square" lIns="91425" tIns="91425" rIns="91425" bIns="91425" anchor="t" anchorCtr="0">
+            <a:noAutofit/>
+          </a:bodyPr>
+          <a:lstStyle/>
+          <a:p>
+            <a:pPr marL="0" lvl="0" indent="0" algn="l" rtl="0">
+              <a:spcBef>
+                <a:spcPts val="0"/>
+              </a:spcBef>
+              <a:spcAft>
+                <a:spcPts val="0"/>
+              </a:spcAft>
+              <a:buNone/>
+            </a:pPr>
+            <a:endParaRPr/>
+          </a:p>
+        </p:txBody>
+      </p:sp>
+    </p:spTree>
+    <p:extLst>
+      <p:ext uri="{BB962C8B-B14F-4D97-AF65-F5344CB8AC3E}">
         <p14:creationId xmlns:p14="http://schemas.microsoft.com/office/powerpoint/2010/main" val="1150731996"/>
       </p:ext>
     </p:extLst>
@@ -8002,7 +8069,7 @@
 </p:notes>
 </file>
 
-<file path=ppt/notesSlides/notesSlide8.xml><?xml version="1.0" encoding="utf-8"?>
+<file path=ppt/notesSlides/notesSlide9.xml><?xml version="1.0" encoding="utf-8"?>
 <p:notes xmlns:a="http://schemas.openxmlformats.org/drawingml/2006/main" xmlns:r="http://schemas.openxmlformats.org/officeDocument/2006/relationships" xmlns:p="http://schemas.openxmlformats.org/presentationml/2006/main" showMasterSp="0" showMasterPhAnim="0">
   <p:cSld>
     <p:spTree>
@@ -14334,7 +14401,7 @@
   <p:cSld>
     <p:spTree>
       <p:nvGrpSpPr>
-        <p:cNvPr id="1" name="Shape 96"/>
+        <p:cNvPr id="1" name=""/>
         <p:cNvGrpSpPr/>
         <p:nvPr/>
       </p:nvGrpSpPr>
@@ -14348,84 +14415,238 @@
       </p:grpSpPr>
       <p:sp>
         <p:nvSpPr>
-          <p:cNvPr id="97" name="Google Shape;97;p15"/>
-          <p:cNvSpPr txBox="1">
+          <p:cNvPr id="2" name="Title 1">
+            <a:extLst>
+              <a:ext uri="{FF2B5EF4-FFF2-40B4-BE49-F238E27FC236}">
+                <a16:creationId xmlns:a16="http://schemas.microsoft.com/office/drawing/2014/main" id="{024AD384-5AD1-4435-A943-1241B2FACD62}"/>
+              </a:ext>
+            </a:extLst>
+          </p:cNvPr>
+          <p:cNvSpPr>
             <a:spLocks noGrp="1"/>
           </p:cNvSpPr>
           <p:nvPr>
-            <p:ph type="ctrTitle"/>
+            <p:ph type="title"/>
+          </p:nvPr>
+        </p:nvSpPr>
+        <p:spPr/>
+        <p:txBody>
+          <a:bodyPr/>
+          <a:lstStyle/>
+          <a:p>
+            <a:r>
+              <a:rPr lang="en-US"/>
+              <a:t>Read and View</a:t>
+            </a:r>
+            <a:endParaRPr lang="fa-IR"/>
+          </a:p>
+        </p:txBody>
+      </p:sp>
+      <p:sp>
+        <p:nvSpPr>
+          <p:cNvPr id="3" name="Text Placeholder 2">
+            <a:extLst>
+              <a:ext uri="{FF2B5EF4-FFF2-40B4-BE49-F238E27FC236}">
+                <a16:creationId xmlns:a16="http://schemas.microsoft.com/office/drawing/2014/main" id="{58BE3078-8B89-4550-B497-93E4DADBD57E}"/>
+              </a:ext>
+            </a:extLst>
+          </p:cNvPr>
+          <p:cNvSpPr>
+            <a:spLocks noGrp="1"/>
+          </p:cNvSpPr>
+          <p:nvPr>
+            <p:ph type="body" idx="1"/>
           </p:nvPr>
         </p:nvSpPr>
         <p:spPr>
           <a:xfrm>
-            <a:off x="1655700" y="1991850"/>
-            <a:ext cx="5832600" cy="1159800"/>
+            <a:off x="786150" y="1142608"/>
+            <a:ext cx="7571700" cy="3626431"/>
           </a:xfrm>
-          <a:prstGeom prst="rect">
-            <a:avLst/>
-          </a:prstGeom>
         </p:spPr>
         <p:txBody>
-          <a:bodyPr spcFirstLastPara="1" wrap="square" lIns="91425" tIns="91425" rIns="91425" bIns="91425" anchor="ctr" anchorCtr="0">
-            <a:noAutofit/>
-          </a:bodyPr>
+          <a:bodyPr/>
           <a:lstStyle/>
           <a:p>
-            <a:pPr marL="0" lvl="0" indent="0" algn="ctr" rtl="0">
-              <a:spcBef>
-                <a:spcPts val="0"/>
-              </a:spcBef>
-              <a:spcAft>
-                <a:spcPts val="0"/>
-              </a:spcAft>
-              <a:buNone/>
-            </a:pPr>
-            <a:r>
-              <a:rPr lang="en-US" sz="6000">
+            <a:pPr marL="76200" indent="0" algn="just">
+              <a:buNone/>
+            </a:pPr>
+            <a:r>
+              <a:rPr lang="en-US"/>
+              <a:t>Read</a:t>
+            </a:r>
+          </a:p>
+          <a:p>
+            <a:pPr marL="76200" indent="0" algn="just">
+              <a:buNone/>
+            </a:pPr>
+            <a:r>
+              <a:rPr lang="en-US" sz="1100">
+                <a:latin typeface="Consolas" panose="020B0609020204030204" pitchFamily="49" charset="0"/>
+              </a:rPr>
+              <a:t>df = pd.</a:t>
+            </a:r>
+            <a:r>
+              <a:rPr lang="en-US" sz="1100">
                 <a:solidFill>
-                  <a:srgbClr val="E6E6E6"/>
+                  <a:schemeClr val="accent1"/>
                 </a:solidFill>
-              </a:rPr>
-              <a:t>3</a:t>
-            </a:r>
-            <a:endParaRPr sz="6000">
-              <a:solidFill>
-                <a:srgbClr val="E6E6E6"/>
-              </a:solidFill>
+                <a:latin typeface="Consolas" panose="020B0609020204030204" pitchFamily="49" charset="0"/>
+              </a:rPr>
+              <a:t>read_csv(</a:t>
+            </a:r>
+            <a:r>
+              <a:rPr lang="en-US" sz="1100">
+                <a:latin typeface="Consolas" panose="020B0609020204030204" pitchFamily="49" charset="0"/>
+              </a:rPr>
+              <a:t>'data.csv'</a:t>
+            </a:r>
+            <a:r>
+              <a:rPr lang="en-US" sz="1100">
+                <a:solidFill>
+                  <a:schemeClr val="accent1"/>
+                </a:solidFill>
+                <a:latin typeface="Consolas" panose="020B0609020204030204" pitchFamily="49" charset="0"/>
+              </a:rPr>
+              <a:t>)</a:t>
+            </a:r>
+          </a:p>
+          <a:p>
+            <a:pPr marL="76200" indent="0" algn="just">
+              <a:buNone/>
+            </a:pPr>
+            <a:r>
+              <a:rPr lang="en-US" sz="1100">
+                <a:latin typeface="Consolas" panose="020B0609020204030204" pitchFamily="49" charset="0"/>
+              </a:rPr>
+              <a:t>df = pd.</a:t>
+            </a:r>
+            <a:r>
+              <a:rPr lang="en-US" sz="1100">
+                <a:solidFill>
+                  <a:schemeClr val="accent1"/>
+                </a:solidFill>
+                <a:latin typeface="Consolas" panose="020B0609020204030204" pitchFamily="49" charset="0"/>
+              </a:rPr>
+              <a:t>read_json(</a:t>
+            </a:r>
+            <a:r>
+              <a:rPr lang="en-US" sz="1100">
+                <a:latin typeface="Consolas" panose="020B0609020204030204" pitchFamily="49" charset="0"/>
+              </a:rPr>
+              <a:t>'data.json'</a:t>
+            </a:r>
+            <a:r>
+              <a:rPr lang="en-US" sz="1100">
+                <a:solidFill>
+                  <a:schemeClr val="accent1"/>
+                </a:solidFill>
+                <a:latin typeface="Consolas" panose="020B0609020204030204" pitchFamily="49" charset="0"/>
+              </a:rPr>
+              <a:t>)</a:t>
+            </a:r>
+          </a:p>
+          <a:p>
+            <a:pPr marL="76200" indent="0" algn="just">
+              <a:buNone/>
+            </a:pPr>
+            <a:r>
+              <a:rPr lang="en-US" sz="1100">
+                <a:latin typeface="Consolas" panose="020B0609020204030204" pitchFamily="49" charset="0"/>
+              </a:rPr>
+              <a:t>print(df</a:t>
+            </a:r>
+            <a:r>
+              <a:rPr lang="en-US" sz="1100">
+                <a:solidFill>
+                  <a:schemeClr val="accent1"/>
+                </a:solidFill>
+                <a:latin typeface="Consolas" panose="020B0609020204030204" pitchFamily="49" charset="0"/>
+              </a:rPr>
+              <a:t>.head()</a:t>
+            </a:r>
+            <a:r>
+              <a:rPr lang="en-US" sz="1100">
+                <a:latin typeface="Consolas" panose="020B0609020204030204" pitchFamily="49" charset="0"/>
+              </a:rPr>
+              <a:t>)</a:t>
+            </a:r>
+          </a:p>
+          <a:p>
+            <a:r>
+              <a:rPr lang="en-US" sz="1100">
+                <a:latin typeface="Consolas" panose="020B0609020204030204" pitchFamily="49" charset="0"/>
+              </a:rPr>
+              <a:t>print(df</a:t>
+            </a:r>
+            <a:r>
+              <a:rPr lang="en-US" sz="1100">
+                <a:solidFill>
+                  <a:schemeClr val="accent1"/>
+                </a:solidFill>
+                <a:latin typeface="Consolas" panose="020B0609020204030204" pitchFamily="49" charset="0"/>
+              </a:rPr>
+              <a:t>.tail()</a:t>
+            </a:r>
+            <a:r>
+              <a:rPr lang="en-US" sz="1100">
+                <a:latin typeface="Consolas" panose="020B0609020204030204" pitchFamily="49" charset="0"/>
+              </a:rPr>
+              <a:t>)</a:t>
+            </a:r>
+          </a:p>
+          <a:p>
+            <a:r>
+              <a:rPr lang="en-US" sz="1100">
+                <a:latin typeface="Consolas" panose="020B0609020204030204" pitchFamily="49" charset="0"/>
+              </a:rPr>
+              <a:t>print(df</a:t>
+            </a:r>
+            <a:r>
+              <a:rPr lang="en-US" sz="1100">
+                <a:solidFill>
+                  <a:schemeClr val="accent1"/>
+                </a:solidFill>
+                <a:latin typeface="Consolas" panose="020B0609020204030204" pitchFamily="49" charset="0"/>
+              </a:rPr>
+              <a:t>.info()</a:t>
+            </a:r>
+            <a:r>
+              <a:rPr lang="en-US" sz="1100">
+                <a:latin typeface="Consolas" panose="020B0609020204030204" pitchFamily="49" charset="0"/>
+              </a:rPr>
+              <a:t>)</a:t>
+            </a:r>
+          </a:p>
+          <a:p>
+            <a:pPr marL="76200" indent="0" algn="just">
+              <a:buNone/>
+            </a:pPr>
+            <a:endParaRPr lang="en-US" sz="1100">
+              <a:latin typeface="Consolas" panose="020B0609020204030204" pitchFamily="49" charset="0"/>
             </a:endParaRPr>
-          </a:p>
-          <a:p>
-            <a:r>
-              <a:rPr lang="en"/>
-              <a:t>Matplotlib</a:t>
-            </a:r>
-            <a:endParaRPr/>
           </a:p>
         </p:txBody>
       </p:sp>
       <p:sp>
         <p:nvSpPr>
-          <p:cNvPr id="99" name="Google Shape;99;p15"/>
-          <p:cNvSpPr txBox="1">
+          <p:cNvPr id="4" name="Slide Number Placeholder 3">
+            <a:extLst>
+              <a:ext uri="{FF2B5EF4-FFF2-40B4-BE49-F238E27FC236}">
+                <a16:creationId xmlns:a16="http://schemas.microsoft.com/office/drawing/2014/main" id="{64987AE6-EC0E-43DD-9376-95A5602EE5E1}"/>
+              </a:ext>
+            </a:extLst>
+          </p:cNvPr>
+          <p:cNvSpPr>
             <a:spLocks noGrp="1"/>
           </p:cNvSpPr>
           <p:nvPr>
-            <p:ph type="sldNum" idx="4294967295"/>
+            <p:ph type="sldNum" idx="12"/>
           </p:nvPr>
         </p:nvSpPr>
-        <p:spPr>
-          <a:xfrm>
-            <a:off x="8404384" y="4749851"/>
-            <a:ext cx="548700" cy="393600"/>
-          </a:xfrm>
-          <a:prstGeom prst="rect">
-            <a:avLst/>
-          </a:prstGeom>
-        </p:spPr>
+        <p:spPr/>
         <p:txBody>
-          <a:bodyPr spcFirstLastPara="1" wrap="square" lIns="91425" tIns="91425" rIns="91425" bIns="91425" anchor="t" anchorCtr="0">
-            <a:noAutofit/>
-          </a:bodyPr>
+          <a:bodyPr/>
           <a:lstStyle/>
           <a:p>
             <a:pPr marL="0" lvl="0" indent="0" algn="r" rtl="0">
@@ -14438,17 +14659,17 @@
               <a:buNone/>
             </a:pPr>
             <a:fld id="{00000000-1234-1234-1234-123412341234}" type="slidenum">
-              <a:rPr lang="en"/>
+              <a:rPr lang="en" smtClean="0"/>
               <a:t>20</a:t>
             </a:fld>
-            <a:endParaRPr/>
+            <a:endParaRPr lang="en"/>
           </a:p>
         </p:txBody>
       </p:sp>
     </p:spTree>
     <p:extLst>
       <p:ext uri="{BB962C8B-B14F-4D97-AF65-F5344CB8AC3E}">
-        <p14:creationId xmlns:p14="http://schemas.microsoft.com/office/powerpoint/2010/main" val="550571345"/>
+        <p14:creationId xmlns:p14="http://schemas.microsoft.com/office/powerpoint/2010/main" val="3039061786"/>
       </p:ext>
     </p:extLst>
   </p:cSld>
@@ -14515,7 +14736,7 @@
                   <a:srgbClr val="E6E6E6"/>
                 </a:solidFill>
               </a:rPr>
-              <a:t>4</a:t>
+              <a:t>3</a:t>
             </a:r>
             <a:endParaRPr sz="6000">
               <a:solidFill>
@@ -14525,8 +14746,8 @@
           </a:p>
           <a:p>
             <a:r>
-              <a:rPr lang="en-US"/>
-              <a:t>Scikit-learn</a:t>
+              <a:rPr lang="en"/>
+              <a:t>Matplotlib</a:t>
             </a:r>
             <a:endParaRPr/>
           </a:p>
@@ -14577,6 +14798,135 @@
     </p:spTree>
     <p:extLst>
       <p:ext uri="{BB962C8B-B14F-4D97-AF65-F5344CB8AC3E}">
+        <p14:creationId xmlns:p14="http://schemas.microsoft.com/office/powerpoint/2010/main" val="550571345"/>
+      </p:ext>
+    </p:extLst>
+  </p:cSld>
+  <p:clrMapOvr>
+    <a:masterClrMapping/>
+  </p:clrMapOvr>
+</p:sld>
+</file>
+
+<file path=ppt/slides/slide22.xml><?xml version="1.0" encoding="utf-8"?>
+<p:sld xmlns:a="http://schemas.openxmlformats.org/drawingml/2006/main" xmlns:r="http://schemas.openxmlformats.org/officeDocument/2006/relationships" xmlns:p="http://schemas.openxmlformats.org/presentationml/2006/main">
+  <p:cSld>
+    <p:spTree>
+      <p:nvGrpSpPr>
+        <p:cNvPr id="1" name="Shape 96"/>
+        <p:cNvGrpSpPr/>
+        <p:nvPr/>
+      </p:nvGrpSpPr>
+      <p:grpSpPr>
+        <a:xfrm>
+          <a:off x="0" y="0"/>
+          <a:ext cx="0" cy="0"/>
+          <a:chOff x="0" y="0"/>
+          <a:chExt cx="0" cy="0"/>
+        </a:xfrm>
+      </p:grpSpPr>
+      <p:sp>
+        <p:nvSpPr>
+          <p:cNvPr id="97" name="Google Shape;97;p15"/>
+          <p:cNvSpPr txBox="1">
+            <a:spLocks noGrp="1"/>
+          </p:cNvSpPr>
+          <p:nvPr>
+            <p:ph type="ctrTitle"/>
+          </p:nvPr>
+        </p:nvSpPr>
+        <p:spPr>
+          <a:xfrm>
+            <a:off x="1655700" y="1991850"/>
+            <a:ext cx="5832600" cy="1159800"/>
+          </a:xfrm>
+          <a:prstGeom prst="rect">
+            <a:avLst/>
+          </a:prstGeom>
+        </p:spPr>
+        <p:txBody>
+          <a:bodyPr spcFirstLastPara="1" wrap="square" lIns="91425" tIns="91425" rIns="91425" bIns="91425" anchor="ctr" anchorCtr="0">
+            <a:noAutofit/>
+          </a:bodyPr>
+          <a:lstStyle/>
+          <a:p>
+            <a:pPr marL="0" lvl="0" indent="0" algn="ctr" rtl="0">
+              <a:spcBef>
+                <a:spcPts val="0"/>
+              </a:spcBef>
+              <a:spcAft>
+                <a:spcPts val="0"/>
+              </a:spcAft>
+              <a:buNone/>
+            </a:pPr>
+            <a:r>
+              <a:rPr lang="en-US" sz="6000">
+                <a:solidFill>
+                  <a:srgbClr val="E6E6E6"/>
+                </a:solidFill>
+              </a:rPr>
+              <a:t>4</a:t>
+            </a:r>
+            <a:endParaRPr sz="6000">
+              <a:solidFill>
+                <a:srgbClr val="E6E6E6"/>
+              </a:solidFill>
+            </a:endParaRPr>
+          </a:p>
+          <a:p>
+            <a:r>
+              <a:rPr lang="en-US"/>
+              <a:t>Scikit-learn</a:t>
+            </a:r>
+            <a:endParaRPr/>
+          </a:p>
+        </p:txBody>
+      </p:sp>
+      <p:sp>
+        <p:nvSpPr>
+          <p:cNvPr id="99" name="Google Shape;99;p15"/>
+          <p:cNvSpPr txBox="1">
+            <a:spLocks noGrp="1"/>
+          </p:cNvSpPr>
+          <p:nvPr>
+            <p:ph type="sldNum" idx="4294967295"/>
+          </p:nvPr>
+        </p:nvSpPr>
+        <p:spPr>
+          <a:xfrm>
+            <a:off x="8404384" y="4749851"/>
+            <a:ext cx="548700" cy="393600"/>
+          </a:xfrm>
+          <a:prstGeom prst="rect">
+            <a:avLst/>
+          </a:prstGeom>
+        </p:spPr>
+        <p:txBody>
+          <a:bodyPr spcFirstLastPara="1" wrap="square" lIns="91425" tIns="91425" rIns="91425" bIns="91425" anchor="t" anchorCtr="0">
+            <a:noAutofit/>
+          </a:bodyPr>
+          <a:lstStyle/>
+          <a:p>
+            <a:pPr marL="0" lvl="0" indent="0" algn="r" rtl="0">
+              <a:spcBef>
+                <a:spcPts val="0"/>
+              </a:spcBef>
+              <a:spcAft>
+                <a:spcPts val="0"/>
+              </a:spcAft>
+              <a:buNone/>
+            </a:pPr>
+            <a:fld id="{00000000-1234-1234-1234-123412341234}" type="slidenum">
+              <a:rPr lang="en"/>
+              <a:t>22</a:t>
+            </a:fld>
+            <a:endParaRPr/>
+          </a:p>
+        </p:txBody>
+      </p:sp>
+    </p:spTree>
+    <p:extLst>
+      <p:ext uri="{BB962C8B-B14F-4D97-AF65-F5344CB8AC3E}">
         <p14:creationId xmlns:p14="http://schemas.microsoft.com/office/powerpoint/2010/main" val="2239011547"/>
       </p:ext>
     </p:extLst>
@@ -14587,7 +14937,7 @@
 </p:sld>
 </file>
 
-<file path=ppt/slides/slide22.xml><?xml version="1.0" encoding="utf-8"?>
+<file path=ppt/slides/slide23.xml><?xml version="1.0" encoding="utf-8"?>
 <p:sld xmlns:a="http://schemas.openxmlformats.org/drawingml/2006/main" xmlns:r="http://schemas.openxmlformats.org/officeDocument/2006/relationships" xmlns:p="http://schemas.openxmlformats.org/presentationml/2006/main">
   <p:cSld>
     <p:spTree>
@@ -14840,7 +15190,7 @@
             </a:pPr>
             <a:fld id="{00000000-1234-1234-1234-123412341234}" type="slidenum">
               <a:rPr lang="en"/>
-              <a:t>22</a:t>
+              <a:t>23</a:t>
             </a:fld>
             <a:endParaRPr/>
           </a:p>

</xml_diff>

<commit_message>
add pd data cleaning
</commit_message>
<xml_diff>
--- a/2 Data Science.pptx
+++ b/2 Data Science.pptx
@@ -5,10 +5,10 @@
     <p:sldMasterId id="2147483658" r:id="rId1"/>
   </p:sldMasterIdLst>
   <p:notesMasterIdLst>
-    <p:notesMasterId r:id="rId25"/>
+    <p:notesMasterId r:id="rId26"/>
   </p:notesMasterIdLst>
   <p:handoutMasterIdLst>
-    <p:handoutMasterId r:id="rId26"/>
+    <p:handoutMasterId r:id="rId27"/>
   </p:handoutMasterIdLst>
   <p:sldIdLst>
     <p:sldId id="256" r:id="rId2"/>
@@ -31,38 +31,39 @@
     <p:sldId id="352" r:id="rId19"/>
     <p:sldId id="351" r:id="rId20"/>
     <p:sldId id="353" r:id="rId21"/>
-    <p:sldId id="335" r:id="rId22"/>
-    <p:sldId id="340" r:id="rId23"/>
-    <p:sldId id="280" r:id="rId24"/>
+    <p:sldId id="354" r:id="rId22"/>
+    <p:sldId id="335" r:id="rId23"/>
+    <p:sldId id="340" r:id="rId24"/>
+    <p:sldId id="280" r:id="rId25"/>
   </p:sldIdLst>
   <p:sldSz cx="9144000" cy="5143500" type="screen16x9"/>
   <p:notesSz cx="6858000" cy="9144000"/>
   <p:embeddedFontLst>
     <p:embeddedFont>
       <p:font typeface="Consolas" panose="020B0609020204030204" pitchFamily="49" charset="0"/>
-      <p:regular r:id="rId27"/>
-      <p:bold r:id="rId28"/>
-      <p:italic r:id="rId29"/>
-      <p:boldItalic r:id="rId30"/>
+      <p:regular r:id="rId28"/>
+      <p:bold r:id="rId29"/>
+      <p:italic r:id="rId30"/>
+      <p:boldItalic r:id="rId31"/>
     </p:embeddedFont>
     <p:embeddedFont>
       <p:font typeface="Roboto Slab" panose="020B0604020202020204" charset="0"/>
-      <p:regular r:id="rId31"/>
-      <p:bold r:id="rId32"/>
+      <p:regular r:id="rId32"/>
+      <p:bold r:id="rId33"/>
     </p:embeddedFont>
     <p:embeddedFont>
       <p:font typeface="Source Sans Pro" panose="020B0503030403020204" pitchFamily="34" charset="0"/>
-      <p:regular r:id="rId33"/>
-      <p:bold r:id="rId34"/>
-      <p:italic r:id="rId35"/>
-      <p:boldItalic r:id="rId36"/>
+      <p:regular r:id="rId34"/>
+      <p:bold r:id="rId35"/>
+      <p:italic r:id="rId36"/>
+      <p:boldItalic r:id="rId37"/>
     </p:embeddedFont>
     <p:embeddedFont>
       <p:font typeface="Trebuchet MS" panose="020B0603020202020204" pitchFamily="34" charset="0"/>
-      <p:regular r:id="rId37"/>
-      <p:bold r:id="rId38"/>
-      <p:italic r:id="rId39"/>
-      <p:boldItalic r:id="rId40"/>
+      <p:regular r:id="rId38"/>
+      <p:bold r:id="rId39"/>
+      <p:italic r:id="rId40"/>
+      <p:boldItalic r:id="rId41"/>
     </p:embeddedFont>
   </p:embeddedFontLst>
   <p:defaultTextStyle>
@@ -7392,6 +7393,110 @@
 </p:notes>
 </file>
 
+<file path=ppt/notesSlides/notesSlide10.xml><?xml version="1.0" encoding="utf-8"?>
+<p:notes xmlns:a="http://schemas.openxmlformats.org/drawingml/2006/main" xmlns:r="http://schemas.openxmlformats.org/officeDocument/2006/relationships" xmlns:p="http://schemas.openxmlformats.org/presentationml/2006/main" showMasterSp="0" showMasterPhAnim="0">
+  <p:cSld>
+    <p:spTree>
+      <p:nvGrpSpPr>
+        <p:cNvPr id="1" name="Shape 399"/>
+        <p:cNvGrpSpPr/>
+        <p:nvPr/>
+      </p:nvGrpSpPr>
+      <p:grpSpPr>
+        <a:xfrm>
+          <a:off x="0" y="0"/>
+          <a:ext cx="0" cy="0"/>
+          <a:chOff x="0" y="0"/>
+          <a:chExt cx="0" cy="0"/>
+        </a:xfrm>
+      </p:grpSpPr>
+      <p:sp>
+        <p:nvSpPr>
+          <p:cNvPr id="400" name="Google Shape;400;g35ed75ccf_022:notes"/>
+          <p:cNvSpPr>
+            <a:spLocks noGrp="1" noRot="1" noChangeAspect="1"/>
+          </p:cNvSpPr>
+          <p:nvPr>
+            <p:ph type="sldImg" idx="2"/>
+          </p:nvPr>
+        </p:nvSpPr>
+        <p:spPr>
+          <a:xfrm>
+            <a:off x="381000" y="685800"/>
+            <a:ext cx="6096000" cy="3429000"/>
+          </a:xfrm>
+          <a:custGeom>
+            <a:avLst/>
+            <a:gdLst/>
+            <a:ahLst/>
+            <a:cxnLst/>
+            <a:rect l="l" t="t" r="r" b="b"/>
+            <a:pathLst>
+              <a:path w="120000" h="120000" extrusionOk="0">
+                <a:moveTo>
+                  <a:pt x="0" y="0"/>
+                </a:moveTo>
+                <a:lnTo>
+                  <a:pt x="120000" y="0"/>
+                </a:lnTo>
+                <a:lnTo>
+                  <a:pt x="120000" y="120000"/>
+                </a:lnTo>
+                <a:lnTo>
+                  <a:pt x="0" y="120000"/>
+                </a:lnTo>
+                <a:close/>
+              </a:path>
+            </a:pathLst>
+          </a:custGeom>
+        </p:spPr>
+      </p:sp>
+      <p:sp>
+        <p:nvSpPr>
+          <p:cNvPr id="401" name="Google Shape;401;g35ed75ccf_022:notes"/>
+          <p:cNvSpPr txBox="1">
+            <a:spLocks noGrp="1"/>
+          </p:cNvSpPr>
+          <p:nvPr>
+            <p:ph type="body" idx="1"/>
+          </p:nvPr>
+        </p:nvSpPr>
+        <p:spPr>
+          <a:xfrm>
+            <a:off x="685800" y="4343400"/>
+            <a:ext cx="5486400" cy="4114800"/>
+          </a:xfrm>
+          <a:prstGeom prst="rect">
+            <a:avLst/>
+          </a:prstGeom>
+        </p:spPr>
+        <p:txBody>
+          <a:bodyPr spcFirstLastPara="1" wrap="square" lIns="91425" tIns="91425" rIns="91425" bIns="91425" anchor="t" anchorCtr="0">
+            <a:noAutofit/>
+          </a:bodyPr>
+          <a:lstStyle/>
+          <a:p>
+            <a:pPr marL="0" lvl="0" indent="0" algn="l" rtl="0">
+              <a:spcBef>
+                <a:spcPts val="0"/>
+              </a:spcBef>
+              <a:spcAft>
+                <a:spcPts val="0"/>
+              </a:spcAft>
+              <a:buNone/>
+            </a:pPr>
+            <a:endParaRPr/>
+          </a:p>
+        </p:txBody>
+      </p:sp>
+    </p:spTree>
+  </p:cSld>
+  <p:clrMapOvr>
+    <a:masterClrMapping/>
+  </p:clrMapOvr>
+</p:notes>
+</file>
+
 <file path=ppt/notesSlides/notesSlide2.xml><?xml version="1.0" encoding="utf-8"?>
 <p:notes xmlns:a="http://schemas.openxmlformats.org/drawingml/2006/main" xmlns:r="http://schemas.openxmlformats.org/officeDocument/2006/relationships" xmlns:p="http://schemas.openxmlformats.org/presentationml/2006/main" showMasterSp="0" showMasterPhAnim="0">
   <p:cSld>
@@ -7852,11 +7957,11 @@
 </file>
 
 <file path=ppt/notesSlides/notesSlide7.xml><?xml version="1.0" encoding="utf-8"?>
-<p:notes xmlns:a="http://schemas.openxmlformats.org/drawingml/2006/main" xmlns:r="http://schemas.openxmlformats.org/officeDocument/2006/relationships" xmlns:p="http://schemas.openxmlformats.org/presentationml/2006/main" showMasterSp="0" showMasterPhAnim="0">
+<p:notes xmlns:a="http://schemas.openxmlformats.org/drawingml/2006/main" xmlns:r="http://schemas.openxmlformats.org/officeDocument/2006/relationships" xmlns:p="http://schemas.openxmlformats.org/presentationml/2006/main">
   <p:cSld>
     <p:spTree>
       <p:nvGrpSpPr>
-        <p:cNvPr id="1" name="Shape 93"/>
+        <p:cNvPr id="1" name=""/>
         <p:cNvGrpSpPr/>
         <p:nvPr/>
       </p:nvGrpSpPr>
@@ -7870,12 +7975,12 @@
       </p:grpSpPr>
       <p:sp>
         <p:nvSpPr>
-          <p:cNvPr id="94" name="Google Shape;94;g35f391192_029:notes"/>
+          <p:cNvPr id="2" name="Slide Image Placeholder 1"/>
           <p:cNvSpPr>
             <a:spLocks noGrp="1" noRot="1" noChangeAspect="1"/>
           </p:cNvSpPr>
           <p:nvPr>
-            <p:ph type="sldImg" idx="2"/>
+            <p:ph type="sldImg"/>
           </p:nvPr>
         </p:nvSpPr>
         <p:spPr>
@@ -7883,74 +7988,31 @@
             <a:off x="381000" y="685800"/>
             <a:ext cx="6096000" cy="3429000"/>
           </a:xfrm>
-          <a:custGeom>
-            <a:avLst/>
-            <a:gdLst/>
-            <a:ahLst/>
-            <a:cxnLst/>
-            <a:rect l="l" t="t" r="r" b="b"/>
-            <a:pathLst>
-              <a:path w="120000" h="120000" extrusionOk="0">
-                <a:moveTo>
-                  <a:pt x="0" y="0"/>
-                </a:moveTo>
-                <a:lnTo>
-                  <a:pt x="120000" y="0"/>
-                </a:lnTo>
-                <a:lnTo>
-                  <a:pt x="120000" y="120000"/>
-                </a:lnTo>
-                <a:lnTo>
-                  <a:pt x="0" y="120000"/>
-                </a:lnTo>
-                <a:close/>
-              </a:path>
-            </a:pathLst>
-          </a:custGeom>
         </p:spPr>
       </p:sp>
       <p:sp>
         <p:nvSpPr>
-          <p:cNvPr id="95" name="Google Shape;95;g35f391192_029:notes"/>
-          <p:cNvSpPr txBox="1">
+          <p:cNvPr id="3" name="Notes Placeholder 2"/>
+          <p:cNvSpPr>
             <a:spLocks noGrp="1"/>
           </p:cNvSpPr>
           <p:nvPr>
             <p:ph type="body" idx="1"/>
           </p:nvPr>
         </p:nvSpPr>
-        <p:spPr>
-          <a:xfrm>
-            <a:off x="685800" y="4343400"/>
-            <a:ext cx="5486400" cy="4114800"/>
-          </a:xfrm>
-          <a:prstGeom prst="rect">
-            <a:avLst/>
-          </a:prstGeom>
-        </p:spPr>
+        <p:spPr/>
         <p:txBody>
-          <a:bodyPr spcFirstLastPara="1" wrap="square" lIns="91425" tIns="91425" rIns="91425" bIns="91425" anchor="t" anchorCtr="0">
-            <a:noAutofit/>
-          </a:bodyPr>
+          <a:bodyPr/>
           <a:lstStyle/>
           <a:p>
-            <a:pPr marL="0" lvl="0" indent="0" algn="l" rtl="0">
-              <a:spcBef>
-                <a:spcPts val="0"/>
-              </a:spcBef>
-              <a:spcAft>
-                <a:spcPts val="0"/>
-              </a:spcAft>
-              <a:buNone/>
-            </a:pPr>
-            <a:endParaRPr/>
+            <a:endParaRPr lang="en-US"/>
           </a:p>
         </p:txBody>
       </p:sp>
     </p:spTree>
     <p:extLst>
       <p:ext uri="{BB962C8B-B14F-4D97-AF65-F5344CB8AC3E}">
-        <p14:creationId xmlns:p14="http://schemas.microsoft.com/office/powerpoint/2010/main" val="3390362646"/>
+        <p14:creationId xmlns:p14="http://schemas.microsoft.com/office/powerpoint/2010/main" val="641327374"/>
       </p:ext>
     </p:extLst>
   </p:cSld>
@@ -8059,7 +8121,7 @@
     </p:spTree>
     <p:extLst>
       <p:ext uri="{BB962C8B-B14F-4D97-AF65-F5344CB8AC3E}">
-        <p14:creationId xmlns:p14="http://schemas.microsoft.com/office/powerpoint/2010/main" val="1150731996"/>
+        <p14:creationId xmlns:p14="http://schemas.microsoft.com/office/powerpoint/2010/main" val="3390362646"/>
       </p:ext>
     </p:extLst>
   </p:cSld>
@@ -8074,7 +8136,7 @@
   <p:cSld>
     <p:spTree>
       <p:nvGrpSpPr>
-        <p:cNvPr id="1" name="Shape 399"/>
+        <p:cNvPr id="1" name="Shape 93"/>
         <p:cNvGrpSpPr/>
         <p:nvPr/>
       </p:nvGrpSpPr>
@@ -8088,7 +8150,7 @@
       </p:grpSpPr>
       <p:sp>
         <p:nvSpPr>
-          <p:cNvPr id="400" name="Google Shape;400;g35ed75ccf_022:notes"/>
+          <p:cNvPr id="94" name="Google Shape;94;g35f391192_029:notes"/>
           <p:cNvSpPr>
             <a:spLocks noGrp="1" noRot="1" noChangeAspect="1"/>
           </p:cNvSpPr>
@@ -8129,7 +8191,7 @@
       </p:sp>
       <p:sp>
         <p:nvSpPr>
-          <p:cNvPr id="401" name="Google Shape;401;g35ed75ccf_022:notes"/>
+          <p:cNvPr id="95" name="Google Shape;95;g35f391192_029:notes"/>
           <p:cNvSpPr txBox="1">
             <a:spLocks noGrp="1"/>
           </p:cNvSpPr>
@@ -8166,6 +8228,11 @@
         </p:txBody>
       </p:sp>
     </p:spTree>
+    <p:extLst>
+      <p:ext uri="{BB962C8B-B14F-4D97-AF65-F5344CB8AC3E}">
+        <p14:creationId xmlns:p14="http://schemas.microsoft.com/office/powerpoint/2010/main" val="1150731996"/>
+      </p:ext>
+    </p:extLst>
   </p:cSld>
   <p:clrMapOvr>
     <a:masterClrMapping/>
@@ -14948,7 +15015,7 @@
   <p:cSld>
     <p:spTree>
       <p:nvGrpSpPr>
-        <p:cNvPr id="1" name="Shape 96"/>
+        <p:cNvPr id="1" name=""/>
         <p:cNvGrpSpPr/>
         <p:nvPr/>
       </p:nvGrpSpPr>
@@ -14962,107 +15029,218 @@
       </p:grpSpPr>
       <p:sp>
         <p:nvSpPr>
-          <p:cNvPr id="97" name="Google Shape;97;p15"/>
-          <p:cNvSpPr txBox="1">
+          <p:cNvPr id="2" name="Title 1">
+            <a:extLst>
+              <a:ext uri="{FF2B5EF4-FFF2-40B4-BE49-F238E27FC236}">
+                <a16:creationId xmlns:a16="http://schemas.microsoft.com/office/drawing/2014/main" id="{024AD384-5AD1-4435-A943-1241B2FACD62}"/>
+              </a:ext>
+            </a:extLst>
+          </p:cNvPr>
+          <p:cNvSpPr>
             <a:spLocks noGrp="1"/>
           </p:cNvSpPr>
           <p:nvPr>
-            <p:ph type="ctrTitle"/>
+            <p:ph type="title"/>
+          </p:nvPr>
+        </p:nvSpPr>
+        <p:spPr/>
+        <p:txBody>
+          <a:bodyPr/>
+          <a:lstStyle/>
+          <a:p>
+            <a:r>
+              <a:rPr lang="en-US"/>
+              <a:t>Data Cleaning</a:t>
+            </a:r>
+            <a:endParaRPr lang="fa-IR"/>
+          </a:p>
+        </p:txBody>
+      </p:sp>
+      <p:sp>
+        <p:nvSpPr>
+          <p:cNvPr id="3" name="Text Placeholder 2">
+            <a:extLst>
+              <a:ext uri="{FF2B5EF4-FFF2-40B4-BE49-F238E27FC236}">
+                <a16:creationId xmlns:a16="http://schemas.microsoft.com/office/drawing/2014/main" id="{58BE3078-8B89-4550-B497-93E4DADBD57E}"/>
+              </a:ext>
+            </a:extLst>
+          </p:cNvPr>
+          <p:cNvSpPr>
+            <a:spLocks noGrp="1"/>
+          </p:cNvSpPr>
+          <p:nvPr>
+            <p:ph type="body" idx="1"/>
           </p:nvPr>
         </p:nvSpPr>
         <p:spPr>
           <a:xfrm>
-            <a:off x="1655700" y="1991850"/>
-            <a:ext cx="5832600" cy="1159800"/>
+            <a:off x="786148" y="1142608"/>
+            <a:ext cx="5147365" cy="3626431"/>
+          </a:xfrm>
+        </p:spPr>
+        <p:txBody>
+          <a:bodyPr/>
+          <a:lstStyle/>
+          <a:p>
+            <a:r>
+              <a:rPr lang="en-US"/>
+              <a:t>The data set contains some </a:t>
+            </a:r>
+            <a:r>
+              <a:rPr lang="en-US">
+                <a:solidFill>
+                  <a:schemeClr val="accent1"/>
+                </a:solidFill>
+              </a:rPr>
+              <a:t>empty cells</a:t>
+            </a:r>
+            <a:r>
+              <a:rPr lang="en-US"/>
+              <a:t>: row 18, 22, and 28.</a:t>
+            </a:r>
+          </a:p>
+          <a:p>
+            <a:endParaRPr lang="en-US" sz="1100">
+              <a:latin typeface="Consolas" panose="020B0609020204030204" pitchFamily="49" charset="0"/>
+            </a:endParaRPr>
+          </a:p>
+          <a:p>
+            <a:r>
+              <a:rPr lang="en-US"/>
+              <a:t>The data set contains </a:t>
+            </a:r>
+            <a:r>
+              <a:rPr lang="en-US">
+                <a:solidFill>
+                  <a:schemeClr val="accent1"/>
+                </a:solidFill>
+              </a:rPr>
+              <a:t>wrong format</a:t>
+            </a:r>
+            <a:r>
+              <a:rPr lang="en-US"/>
+              <a:t>: row 26.</a:t>
+            </a:r>
+          </a:p>
+          <a:p>
+            <a:endParaRPr lang="en-US" sz="1100">
+              <a:latin typeface="Consolas" panose="020B0609020204030204" pitchFamily="49" charset="0"/>
+            </a:endParaRPr>
+          </a:p>
+          <a:p>
+            <a:r>
+              <a:rPr lang="en-US"/>
+              <a:t>The data set contains </a:t>
+            </a:r>
+            <a:r>
+              <a:rPr lang="en-US">
+                <a:solidFill>
+                  <a:schemeClr val="accent1"/>
+                </a:solidFill>
+              </a:rPr>
+              <a:t>wrong data</a:t>
+            </a:r>
+            <a:r>
+              <a:rPr lang="en-US"/>
+              <a:t>: row 7.</a:t>
+            </a:r>
+          </a:p>
+          <a:p>
+            <a:endParaRPr lang="en-US" sz="1100">
+              <a:latin typeface="Consolas" panose="020B0609020204030204" pitchFamily="49" charset="0"/>
+            </a:endParaRPr>
+          </a:p>
+          <a:p>
+            <a:r>
+              <a:rPr lang="en-US"/>
+              <a:t>The data set contains </a:t>
+            </a:r>
+            <a:r>
+              <a:rPr lang="en-US">
+                <a:solidFill>
+                  <a:schemeClr val="accent1"/>
+                </a:solidFill>
+              </a:rPr>
+              <a:t>duplicates</a:t>
+            </a:r>
+            <a:r>
+              <a:rPr lang="en-US"/>
+              <a:t>: row 11 and 12.</a:t>
+            </a:r>
+          </a:p>
+        </p:txBody>
+      </p:sp>
+      <p:sp>
+        <p:nvSpPr>
+          <p:cNvPr id="4" name="Slide Number Placeholder 3">
+            <a:extLst>
+              <a:ext uri="{FF2B5EF4-FFF2-40B4-BE49-F238E27FC236}">
+                <a16:creationId xmlns:a16="http://schemas.microsoft.com/office/drawing/2014/main" id="{64987AE6-EC0E-43DD-9376-95A5602EE5E1}"/>
+              </a:ext>
+            </a:extLst>
+          </p:cNvPr>
+          <p:cNvSpPr>
+            <a:spLocks noGrp="1"/>
+          </p:cNvSpPr>
+          <p:nvPr>
+            <p:ph type="sldNum" idx="12"/>
+          </p:nvPr>
+        </p:nvSpPr>
+        <p:spPr/>
+        <p:txBody>
+          <a:bodyPr/>
+          <a:lstStyle/>
+          <a:p>
+            <a:pPr marL="0" lvl="0" indent="0" algn="r" rtl="0">
+              <a:spcBef>
+                <a:spcPts val="0"/>
+              </a:spcBef>
+              <a:spcAft>
+                <a:spcPts val="0"/>
+              </a:spcAft>
+              <a:buNone/>
+            </a:pPr>
+            <a:fld id="{00000000-1234-1234-1234-123412341234}" type="slidenum">
+              <a:rPr lang="en" smtClean="0"/>
+              <a:t>21</a:t>
+            </a:fld>
+            <a:endParaRPr lang="en"/>
+          </a:p>
+        </p:txBody>
+      </p:sp>
+      <p:pic>
+        <p:nvPicPr>
+          <p:cNvPr id="9" name="Picture 8">
+            <a:extLst>
+              <a:ext uri="{FF2B5EF4-FFF2-40B4-BE49-F238E27FC236}">
+                <a16:creationId xmlns:a16="http://schemas.microsoft.com/office/drawing/2014/main" id="{B4AB35BB-D855-4BB0-A3B3-8592F337F222}"/>
+              </a:ext>
+            </a:extLst>
+          </p:cNvPr>
+          <p:cNvPicPr>
+            <a:picLocks noChangeAspect="1"/>
+          </p:cNvPicPr>
+          <p:nvPr/>
+        </p:nvPicPr>
+        <p:blipFill rotWithShape="1">
+          <a:blip r:embed="rId3"/>
+          <a:srcRect b="12925"/>
+          <a:stretch/>
+        </p:blipFill>
+        <p:spPr>
+          <a:xfrm>
+            <a:off x="6074916" y="1303568"/>
+            <a:ext cx="2282934" cy="3304510"/>
           </a:xfrm>
           <a:prstGeom prst="rect">
             <a:avLst/>
           </a:prstGeom>
         </p:spPr>
-        <p:txBody>
-          <a:bodyPr spcFirstLastPara="1" wrap="square" lIns="91425" tIns="91425" rIns="91425" bIns="91425" anchor="ctr" anchorCtr="0">
-            <a:noAutofit/>
-          </a:bodyPr>
-          <a:lstStyle/>
-          <a:p>
-            <a:pPr marL="0" lvl="0" indent="0" algn="ctr" rtl="0">
-              <a:spcBef>
-                <a:spcPts val="0"/>
-              </a:spcBef>
-              <a:spcAft>
-                <a:spcPts val="0"/>
-              </a:spcAft>
-              <a:buNone/>
-            </a:pPr>
-            <a:r>
-              <a:rPr lang="en-US" sz="6000">
-                <a:solidFill>
-                  <a:srgbClr val="E6E6E6"/>
-                </a:solidFill>
-              </a:rPr>
-              <a:t>3</a:t>
-            </a:r>
-            <a:endParaRPr sz="6000">
-              <a:solidFill>
-                <a:srgbClr val="E6E6E6"/>
-              </a:solidFill>
-            </a:endParaRPr>
-          </a:p>
-          <a:p>
-            <a:r>
-              <a:rPr lang="en"/>
-              <a:t>Matplotlib</a:t>
-            </a:r>
-            <a:endParaRPr/>
-          </a:p>
-        </p:txBody>
-      </p:sp>
-      <p:sp>
-        <p:nvSpPr>
-          <p:cNvPr id="99" name="Google Shape;99;p15"/>
-          <p:cNvSpPr txBox="1">
-            <a:spLocks noGrp="1"/>
-          </p:cNvSpPr>
-          <p:nvPr>
-            <p:ph type="sldNum" idx="4294967295"/>
-          </p:nvPr>
-        </p:nvSpPr>
-        <p:spPr>
-          <a:xfrm>
-            <a:off x="8404384" y="4749851"/>
-            <a:ext cx="548700" cy="393600"/>
-          </a:xfrm>
-          <a:prstGeom prst="rect">
-            <a:avLst/>
-          </a:prstGeom>
-        </p:spPr>
-        <p:txBody>
-          <a:bodyPr spcFirstLastPara="1" wrap="square" lIns="91425" tIns="91425" rIns="91425" bIns="91425" anchor="t" anchorCtr="0">
-            <a:noAutofit/>
-          </a:bodyPr>
-          <a:lstStyle/>
-          <a:p>
-            <a:pPr marL="0" lvl="0" indent="0" algn="r" rtl="0">
-              <a:spcBef>
-                <a:spcPts val="0"/>
-              </a:spcBef>
-              <a:spcAft>
-                <a:spcPts val="0"/>
-              </a:spcAft>
-              <a:buNone/>
-            </a:pPr>
-            <a:fld id="{00000000-1234-1234-1234-123412341234}" type="slidenum">
-              <a:rPr lang="en"/>
-              <a:t>21</a:t>
-            </a:fld>
-            <a:endParaRPr/>
-          </a:p>
-        </p:txBody>
-      </p:sp>
+      </p:pic>
     </p:spTree>
     <p:extLst>
       <p:ext uri="{BB962C8B-B14F-4D97-AF65-F5344CB8AC3E}">
-        <p14:creationId xmlns:p14="http://schemas.microsoft.com/office/powerpoint/2010/main" val="550571345"/>
+        <p14:creationId xmlns:p14="http://schemas.microsoft.com/office/powerpoint/2010/main" val="2224071834"/>
       </p:ext>
     </p:extLst>
   </p:cSld>
@@ -15129,7 +15307,7 @@
                   <a:srgbClr val="E6E6E6"/>
                 </a:solidFill>
               </a:rPr>
-              <a:t>4</a:t>
+              <a:t>3</a:t>
             </a:r>
             <a:endParaRPr sz="6000">
               <a:solidFill>
@@ -15139,8 +15317,8 @@
           </a:p>
           <a:p>
             <a:r>
-              <a:rPr lang="en-US"/>
-              <a:t>Scikit-learn</a:t>
+              <a:rPr lang="en"/>
+              <a:t>Matplotlib</a:t>
             </a:r>
             <a:endParaRPr/>
           </a:p>
@@ -15191,6 +15369,135 @@
     </p:spTree>
     <p:extLst>
       <p:ext uri="{BB962C8B-B14F-4D97-AF65-F5344CB8AC3E}">
+        <p14:creationId xmlns:p14="http://schemas.microsoft.com/office/powerpoint/2010/main" val="550571345"/>
+      </p:ext>
+    </p:extLst>
+  </p:cSld>
+  <p:clrMapOvr>
+    <a:masterClrMapping/>
+  </p:clrMapOvr>
+</p:sld>
+</file>
+
+<file path=ppt/slides/slide23.xml><?xml version="1.0" encoding="utf-8"?>
+<p:sld xmlns:a="http://schemas.openxmlformats.org/drawingml/2006/main" xmlns:r="http://schemas.openxmlformats.org/officeDocument/2006/relationships" xmlns:p="http://schemas.openxmlformats.org/presentationml/2006/main">
+  <p:cSld>
+    <p:spTree>
+      <p:nvGrpSpPr>
+        <p:cNvPr id="1" name="Shape 96"/>
+        <p:cNvGrpSpPr/>
+        <p:nvPr/>
+      </p:nvGrpSpPr>
+      <p:grpSpPr>
+        <a:xfrm>
+          <a:off x="0" y="0"/>
+          <a:ext cx="0" cy="0"/>
+          <a:chOff x="0" y="0"/>
+          <a:chExt cx="0" cy="0"/>
+        </a:xfrm>
+      </p:grpSpPr>
+      <p:sp>
+        <p:nvSpPr>
+          <p:cNvPr id="97" name="Google Shape;97;p15"/>
+          <p:cNvSpPr txBox="1">
+            <a:spLocks noGrp="1"/>
+          </p:cNvSpPr>
+          <p:nvPr>
+            <p:ph type="ctrTitle"/>
+          </p:nvPr>
+        </p:nvSpPr>
+        <p:spPr>
+          <a:xfrm>
+            <a:off x="1655700" y="1991850"/>
+            <a:ext cx="5832600" cy="1159800"/>
+          </a:xfrm>
+          <a:prstGeom prst="rect">
+            <a:avLst/>
+          </a:prstGeom>
+        </p:spPr>
+        <p:txBody>
+          <a:bodyPr spcFirstLastPara="1" wrap="square" lIns="91425" tIns="91425" rIns="91425" bIns="91425" anchor="ctr" anchorCtr="0">
+            <a:noAutofit/>
+          </a:bodyPr>
+          <a:lstStyle/>
+          <a:p>
+            <a:pPr marL="0" lvl="0" indent="0" algn="ctr" rtl="0">
+              <a:spcBef>
+                <a:spcPts val="0"/>
+              </a:spcBef>
+              <a:spcAft>
+                <a:spcPts val="0"/>
+              </a:spcAft>
+              <a:buNone/>
+            </a:pPr>
+            <a:r>
+              <a:rPr lang="en-US" sz="6000">
+                <a:solidFill>
+                  <a:srgbClr val="E6E6E6"/>
+                </a:solidFill>
+              </a:rPr>
+              <a:t>4</a:t>
+            </a:r>
+            <a:endParaRPr sz="6000">
+              <a:solidFill>
+                <a:srgbClr val="E6E6E6"/>
+              </a:solidFill>
+            </a:endParaRPr>
+          </a:p>
+          <a:p>
+            <a:r>
+              <a:rPr lang="en-US"/>
+              <a:t>Scikit-learn</a:t>
+            </a:r>
+            <a:endParaRPr/>
+          </a:p>
+        </p:txBody>
+      </p:sp>
+      <p:sp>
+        <p:nvSpPr>
+          <p:cNvPr id="99" name="Google Shape;99;p15"/>
+          <p:cNvSpPr txBox="1">
+            <a:spLocks noGrp="1"/>
+          </p:cNvSpPr>
+          <p:nvPr>
+            <p:ph type="sldNum" idx="4294967295"/>
+          </p:nvPr>
+        </p:nvSpPr>
+        <p:spPr>
+          <a:xfrm>
+            <a:off x="8404384" y="4749851"/>
+            <a:ext cx="548700" cy="393600"/>
+          </a:xfrm>
+          <a:prstGeom prst="rect">
+            <a:avLst/>
+          </a:prstGeom>
+        </p:spPr>
+        <p:txBody>
+          <a:bodyPr spcFirstLastPara="1" wrap="square" lIns="91425" tIns="91425" rIns="91425" bIns="91425" anchor="t" anchorCtr="0">
+            <a:noAutofit/>
+          </a:bodyPr>
+          <a:lstStyle/>
+          <a:p>
+            <a:pPr marL="0" lvl="0" indent="0" algn="r" rtl="0">
+              <a:spcBef>
+                <a:spcPts val="0"/>
+              </a:spcBef>
+              <a:spcAft>
+                <a:spcPts val="0"/>
+              </a:spcAft>
+              <a:buNone/>
+            </a:pPr>
+            <a:fld id="{00000000-1234-1234-1234-123412341234}" type="slidenum">
+              <a:rPr lang="en"/>
+              <a:t>23</a:t>
+            </a:fld>
+            <a:endParaRPr/>
+          </a:p>
+        </p:txBody>
+      </p:sp>
+    </p:spTree>
+    <p:extLst>
+      <p:ext uri="{BB962C8B-B14F-4D97-AF65-F5344CB8AC3E}">
         <p14:creationId xmlns:p14="http://schemas.microsoft.com/office/powerpoint/2010/main" val="2239011547"/>
       </p:ext>
     </p:extLst>
@@ -15201,7 +15508,7 @@
 </p:sld>
 </file>
 
-<file path=ppt/slides/slide23.xml><?xml version="1.0" encoding="utf-8"?>
+<file path=ppt/slides/slide24.xml><?xml version="1.0" encoding="utf-8"?>
 <p:sld xmlns:a="http://schemas.openxmlformats.org/drawingml/2006/main" xmlns:r="http://schemas.openxmlformats.org/officeDocument/2006/relationships" xmlns:p="http://schemas.openxmlformats.org/presentationml/2006/main">
   <p:cSld>
     <p:spTree>
@@ -15454,7 +15761,7 @@
             </a:pPr>
             <a:fld id="{00000000-1234-1234-1234-123412341234}" type="slidenum">
               <a:rPr lang="en"/>
-              <a:t>23</a:t>
+              <a:t>24</a:t>
             </a:fld>
             <a:endParaRPr/>
           </a:p>

</xml_diff>